<commit_message>
update session 04 slides
</commit_message>
<xml_diff>
--- a/slides/Session 04 - Planets with pandas & matplotlib.pptx
+++ b/slides/Session 04 - Planets with pandas & matplotlib.pptx
@@ -8,28 +8,33 @@
     <p:notesMasterId r:id="rId5"/>
   </p:notesMasterIdLst>
   <p:handoutMasterIdLst>
-    <p:handoutMasterId r:id="rId23"/>
+    <p:handoutMasterId r:id="rId28"/>
   </p:handoutMasterIdLst>
   <p:sldIdLst>
     <p:sldId id="256" r:id="rId3"/>
     <p:sldId id="276" r:id="rId4"/>
-    <p:sldId id="323" r:id="rId6"/>
-    <p:sldId id="309" r:id="rId7"/>
-    <p:sldId id="310" r:id="rId8"/>
-    <p:sldId id="311" r:id="rId9"/>
-    <p:sldId id="312" r:id="rId10"/>
-    <p:sldId id="313" r:id="rId11"/>
-    <p:sldId id="314" r:id="rId12"/>
-    <p:sldId id="315" r:id="rId13"/>
-    <p:sldId id="316" r:id="rId14"/>
-    <p:sldId id="317" r:id="rId15"/>
-    <p:sldId id="318" r:id="rId16"/>
-    <p:sldId id="320" r:id="rId17"/>
-    <p:sldId id="319" r:id="rId18"/>
-    <p:sldId id="321" r:id="rId19"/>
-    <p:sldId id="322" r:id="rId20"/>
-    <p:sldId id="268" r:id="rId21"/>
-    <p:sldId id="270" r:id="rId22"/>
+    <p:sldId id="340" r:id="rId6"/>
+    <p:sldId id="323" r:id="rId7"/>
+    <p:sldId id="341" r:id="rId8"/>
+    <p:sldId id="309" r:id="rId9"/>
+    <p:sldId id="310" r:id="rId10"/>
+    <p:sldId id="311" r:id="rId11"/>
+    <p:sldId id="342" r:id="rId12"/>
+    <p:sldId id="312" r:id="rId13"/>
+    <p:sldId id="313" r:id="rId14"/>
+    <p:sldId id="314" r:id="rId15"/>
+    <p:sldId id="315" r:id="rId16"/>
+    <p:sldId id="316" r:id="rId17"/>
+    <p:sldId id="317" r:id="rId18"/>
+    <p:sldId id="318" r:id="rId19"/>
+    <p:sldId id="320" r:id="rId20"/>
+    <p:sldId id="343" r:id="rId21"/>
+    <p:sldId id="319" r:id="rId22"/>
+    <p:sldId id="321" r:id="rId23"/>
+    <p:sldId id="344" r:id="rId24"/>
+    <p:sldId id="322" r:id="rId25"/>
+    <p:sldId id="268" r:id="rId26"/>
+    <p:sldId id="270" r:id="rId27"/>
   </p:sldIdLst>
   <p:sldSz cx="12192000" cy="6858000"/>
   <p:notesSz cx="7103745" cy="10234295"/>
@@ -1090,7 +1095,287 @@
 </p:notes>
 </file>
 
+<file path=ppt/notesSlides/notesSlide17.xml><?xml version="1.0" encoding="utf-8"?>
+<p:notes xmlns:a="http://schemas.openxmlformats.org/drawingml/2006/main" xmlns:r="http://schemas.openxmlformats.org/officeDocument/2006/relationships" xmlns:p="http://schemas.openxmlformats.org/presentationml/2006/main">
+  <p:cSld>
+    <p:spTree>
+      <p:nvGrpSpPr>
+        <p:cNvPr id="1" name=""/>
+        <p:cNvGrpSpPr/>
+        <p:nvPr/>
+      </p:nvGrpSpPr>
+      <p:grpSpPr>
+        <a:xfrm>
+          <a:off x="0" y="0"/>
+          <a:ext cx="0" cy="0"/>
+          <a:chOff x="0" y="0"/>
+          <a:chExt cx="0" cy="0"/>
+        </a:xfrm>
+      </p:grpSpPr>
+      <p:sp>
+        <p:nvSpPr>
+          <p:cNvPr id="2" name="Slide Image Placeholder 1"/>
+          <p:cNvSpPr>
+            <a:spLocks noGrp="1" noRot="1" noChangeAspect="1"/>
+          </p:cNvSpPr>
+          <p:nvPr>
+            <p:ph type="sldImg" idx="2"/>
+          </p:nvPr>
+        </p:nvSpPr>
+        <p:spPr/>
+      </p:sp>
+      <p:sp>
+        <p:nvSpPr>
+          <p:cNvPr id="3" name="Text Placeholder 2"/>
+          <p:cNvSpPr>
+            <a:spLocks noGrp="1"/>
+          </p:cNvSpPr>
+          <p:nvPr>
+            <p:ph type="body" idx="3"/>
+          </p:nvPr>
+        </p:nvSpPr>
+        <p:spPr/>
+        <p:txBody>
+          <a:bodyPr/>
+          <a:lstStyle/>
+          <a:p>
+            <a:endParaRPr lang="en-US" dirty="0"/>
+          </a:p>
+        </p:txBody>
+      </p:sp>
+    </p:spTree>
+  </p:cSld>
+  <p:clrMapOvr>
+    <a:masterClrMapping/>
+  </p:clrMapOvr>
+</p:notes>
+</file>
+
+<file path=ppt/notesSlides/notesSlide18.xml><?xml version="1.0" encoding="utf-8"?>
+<p:notes xmlns:a="http://schemas.openxmlformats.org/drawingml/2006/main" xmlns:r="http://schemas.openxmlformats.org/officeDocument/2006/relationships" xmlns:p="http://schemas.openxmlformats.org/presentationml/2006/main">
+  <p:cSld>
+    <p:spTree>
+      <p:nvGrpSpPr>
+        <p:cNvPr id="1" name=""/>
+        <p:cNvGrpSpPr/>
+        <p:nvPr/>
+      </p:nvGrpSpPr>
+      <p:grpSpPr>
+        <a:xfrm>
+          <a:off x="0" y="0"/>
+          <a:ext cx="0" cy="0"/>
+          <a:chOff x="0" y="0"/>
+          <a:chExt cx="0" cy="0"/>
+        </a:xfrm>
+      </p:grpSpPr>
+      <p:sp>
+        <p:nvSpPr>
+          <p:cNvPr id="2" name="Slide Image Placeholder 1"/>
+          <p:cNvSpPr>
+            <a:spLocks noGrp="1" noRot="1" noChangeAspect="1"/>
+          </p:cNvSpPr>
+          <p:nvPr>
+            <p:ph type="sldImg" idx="2"/>
+          </p:nvPr>
+        </p:nvSpPr>
+        <p:spPr/>
+      </p:sp>
+      <p:sp>
+        <p:nvSpPr>
+          <p:cNvPr id="3" name="Text Placeholder 2"/>
+          <p:cNvSpPr>
+            <a:spLocks noGrp="1"/>
+          </p:cNvSpPr>
+          <p:nvPr>
+            <p:ph type="body" idx="3"/>
+          </p:nvPr>
+        </p:nvSpPr>
+        <p:spPr/>
+        <p:txBody>
+          <a:bodyPr/>
+          <a:lstStyle/>
+          <a:p>
+            <a:endParaRPr lang="en-US" dirty="0"/>
+          </a:p>
+        </p:txBody>
+      </p:sp>
+    </p:spTree>
+  </p:cSld>
+  <p:clrMapOvr>
+    <a:masterClrMapping/>
+  </p:clrMapOvr>
+</p:notes>
+</file>
+
+<file path=ppt/notesSlides/notesSlide19.xml><?xml version="1.0" encoding="utf-8"?>
+<p:notes xmlns:a="http://schemas.openxmlformats.org/drawingml/2006/main" xmlns:r="http://schemas.openxmlformats.org/officeDocument/2006/relationships" xmlns:p="http://schemas.openxmlformats.org/presentationml/2006/main">
+  <p:cSld>
+    <p:spTree>
+      <p:nvGrpSpPr>
+        <p:cNvPr id="1" name=""/>
+        <p:cNvGrpSpPr/>
+        <p:nvPr/>
+      </p:nvGrpSpPr>
+      <p:grpSpPr>
+        <a:xfrm>
+          <a:off x="0" y="0"/>
+          <a:ext cx="0" cy="0"/>
+          <a:chOff x="0" y="0"/>
+          <a:chExt cx="0" cy="0"/>
+        </a:xfrm>
+      </p:grpSpPr>
+      <p:sp>
+        <p:nvSpPr>
+          <p:cNvPr id="2" name="Slide Image Placeholder 1"/>
+          <p:cNvSpPr>
+            <a:spLocks noGrp="1" noRot="1" noChangeAspect="1"/>
+          </p:cNvSpPr>
+          <p:nvPr>
+            <p:ph type="sldImg" idx="2"/>
+          </p:nvPr>
+        </p:nvSpPr>
+        <p:spPr/>
+      </p:sp>
+      <p:sp>
+        <p:nvSpPr>
+          <p:cNvPr id="3" name="Text Placeholder 2"/>
+          <p:cNvSpPr>
+            <a:spLocks noGrp="1"/>
+          </p:cNvSpPr>
+          <p:nvPr>
+            <p:ph type="body" idx="3"/>
+          </p:nvPr>
+        </p:nvSpPr>
+        <p:spPr/>
+        <p:txBody>
+          <a:bodyPr/>
+          <a:lstStyle/>
+          <a:p>
+            <a:endParaRPr lang="en-US" dirty="0"/>
+          </a:p>
+        </p:txBody>
+      </p:sp>
+    </p:spTree>
+  </p:cSld>
+  <p:clrMapOvr>
+    <a:masterClrMapping/>
+  </p:clrMapOvr>
+</p:notes>
+</file>
+
 <file path=ppt/notesSlides/notesSlide2.xml><?xml version="1.0" encoding="utf-8"?>
+<p:notes xmlns:a="http://schemas.openxmlformats.org/drawingml/2006/main" xmlns:r="http://schemas.openxmlformats.org/officeDocument/2006/relationships" xmlns:p="http://schemas.openxmlformats.org/presentationml/2006/main">
+  <p:cSld>
+    <p:spTree>
+      <p:nvGrpSpPr>
+        <p:cNvPr id="1" name=""/>
+        <p:cNvGrpSpPr/>
+        <p:nvPr/>
+      </p:nvGrpSpPr>
+      <p:grpSpPr>
+        <a:xfrm>
+          <a:off x="0" y="0"/>
+          <a:ext cx="0" cy="0"/>
+          <a:chOff x="0" y="0"/>
+          <a:chExt cx="0" cy="0"/>
+        </a:xfrm>
+      </p:grpSpPr>
+      <p:sp>
+        <p:nvSpPr>
+          <p:cNvPr id="2" name="Slide Image Placeholder 1"/>
+          <p:cNvSpPr>
+            <a:spLocks noGrp="1" noRot="1" noChangeAspect="1"/>
+          </p:cNvSpPr>
+          <p:nvPr>
+            <p:ph type="sldImg" idx="2"/>
+          </p:nvPr>
+        </p:nvSpPr>
+        <p:spPr/>
+      </p:sp>
+      <p:sp>
+        <p:nvSpPr>
+          <p:cNvPr id="3" name="Text Placeholder 2"/>
+          <p:cNvSpPr>
+            <a:spLocks noGrp="1"/>
+          </p:cNvSpPr>
+          <p:nvPr>
+            <p:ph type="body" idx="3"/>
+          </p:nvPr>
+        </p:nvSpPr>
+        <p:spPr/>
+        <p:txBody>
+          <a:bodyPr/>
+          <a:lstStyle/>
+          <a:p>
+            <a:endParaRPr lang="en-US" dirty="0"/>
+          </a:p>
+        </p:txBody>
+      </p:sp>
+    </p:spTree>
+  </p:cSld>
+  <p:clrMapOvr>
+    <a:masterClrMapping/>
+  </p:clrMapOvr>
+</p:notes>
+</file>
+
+<file path=ppt/notesSlides/notesSlide20.xml><?xml version="1.0" encoding="utf-8"?>
+<p:notes xmlns:a="http://schemas.openxmlformats.org/drawingml/2006/main" xmlns:r="http://schemas.openxmlformats.org/officeDocument/2006/relationships" xmlns:p="http://schemas.openxmlformats.org/presentationml/2006/main">
+  <p:cSld>
+    <p:spTree>
+      <p:nvGrpSpPr>
+        <p:cNvPr id="1" name=""/>
+        <p:cNvGrpSpPr/>
+        <p:nvPr/>
+      </p:nvGrpSpPr>
+      <p:grpSpPr>
+        <a:xfrm>
+          <a:off x="0" y="0"/>
+          <a:ext cx="0" cy="0"/>
+          <a:chOff x="0" y="0"/>
+          <a:chExt cx="0" cy="0"/>
+        </a:xfrm>
+      </p:grpSpPr>
+      <p:sp>
+        <p:nvSpPr>
+          <p:cNvPr id="2" name="Slide Image Placeholder 1"/>
+          <p:cNvSpPr>
+            <a:spLocks noGrp="1" noRot="1" noChangeAspect="1"/>
+          </p:cNvSpPr>
+          <p:nvPr>
+            <p:ph type="sldImg" idx="2"/>
+          </p:nvPr>
+        </p:nvSpPr>
+        <p:spPr/>
+      </p:sp>
+      <p:sp>
+        <p:nvSpPr>
+          <p:cNvPr id="3" name="Text Placeholder 2"/>
+          <p:cNvSpPr>
+            <a:spLocks noGrp="1"/>
+          </p:cNvSpPr>
+          <p:nvPr>
+            <p:ph type="body" idx="3"/>
+          </p:nvPr>
+        </p:nvSpPr>
+        <p:spPr/>
+        <p:txBody>
+          <a:bodyPr/>
+          <a:lstStyle/>
+          <a:p>
+            <a:endParaRPr lang="en-US" dirty="0"/>
+          </a:p>
+        </p:txBody>
+      </p:sp>
+    </p:spTree>
+  </p:cSld>
+  <p:clrMapOvr>
+    <a:masterClrMapping/>
+  </p:clrMapOvr>
+</p:notes>
+</file>
+
+<file path=ppt/notesSlides/notesSlide21.xml><?xml version="1.0" encoding="utf-8"?>
 <p:notes xmlns:a="http://schemas.openxmlformats.org/drawingml/2006/main" xmlns:r="http://schemas.openxmlformats.org/officeDocument/2006/relationships" xmlns:p="http://schemas.openxmlformats.org/presentationml/2006/main">
   <p:cSld>
     <p:spTree>
@@ -5052,12 +5337,11 @@
           <a:p>
             <a:pPr algn="l"/>
             <a:r>
-              <a:rPr lang="en-US" altLang="ar-EG" dirty="0">
-                <a:latin typeface="Ubuntu" panose="020B0504030602030204" charset="0"/>
-                <a:cs typeface="Ubuntu" panose="020B0504030602030204" charset="0"/>
-                <a:sym typeface="+mn-ea"/>
-              </a:rPr>
-              <a:t>Mean, Median, and Mode Imputation.</a:t>
+              <a:rPr lang="en-US">
+                <a:latin typeface="Ubuntu" panose="020B0504030602030204" charset="0"/>
+                <a:cs typeface="Ubuntu" panose="020B0504030602030204" charset="0"/>
+              </a:rPr>
+              <a:t>Handle Missing Values </a:t>
             </a:r>
             <a:endParaRPr lang="en-US">
               <a:latin typeface="Ubuntu" panose="020B0504030602030204" charset="0"/>
@@ -5081,15 +5365,13 @@
           <a:bodyPr/>
           <a:lstStyle/>
           <a:p>
-            <a:pPr marL="0" indent="0" algn="l">
-              <a:buNone/>
-            </a:pPr>
+            <a:pPr algn="l"/>
             <a:r>
               <a:rPr lang="en-US" altLang="ar-EG" sz="2400" dirty="0">
                 <a:latin typeface="Ubuntu" panose="020B0504030602030204" charset="0"/>
                 <a:cs typeface="Ubuntu" panose="020B0504030602030204" charset="0"/>
               </a:rPr>
-              <a:t>These imputation methods involve replacing missing values with the mean, median, or mode of the available data in the respective column.</a:t>
+              <a:t>Removal of missing data (list when it's appropriate).</a:t>
             </a:r>
             <a:endParaRPr lang="en-US" altLang="ar-EG" sz="2400" dirty="0">
               <a:latin typeface="Ubuntu" panose="020B0504030602030204" charset="0"/>
@@ -5097,29 +5379,13 @@
             </a:endParaRPr>
           </a:p>
           <a:p>
-            <a:pPr marL="0" indent="0" algn="l">
-              <a:buNone/>
-            </a:pPr>
-            <a:r>
-              <a:rPr lang="en-US" altLang="ar-EG" sz="2400" b="1" dirty="0">
-                <a:latin typeface="Ubuntu" panose="020B0504030602030204" charset="0"/>
-                <a:cs typeface="Ubuntu" panose="020B0504030602030204" charset="0"/>
-              </a:rPr>
-              <a:t>Appropriate when:</a:t>
-            </a:r>
-            <a:endParaRPr lang="en-US" altLang="ar-EG" sz="2400" b="1" dirty="0">
-              <a:latin typeface="Ubuntu" panose="020B0504030602030204" charset="0"/>
-              <a:cs typeface="Ubuntu" panose="020B0504030602030204" charset="0"/>
-            </a:endParaRPr>
-          </a:p>
-          <a:p>
             <a:pPr algn="l"/>
             <a:r>
               <a:rPr lang="en-US" altLang="ar-EG" sz="2400" dirty="0">
                 <a:latin typeface="Ubuntu" panose="020B0504030602030204" charset="0"/>
                 <a:cs typeface="Ubuntu" panose="020B0504030602030204" charset="0"/>
               </a:rPr>
-              <a:t>Data is approximately normally distributed.</a:t>
+              <a:t>Mean, median, and mode imputation.</a:t>
             </a:r>
             <a:endParaRPr lang="en-US" altLang="ar-EG" sz="2400" dirty="0">
               <a:latin typeface="Ubuntu" panose="020B0504030602030204" charset="0"/>
@@ -5133,7 +5399,7 @@
                 <a:latin typeface="Ubuntu" panose="020B0504030602030204" charset="0"/>
                 <a:cs typeface="Ubuntu" panose="020B0504030602030204" charset="0"/>
               </a:rPr>
-              <a:t>Missing values are missing at random and not related to the value itself.</a:t>
+              <a:t>Forward and backward fill imputation.</a:t>
             </a:r>
             <a:endParaRPr lang="en-US" altLang="ar-EG" sz="2400" dirty="0">
               <a:latin typeface="Ubuntu" panose="020B0504030602030204" charset="0"/>
@@ -5147,7 +5413,7 @@
                 <a:latin typeface="Ubuntu" panose="020B0504030602030204" charset="0"/>
                 <a:cs typeface="Ubuntu" panose="020B0504030602030204" charset="0"/>
               </a:rPr>
-              <a:t>The imputed values do not significantly alter the data distribution.</a:t>
+              <a:t>Regression imputation.</a:t>
             </a:r>
             <a:endParaRPr lang="en-US" altLang="ar-EG" sz="2400" dirty="0">
               <a:latin typeface="Ubuntu" panose="020B0504030602030204" charset="0"/>
@@ -5155,29 +5421,27 @@
             </a:endParaRPr>
           </a:p>
           <a:p>
-            <a:pPr marL="0" indent="0" algn="l">
-              <a:buNone/>
-            </a:pPr>
+            <a:pPr algn="l"/>
             <a:r>
               <a:rPr lang="en-US" altLang="ar-EG" sz="2400" dirty="0">
                 <a:latin typeface="Ubuntu" panose="020B0504030602030204" charset="0"/>
                 <a:cs typeface="Ubuntu" panose="020B0504030602030204" charset="0"/>
               </a:rPr>
-              <a:t>Quick and simple, but can introduce bias if the data is </a:t>
-            </a:r>
-            <a:r>
-              <a:rPr lang="en-US" altLang="ar-EG" sz="2400" b="1" dirty="0">
-                <a:latin typeface="Ubuntu" panose="020B0504030602030204" charset="0"/>
-                <a:cs typeface="Ubuntu" panose="020B0504030602030204" charset="0"/>
-              </a:rPr>
-              <a:t>not normally distributed</a:t>
-            </a:r>
+              <a:t>K-Nearest Neighbors (K-NN) imputation.</a:t>
+            </a:r>
+            <a:endParaRPr lang="en-US" altLang="ar-EG" sz="2400" dirty="0">
+              <a:latin typeface="Ubuntu" panose="020B0504030602030204" charset="0"/>
+              <a:cs typeface="Ubuntu" panose="020B0504030602030204" charset="0"/>
+            </a:endParaRPr>
+          </a:p>
+          <a:p>
+            <a:pPr algn="l"/>
             <a:r>
               <a:rPr lang="en-US" altLang="ar-EG" sz="2400" dirty="0">
                 <a:latin typeface="Ubuntu" panose="020B0504030602030204" charset="0"/>
                 <a:cs typeface="Ubuntu" panose="020B0504030602030204" charset="0"/>
               </a:rPr>
-              <a:t>.</a:t>
+              <a:t>Multivariate imputation by chained equations (MICE)</a:t>
             </a:r>
             <a:endParaRPr lang="en-US" altLang="ar-EG" sz="2400" dirty="0">
               <a:latin typeface="Ubuntu" panose="020B0504030602030204" charset="0"/>
@@ -5236,106 +5500,45 @@
           <a:p>
             <a:pPr algn="l"/>
             <a:r>
-              <a:rPr lang="en-US" altLang="ar-EG" dirty="0">
-                <a:latin typeface="Ubuntu" panose="020B0504030602030204" charset="0"/>
-                <a:cs typeface="Ubuntu" panose="020B0504030602030204" charset="0"/>
-                <a:sym typeface="+mn-ea"/>
-              </a:rPr>
-              <a:t>Forward and Backward Fill Imputation</a:t>
-            </a:r>
-            <a:endParaRPr lang="en-US" altLang="ar-EG" dirty="0">
-              <a:latin typeface="Ubuntu" panose="020B0504030602030204" charset="0"/>
-              <a:cs typeface="Ubuntu" panose="020B0504030602030204" charset="0"/>
-              <a:sym typeface="+mn-ea"/>
-            </a:endParaRPr>
-          </a:p>
-        </p:txBody>
-      </p:sp>
-      <p:sp>
-        <p:nvSpPr>
-          <p:cNvPr id="3" name="Content Placeholder 2"/>
-          <p:cNvSpPr>
-            <a:spLocks noGrp="1"/>
-          </p:cNvSpPr>
+              <a:rPr lang="en-US">
+                <a:latin typeface="Ubuntu" panose="020B0504030602030204" charset="0"/>
+                <a:cs typeface="Ubuntu" panose="020B0504030602030204" charset="0"/>
+              </a:rPr>
+              <a:t>Handle Missing Values </a:t>
+            </a:r>
+            <a:endParaRPr lang="en-US">
+              <a:latin typeface="Ubuntu" panose="020B0504030602030204" charset="0"/>
+              <a:cs typeface="Ubuntu" panose="020B0504030602030204" charset="0"/>
+            </a:endParaRPr>
+          </a:p>
+        </p:txBody>
+      </p:sp>
+      <p:pic>
+        <p:nvPicPr>
+          <p:cNvPr id="4" name="Content Placeholder 3"/>
+          <p:cNvPicPr>
+            <a:picLocks noChangeAspect="1"/>
+          </p:cNvPicPr>
           <p:nvPr>
             <p:ph idx="1"/>
           </p:nvPr>
-        </p:nvSpPr>
-        <p:spPr/>
-        <p:txBody>
-          <a:bodyPr/>
-          <a:lstStyle/>
-          <a:p>
-            <a:pPr marL="0" indent="0" algn="l">
-              <a:buNone/>
-            </a:pPr>
-            <a:r>
-              <a:rPr lang="en-US" altLang="ar-EG" sz="2400" b="1" dirty="0">
-                <a:latin typeface="Ubuntu" panose="020B0504030602030204" charset="0"/>
-                <a:cs typeface="Ubuntu" panose="020B0504030602030204" charset="0"/>
-              </a:rPr>
-              <a:t>Forward fill imputation:</a:t>
-            </a:r>
-            <a:r>
-              <a:rPr lang="en-US" altLang="ar-EG" sz="2400" dirty="0">
-                <a:latin typeface="Ubuntu" panose="020B0504030602030204" charset="0"/>
-                <a:cs typeface="Ubuntu" panose="020B0504030602030204" charset="0"/>
-              </a:rPr>
-              <a:t> replaces missing values with the nearest available value that precedes the missing data.</a:t>
-            </a:r>
-            <a:endParaRPr lang="en-US" altLang="ar-EG" sz="2400" dirty="0">
-              <a:latin typeface="Ubuntu" panose="020B0504030602030204" charset="0"/>
-              <a:cs typeface="Ubuntu" panose="020B0504030602030204" charset="0"/>
-            </a:endParaRPr>
-          </a:p>
-          <a:p>
-            <a:pPr marL="0" indent="0" algn="l">
-              <a:buNone/>
-            </a:pPr>
-            <a:r>
-              <a:rPr lang="en-US" altLang="ar-EG" sz="2400" b="1" dirty="0">
-                <a:latin typeface="Ubuntu" panose="020B0504030602030204" charset="0"/>
-                <a:cs typeface="Ubuntu" panose="020B0504030602030204" charset="0"/>
-              </a:rPr>
-              <a:t>Backward fill imputation: </a:t>
-            </a:r>
-            <a:r>
-              <a:rPr lang="en-US" altLang="ar-EG" sz="2400" dirty="0">
-                <a:latin typeface="Ubuntu" panose="020B0504030602030204" charset="0"/>
-                <a:cs typeface="Ubuntu" panose="020B0504030602030204" charset="0"/>
-              </a:rPr>
-              <a:t>uses the nearest available value that follows the missing data.</a:t>
-            </a:r>
-            <a:endParaRPr lang="en-US" altLang="ar-EG" sz="2400" dirty="0">
-              <a:latin typeface="Ubuntu" panose="020B0504030602030204" charset="0"/>
-              <a:cs typeface="Ubuntu" panose="020B0504030602030204" charset="0"/>
-            </a:endParaRPr>
-          </a:p>
-          <a:p>
-            <a:pPr marL="0" indent="0" algn="l">
-              <a:buNone/>
-            </a:pPr>
-            <a:r>
-              <a:rPr lang="en-US" altLang="ar-EG" sz="2400" b="1" dirty="0">
-                <a:latin typeface="Ubuntu" panose="020B0504030602030204" charset="0"/>
-                <a:cs typeface="Ubuntu" panose="020B0504030602030204" charset="0"/>
-              </a:rPr>
-              <a:t>Appropriate when: </a:t>
-            </a:r>
-            <a:r>
-              <a:rPr lang="en-US" altLang="ar-EG" sz="2400" dirty="0">
-                <a:latin typeface="Ubuntu" panose="020B0504030602030204" charset="0"/>
-                <a:cs typeface="Ubuntu" panose="020B0504030602030204" charset="0"/>
-              </a:rPr>
-              <a:t>handling time series data where values are dependent on their chronological order.</a:t>
-            </a:r>
-            <a:endParaRPr lang="en-US" altLang="ar-EG" sz="2400" dirty="0">
-              <a:latin typeface="Ubuntu" panose="020B0504030602030204" charset="0"/>
-              <a:cs typeface="Ubuntu" panose="020B0504030602030204" charset="0"/>
-            </a:endParaRPr>
-          </a:p>
-        </p:txBody>
-      </p:sp>
+        </p:nvPicPr>
+        <p:blipFill>
+          <a:blip r:embed="rId1"/>
+          <a:stretch>
+            <a:fillRect/>
+          </a:stretch>
+        </p:blipFill>
+        <p:spPr>
+          <a:xfrm>
+            <a:off x="407670" y="1417955"/>
+            <a:ext cx="11376660" cy="5123180"/>
+          </a:xfrm>
+          <a:prstGeom prst="rect">
+            <a:avLst/>
+          </a:prstGeom>
+        </p:spPr>
+      </p:pic>
     </p:spTree>
   </p:cSld>
   <p:clrMapOvr>
@@ -5391,7 +5594,7 @@
                 <a:cs typeface="Ubuntu" panose="020B0504030602030204" charset="0"/>
                 <a:sym typeface="+mn-ea"/>
               </a:rPr>
-              <a:t>Regression Imputation</a:t>
+              <a:t>Removing Missing Data</a:t>
             </a:r>
             <a:endParaRPr lang="en-US" altLang="ar-EG" dirty="0">
               <a:latin typeface="Ubuntu" panose="020B0504030602030204" charset="0"/>
@@ -5424,7 +5627,7 @@
                 <a:latin typeface="Ubuntu" panose="020B0504030602030204" charset="0"/>
                 <a:cs typeface="Ubuntu" panose="020B0504030602030204" charset="0"/>
               </a:rPr>
-              <a:t>Regression imputation involves building a regression model to predict missing values based on relationships with other variables.</a:t>
+              <a:t>Removal of missing data involves eliminating rows or columns with missing values from the dataset.</a:t>
             </a:r>
             <a:endParaRPr lang="en-US" altLang="ar-EG" sz="2400" dirty="0">
               <a:latin typeface="Ubuntu" panose="020B0504030602030204" charset="0"/>
@@ -5454,7 +5657,7 @@
                 <a:latin typeface="Ubuntu" panose="020B0504030602030204" charset="0"/>
                 <a:cs typeface="Ubuntu" panose="020B0504030602030204" charset="0"/>
               </a:rPr>
-              <a:t>Data exhibits strong relationships or correlations.</a:t>
+              <a:t>Missing data is rare and does not significantly affect the analysis.</a:t>
             </a:r>
             <a:endParaRPr lang="en-US" altLang="ar-EG" sz="2400" dirty="0">
               <a:latin typeface="Ubuntu" panose="020B0504030602030204" charset="0"/>
@@ -5468,7 +5671,7 @@
                 <a:latin typeface="Ubuntu" panose="020B0504030602030204" charset="0"/>
                 <a:cs typeface="Ubuntu" panose="020B0504030602030204" charset="0"/>
               </a:rPr>
-              <a:t>The missing values are not completely random.</a:t>
+              <a:t>Removing missing data does not lead to a loss of critical information.</a:t>
             </a:r>
             <a:endParaRPr lang="en-US" altLang="ar-EG" sz="2400" dirty="0">
               <a:latin typeface="Ubuntu" panose="020B0504030602030204" charset="0"/>
@@ -5482,7 +5685,7 @@
                 <a:latin typeface="Ubuntu" panose="020B0504030602030204" charset="0"/>
                 <a:cs typeface="Ubuntu" panose="020B0504030602030204" charset="0"/>
               </a:rPr>
-              <a:t>More advanced imputation techniques are needed to capture complex relationships.</a:t>
+              <a:t>There is no other imputation methods available to fill the gaps.</a:t>
             </a:r>
             <a:endParaRPr lang="en-US" altLang="ar-EG" sz="2400" dirty="0">
               <a:latin typeface="Ubuntu" panose="020B0504030602030204" charset="0"/>
@@ -5490,15 +5693,22 @@
             </a:endParaRPr>
           </a:p>
           <a:p>
-            <a:pPr algn="l">
+            <a:pPr marL="0" indent="0" algn="l">
               <a:buNone/>
             </a:pPr>
             <a:r>
+              <a:rPr lang="en-US" altLang="ar-EG" sz="2400" b="1" dirty="0">
+                <a:latin typeface="Ubuntu" panose="020B0504030602030204" charset="0"/>
+                <a:cs typeface="Ubuntu" panose="020B0504030602030204" charset="0"/>
+              </a:rPr>
+              <a:t>Caution: </a:t>
+            </a:r>
+            <a:r>
               <a:rPr lang="en-US" altLang="ar-EG" sz="2400" dirty="0">
                 <a:latin typeface="Ubuntu" panose="020B0504030602030204" charset="0"/>
                 <a:cs typeface="Ubuntu" panose="020B0504030602030204" charset="0"/>
               </a:rPr>
-              <a:t>It can provide accurate imputations when relationships are well-defined.</a:t>
+              <a:t>Use this method sparingly, as it can lead to loss of information and potential bias if not done thoughtfully.</a:t>
             </a:r>
             <a:endParaRPr lang="en-US" altLang="ar-EG" sz="2400" dirty="0">
               <a:latin typeface="Ubuntu" panose="020B0504030602030204" charset="0"/>
@@ -5562,12 +5772,11 @@
                 <a:cs typeface="Ubuntu" panose="020B0504030602030204" charset="0"/>
                 <a:sym typeface="+mn-ea"/>
               </a:rPr>
-              <a:t>K-Nearest Neighbors (K-NN) Imputation</a:t>
-            </a:r>
-            <a:endParaRPr lang="en-US" altLang="ar-EG" dirty="0">
-              <a:latin typeface="Ubuntu" panose="020B0504030602030204" charset="0"/>
-              <a:cs typeface="Ubuntu" panose="020B0504030602030204" charset="0"/>
-              <a:sym typeface="+mn-ea"/>
+              <a:t>Mean, Median, and Mode Imputation.</a:t>
+            </a:r>
+            <a:endParaRPr lang="en-US">
+              <a:latin typeface="Ubuntu" panose="020B0504030602030204" charset="0"/>
+              <a:cs typeface="Ubuntu" panose="020B0504030602030204" charset="0"/>
             </a:endParaRPr>
           </a:p>
         </p:txBody>
@@ -5595,7 +5804,7 @@
                 <a:latin typeface="Ubuntu" panose="020B0504030602030204" charset="0"/>
                 <a:cs typeface="Ubuntu" panose="020B0504030602030204" charset="0"/>
               </a:rPr>
-              <a:t>K-NN imputation replaces missing values with values from the nearest neighbors in a multidimensional space.</a:t>
+              <a:t>These imputation methods involve replacing missing values with the mean, median, or mode of the available data in the respective column.</a:t>
             </a:r>
             <a:endParaRPr lang="en-US" altLang="ar-EG" sz="2400" dirty="0">
               <a:latin typeface="Ubuntu" panose="020B0504030602030204" charset="0"/>
@@ -5625,7 +5834,7 @@
                 <a:latin typeface="Ubuntu" panose="020B0504030602030204" charset="0"/>
                 <a:cs typeface="Ubuntu" panose="020B0504030602030204" charset="0"/>
               </a:rPr>
-              <a:t>Data has complex relationships.</a:t>
+              <a:t>Data is approximately normally distributed.</a:t>
             </a:r>
             <a:endParaRPr lang="en-US" altLang="ar-EG" sz="2400" dirty="0">
               <a:latin typeface="Ubuntu" panose="020B0504030602030204" charset="0"/>
@@ -5639,7 +5848,7 @@
                 <a:latin typeface="Ubuntu" panose="020B0504030602030204" charset="0"/>
                 <a:cs typeface="Ubuntu" panose="020B0504030602030204" charset="0"/>
               </a:rPr>
-              <a:t>You want to consider multiple attributes when imputing values.</a:t>
+              <a:t>Missing values are missing at random and not related to the value itself.</a:t>
             </a:r>
             <a:endParaRPr lang="en-US" altLang="ar-EG" sz="2400" dirty="0">
               <a:latin typeface="Ubuntu" panose="020B0504030602030204" charset="0"/>
@@ -5653,7 +5862,7 @@
                 <a:latin typeface="Ubuntu" panose="020B0504030602030204" charset="0"/>
                 <a:cs typeface="Ubuntu" panose="020B0504030602030204" charset="0"/>
               </a:rPr>
-              <a:t>The dataset is not too large, as k-NN can be computationally intensive.</a:t>
+              <a:t>The imputed values do not significantly alter the data distribution.</a:t>
             </a:r>
             <a:endParaRPr lang="en-US" altLang="ar-EG" sz="2400" dirty="0">
               <a:latin typeface="Ubuntu" panose="020B0504030602030204" charset="0"/>
@@ -5669,7 +5878,21 @@
                 <a:latin typeface="Ubuntu" panose="020B0504030602030204" charset="0"/>
                 <a:cs typeface="Ubuntu" panose="020B0504030602030204" charset="0"/>
               </a:rPr>
-              <a:t>It takes into account the context of the data, making it suitable for a variety of situations.</a:t>
+              <a:t>Quick and simple, but can introduce bias if the data is </a:t>
+            </a:r>
+            <a:r>
+              <a:rPr lang="en-US" altLang="ar-EG" sz="2400" b="1" dirty="0">
+                <a:latin typeface="Ubuntu" panose="020B0504030602030204" charset="0"/>
+                <a:cs typeface="Ubuntu" panose="020B0504030602030204" charset="0"/>
+              </a:rPr>
+              <a:t>not normally distributed</a:t>
+            </a:r>
+            <a:r>
+              <a:rPr lang="en-US" altLang="ar-EG" sz="2400" dirty="0">
+                <a:latin typeface="Ubuntu" panose="020B0504030602030204" charset="0"/>
+                <a:cs typeface="Ubuntu" panose="020B0504030602030204" charset="0"/>
+              </a:rPr>
+              <a:t>.</a:t>
             </a:r>
             <a:endParaRPr lang="en-US" altLang="ar-EG" sz="2400" dirty="0">
               <a:latin typeface="Ubuntu" panose="020B0504030602030204" charset="0"/>
@@ -5733,7 +5956,7 @@
                 <a:cs typeface="Ubuntu" panose="020B0504030602030204" charset="0"/>
                 <a:sym typeface="+mn-ea"/>
               </a:rPr>
-              <a:t>Multivariate Imputation by Chained Equations (MICE)</a:t>
+              <a:t>Forward and Backward Fill Imputation</a:t>
             </a:r>
             <a:endParaRPr lang="en-US" altLang="ar-EG" dirty="0">
               <a:latin typeface="Ubuntu" panose="020B0504030602030204" charset="0"/>
@@ -5762,11 +5985,18 @@
               <a:buNone/>
             </a:pPr>
             <a:r>
+              <a:rPr lang="en-US" altLang="ar-EG" sz="2400" b="1" dirty="0">
+                <a:latin typeface="Ubuntu" panose="020B0504030602030204" charset="0"/>
+                <a:cs typeface="Ubuntu" panose="020B0504030602030204" charset="0"/>
+              </a:rPr>
+              <a:t>Forward fill imputation:</a:t>
+            </a:r>
+            <a:r>
               <a:rPr lang="en-US" altLang="ar-EG" sz="2400" dirty="0">
                 <a:latin typeface="Ubuntu" panose="020B0504030602030204" charset="0"/>
                 <a:cs typeface="Ubuntu" panose="020B0504030602030204" charset="0"/>
               </a:rPr>
-              <a:t>It involves imputing missing values for each variable in a dataset one at a time, in a sequence, while considering the relationships with other variables.</a:t>
+              <a:t> replaces missing values with the nearest available value that precedes the missing data.</a:t>
             </a:r>
             <a:endParaRPr lang="en-US" altLang="ar-EG" sz="2400" dirty="0">
               <a:latin typeface="Ubuntu" panose="020B0504030602030204" charset="0"/>
@@ -5782,35 +6012,14 @@
                 <a:latin typeface="Ubuntu" panose="020B0504030602030204" charset="0"/>
                 <a:cs typeface="Ubuntu" panose="020B0504030602030204" charset="0"/>
               </a:rPr>
-              <a:t>Appropriate when:</a:t>
-            </a:r>
-            <a:endParaRPr lang="en-US" altLang="ar-EG" sz="2400" b="1" dirty="0">
-              <a:latin typeface="Ubuntu" panose="020B0504030602030204" charset="0"/>
-              <a:cs typeface="Ubuntu" panose="020B0504030602030204" charset="0"/>
-            </a:endParaRPr>
-          </a:p>
-          <a:p>
-            <a:pPr algn="l"/>
+              <a:t>Backward fill imputation: </a:t>
+            </a:r>
             <a:r>
               <a:rPr lang="en-US" altLang="ar-EG" sz="2400" dirty="0">
                 <a:latin typeface="Ubuntu" panose="020B0504030602030204" charset="0"/>
                 <a:cs typeface="Ubuntu" panose="020B0504030602030204" charset="0"/>
               </a:rPr>
-              <a:t>Missing data is not missing completely at random and when univariate imputation methods may not capture complex data patterns.</a:t>
-            </a:r>
-            <a:endParaRPr lang="en-US" altLang="ar-EG" sz="2400" dirty="0">
-              <a:latin typeface="Ubuntu" panose="020B0504030602030204" charset="0"/>
-              <a:cs typeface="Ubuntu" panose="020B0504030602030204" charset="0"/>
-            </a:endParaRPr>
-          </a:p>
-          <a:p>
-            <a:pPr algn="l"/>
-            <a:r>
-              <a:rPr lang="en-US" altLang="ar-EG" sz="2400" dirty="0">
-                <a:latin typeface="Ubuntu" panose="020B0504030602030204" charset="0"/>
-                <a:cs typeface="Ubuntu" panose="020B0504030602030204" charset="0"/>
-              </a:rPr>
-              <a:t>Suitable for datasets with complex dependencies and interactions between variables.</a:t>
+              <a:t>uses the nearest available value that follows the missing data.</a:t>
             </a:r>
             <a:endParaRPr lang="en-US" altLang="ar-EG" sz="2400" dirty="0">
               <a:latin typeface="Ubuntu" panose="020B0504030602030204" charset="0"/>
@@ -5821,6 +6030,20 @@
             <a:pPr marL="0" indent="0" algn="l">
               <a:buNone/>
             </a:pPr>
+            <a:r>
+              <a:rPr lang="en-US" altLang="ar-EG" sz="2400" b="1" dirty="0">
+                <a:latin typeface="Ubuntu" panose="020B0504030602030204" charset="0"/>
+                <a:cs typeface="Ubuntu" panose="020B0504030602030204" charset="0"/>
+              </a:rPr>
+              <a:t>Appropriate when: </a:t>
+            </a:r>
+            <a:r>
+              <a:rPr lang="en-US" altLang="ar-EG" sz="2400" dirty="0">
+                <a:latin typeface="Ubuntu" panose="020B0504030602030204" charset="0"/>
+                <a:cs typeface="Ubuntu" panose="020B0504030602030204" charset="0"/>
+              </a:rPr>
+              <a:t>handling time series data where values are dependent on their chronological order.</a:t>
+            </a:r>
             <a:endParaRPr lang="en-US" altLang="ar-EG" sz="2400" dirty="0">
               <a:latin typeface="Ubuntu" panose="020B0504030602030204" charset="0"/>
               <a:cs typeface="Ubuntu" panose="020B0504030602030204" charset="0"/>
@@ -5883,7 +6106,7 @@
                 <a:cs typeface="Ubuntu" panose="020B0504030602030204" charset="0"/>
                 <a:sym typeface="+mn-ea"/>
               </a:rPr>
-              <a:t>Choosing the Right Imputation Method</a:t>
+              <a:t>Regression Imputation</a:t>
             </a:r>
             <a:endParaRPr lang="en-US" altLang="ar-EG" dirty="0">
               <a:latin typeface="Ubuntu" panose="020B0504030602030204" charset="0"/>
@@ -5908,22 +6131,45 @@
           <a:bodyPr/>
           <a:lstStyle/>
           <a:p>
-            <a:pPr marL="457200" indent="-457200" algn="l">
-              <a:buAutoNum type="arabicPeriod"/>
+            <a:pPr marL="0" indent="0" algn="l">
+              <a:buNone/>
             </a:pPr>
             <a:r>
+              <a:rPr lang="en-US" altLang="ar-EG" sz="2400" dirty="0">
+                <a:latin typeface="Ubuntu" panose="020B0504030602030204" charset="0"/>
+                <a:cs typeface="Ubuntu" panose="020B0504030602030204" charset="0"/>
+              </a:rPr>
+              <a:t>Regression imputation involves building a regression model to predict missing values based on relationships with other variables.</a:t>
+            </a:r>
+            <a:endParaRPr lang="en-US" altLang="ar-EG" sz="2400" dirty="0">
+              <a:latin typeface="Ubuntu" panose="020B0504030602030204" charset="0"/>
+              <a:cs typeface="Ubuntu" panose="020B0504030602030204" charset="0"/>
+            </a:endParaRPr>
+          </a:p>
+          <a:p>
+            <a:pPr marL="0" indent="0" algn="l">
+              <a:buNone/>
+            </a:pPr>
+            <a:r>
               <a:rPr lang="en-US" altLang="ar-EG" sz="2400" b="1" dirty="0">
                 <a:latin typeface="Ubuntu" panose="020B0504030602030204" charset="0"/>
                 <a:cs typeface="Ubuntu" panose="020B0504030602030204" charset="0"/>
               </a:rPr>
-              <a:t>Understand Your Data: </a:t>
-            </a:r>
+              <a:t>Appropriate when:</a:t>
+            </a:r>
+            <a:endParaRPr lang="en-US" altLang="ar-EG" sz="2400" b="1" dirty="0">
+              <a:latin typeface="Ubuntu" panose="020B0504030602030204" charset="0"/>
+              <a:cs typeface="Ubuntu" panose="020B0504030602030204" charset="0"/>
+            </a:endParaRPr>
+          </a:p>
+          <a:p>
+            <a:pPr algn="l"/>
             <a:r>
               <a:rPr lang="en-US" altLang="ar-EG" sz="2400" dirty="0">
                 <a:latin typeface="Ubuntu" panose="020B0504030602030204" charset="0"/>
                 <a:cs typeface="Ubuntu" panose="020B0504030602030204" charset="0"/>
               </a:rPr>
-              <a:t>Consider the type of variables (numerical, categorical, time series) and their distributions.</a:t>
+              <a:t>Data exhibits strong relationships or correlations.</a:t>
             </a:r>
             <a:endParaRPr lang="en-US" altLang="ar-EG" sz="2400" dirty="0">
               <a:latin typeface="Ubuntu" panose="020B0504030602030204" charset="0"/>
@@ -5931,230 +6177,44 @@
             </a:endParaRPr>
           </a:p>
           <a:p>
-            <a:pPr marL="457200" indent="-457200" algn="l">
-              <a:buAutoNum type="arabicPeriod"/>
+            <a:pPr algn="l"/>
+            <a:r>
+              <a:rPr lang="en-US" altLang="ar-EG" sz="2400" dirty="0">
+                <a:latin typeface="Ubuntu" panose="020B0504030602030204" charset="0"/>
+                <a:cs typeface="Ubuntu" panose="020B0504030602030204" charset="0"/>
+              </a:rPr>
+              <a:t>The missing values are not completely random.</a:t>
+            </a:r>
+            <a:endParaRPr lang="en-US" altLang="ar-EG" sz="2400" dirty="0">
+              <a:latin typeface="Ubuntu" panose="020B0504030602030204" charset="0"/>
+              <a:cs typeface="Ubuntu" panose="020B0504030602030204" charset="0"/>
+            </a:endParaRPr>
+          </a:p>
+          <a:p>
+            <a:pPr algn="l"/>
+            <a:r>
+              <a:rPr lang="en-US" altLang="ar-EG" sz="2400" dirty="0">
+                <a:latin typeface="Ubuntu" panose="020B0504030602030204" charset="0"/>
+                <a:cs typeface="Ubuntu" panose="020B0504030602030204" charset="0"/>
+              </a:rPr>
+              <a:t>More advanced imputation techniques are needed to capture complex relationships.</a:t>
+            </a:r>
+            <a:endParaRPr lang="en-US" altLang="ar-EG" sz="2400" dirty="0">
+              <a:latin typeface="Ubuntu" panose="020B0504030602030204" charset="0"/>
+              <a:cs typeface="Ubuntu" panose="020B0504030602030204" charset="0"/>
+            </a:endParaRPr>
+          </a:p>
+          <a:p>
+            <a:pPr algn="l">
+              <a:buNone/>
             </a:pPr>
             <a:r>
-              <a:rPr lang="en-US" altLang="ar-EG" sz="2400" b="1" dirty="0">
-                <a:latin typeface="Ubuntu" panose="020B0504030602030204" charset="0"/>
-                <a:cs typeface="Ubuntu" panose="020B0504030602030204" charset="0"/>
-              </a:rPr>
-              <a:t>Assess Missing Data Patterns: </a:t>
-            </a:r>
-            <a:r>
               <a:rPr lang="en-US" altLang="ar-EG" sz="2400" dirty="0">
                 <a:latin typeface="Ubuntu" panose="020B0504030602030204" charset="0"/>
                 <a:cs typeface="Ubuntu" panose="020B0504030602030204" charset="0"/>
               </a:rPr>
-              <a:t>Examine the patterns of missing data. Are the missing values missing completely at random, or missing not at random? </a:t>
-            </a:r>
-            <a:endParaRPr lang="en-US" altLang="ar-EG" sz="2400" dirty="0">
-              <a:latin typeface="Ubuntu" panose="020B0504030602030204" charset="0"/>
-              <a:cs typeface="Ubuntu" panose="020B0504030602030204" charset="0"/>
-            </a:endParaRPr>
-          </a:p>
-          <a:p>
-            <a:pPr marL="457200" indent="-457200" algn="l">
-              <a:buAutoNum type="arabicPeriod"/>
-            </a:pPr>
-            <a:r>
-              <a:rPr lang="en-US" altLang="ar-EG" sz="2400" b="1" dirty="0">
-                <a:latin typeface="Ubuntu" panose="020B0504030602030204" charset="0"/>
-                <a:cs typeface="Ubuntu" panose="020B0504030602030204" charset="0"/>
-              </a:rPr>
-              <a:t>Consider Data Type:</a:t>
-            </a:r>
-            <a:endParaRPr lang="en-US" altLang="ar-EG" sz="2400" b="1" dirty="0">
-              <a:latin typeface="Ubuntu" panose="020B0504030602030204" charset="0"/>
-              <a:cs typeface="Ubuntu" panose="020B0504030602030204" charset="0"/>
-            </a:endParaRPr>
-          </a:p>
-          <a:p>
-            <a:pPr lvl="1" algn="l"/>
-            <a:r>
-              <a:rPr lang="en-US" altLang="ar-EG" sz="2100" dirty="0">
-                <a:latin typeface="Ubuntu" panose="020B0504030602030204" charset="0"/>
-                <a:cs typeface="Ubuntu" panose="020B0504030602030204" charset="0"/>
-              </a:rPr>
-              <a:t>For </a:t>
-            </a:r>
-            <a:r>
-              <a:rPr lang="en-US" altLang="ar-EG" sz="2100" b="1" dirty="0">
-                <a:latin typeface="Ubuntu" panose="020B0504030602030204" charset="0"/>
-                <a:cs typeface="Ubuntu" panose="020B0504030602030204" charset="0"/>
-              </a:rPr>
-              <a:t>numerical data</a:t>
-            </a:r>
-            <a:r>
-              <a:rPr lang="en-US" altLang="ar-EG" sz="2100" dirty="0">
-                <a:latin typeface="Ubuntu" panose="020B0504030602030204" charset="0"/>
-                <a:cs typeface="Ubuntu" panose="020B0504030602030204" charset="0"/>
-              </a:rPr>
-              <a:t>, methods like </a:t>
-            </a:r>
-            <a:r>
-              <a:rPr lang="en-US" altLang="ar-EG" sz="2100" b="1" dirty="0">
-                <a:latin typeface="Ubuntu" panose="020B0504030602030204" charset="0"/>
-                <a:cs typeface="Ubuntu" panose="020B0504030602030204" charset="0"/>
-              </a:rPr>
-              <a:t>mean</a:t>
-            </a:r>
-            <a:r>
-              <a:rPr lang="en-US" altLang="ar-EG" sz="2100" dirty="0">
-                <a:latin typeface="Ubuntu" panose="020B0504030602030204" charset="0"/>
-                <a:cs typeface="Ubuntu" panose="020B0504030602030204" charset="0"/>
-              </a:rPr>
-              <a:t>, </a:t>
-            </a:r>
-            <a:r>
-              <a:rPr lang="en-US" altLang="ar-EG" sz="2100" b="1" dirty="0">
-                <a:latin typeface="Ubuntu" panose="020B0504030602030204" charset="0"/>
-                <a:cs typeface="Ubuntu" panose="020B0504030602030204" charset="0"/>
-              </a:rPr>
-              <a:t>median</a:t>
-            </a:r>
-            <a:r>
-              <a:rPr lang="en-US" altLang="ar-EG" sz="2100" dirty="0">
-                <a:latin typeface="Ubuntu" panose="020B0504030602030204" charset="0"/>
-                <a:cs typeface="Ubuntu" panose="020B0504030602030204" charset="0"/>
-              </a:rPr>
-              <a:t>, </a:t>
-            </a:r>
-            <a:r>
-              <a:rPr lang="en-US" altLang="ar-EG" sz="2100" b="1" dirty="0">
-                <a:latin typeface="Ubuntu" panose="020B0504030602030204" charset="0"/>
-                <a:cs typeface="Ubuntu" panose="020B0504030602030204" charset="0"/>
-              </a:rPr>
-              <a:t>mode</a:t>
-            </a:r>
-            <a:r>
-              <a:rPr lang="en-US" altLang="ar-EG" sz="2100" dirty="0">
-                <a:latin typeface="Ubuntu" panose="020B0504030602030204" charset="0"/>
-                <a:cs typeface="Ubuntu" panose="020B0504030602030204" charset="0"/>
-              </a:rPr>
-              <a:t> imputation or </a:t>
-            </a:r>
-            <a:r>
-              <a:rPr lang="en-US" altLang="ar-EG" sz="2100" b="1" dirty="0">
-                <a:latin typeface="Ubuntu" panose="020B0504030602030204" charset="0"/>
-                <a:cs typeface="Ubuntu" panose="020B0504030602030204" charset="0"/>
-              </a:rPr>
-              <a:t>regression imputation</a:t>
-            </a:r>
-            <a:r>
-              <a:rPr lang="en-US" altLang="ar-EG" sz="2100" dirty="0">
-                <a:latin typeface="Ubuntu" panose="020B0504030602030204" charset="0"/>
-                <a:cs typeface="Ubuntu" panose="020B0504030602030204" charset="0"/>
-              </a:rPr>
-              <a:t> may be suitable.</a:t>
-            </a:r>
-            <a:endParaRPr lang="en-US" altLang="ar-EG" sz="2100" dirty="0">
-              <a:latin typeface="Ubuntu" panose="020B0504030602030204" charset="0"/>
-              <a:cs typeface="Ubuntu" panose="020B0504030602030204" charset="0"/>
-            </a:endParaRPr>
-          </a:p>
-          <a:p>
-            <a:pPr lvl="1" algn="l"/>
-            <a:r>
-              <a:rPr lang="en-US" altLang="ar-EG" sz="2100" dirty="0">
-                <a:latin typeface="Ubuntu" panose="020B0504030602030204" charset="0"/>
-                <a:cs typeface="Ubuntu" panose="020B0504030602030204" charset="0"/>
-              </a:rPr>
-              <a:t>For </a:t>
-            </a:r>
-            <a:r>
-              <a:rPr lang="en-US" altLang="ar-EG" sz="2100" b="1" dirty="0">
-                <a:latin typeface="Ubuntu" panose="020B0504030602030204" charset="0"/>
-                <a:cs typeface="Ubuntu" panose="020B0504030602030204" charset="0"/>
-              </a:rPr>
-              <a:t>categorical data</a:t>
-            </a:r>
-            <a:r>
-              <a:rPr lang="en-US" altLang="ar-EG" sz="2100" dirty="0">
-                <a:latin typeface="Ubuntu" panose="020B0504030602030204" charset="0"/>
-                <a:cs typeface="Ubuntu" panose="020B0504030602030204" charset="0"/>
-              </a:rPr>
-              <a:t>, consider using </a:t>
-            </a:r>
-            <a:r>
-              <a:rPr lang="en-US" altLang="ar-EG" sz="2100" b="1" dirty="0">
-                <a:latin typeface="Ubuntu" panose="020B0504030602030204" charset="0"/>
-                <a:cs typeface="Ubuntu" panose="020B0504030602030204" charset="0"/>
-              </a:rPr>
-              <a:t>mode</a:t>
-            </a:r>
-            <a:r>
-              <a:rPr lang="en-US" altLang="ar-EG" sz="2100" dirty="0">
-                <a:latin typeface="Ubuntu" panose="020B0504030602030204" charset="0"/>
-                <a:cs typeface="Ubuntu" panose="020B0504030602030204" charset="0"/>
-              </a:rPr>
-              <a:t> imputation, </a:t>
-            </a:r>
-            <a:r>
-              <a:rPr lang="en-US" altLang="ar-EG" sz="2100" b="1" dirty="0">
-                <a:latin typeface="Ubuntu" panose="020B0504030602030204" charset="0"/>
-                <a:cs typeface="Ubuntu" panose="020B0504030602030204" charset="0"/>
-              </a:rPr>
-              <a:t>k-Nearest Neighbors (k-NN)</a:t>
-            </a:r>
-            <a:r>
-              <a:rPr lang="en-US" altLang="ar-EG" sz="2100" dirty="0">
-                <a:latin typeface="Ubuntu" panose="020B0504030602030204" charset="0"/>
-                <a:cs typeface="Ubuntu" panose="020B0504030602030204" charset="0"/>
-              </a:rPr>
-              <a:t> imputation, or other methods tailored to categorical variables.</a:t>
-            </a:r>
-            <a:endParaRPr lang="en-US" altLang="ar-EG" sz="2100" dirty="0">
-              <a:latin typeface="Ubuntu" panose="020B0504030602030204" charset="0"/>
-              <a:cs typeface="Ubuntu" panose="020B0504030602030204" charset="0"/>
-            </a:endParaRPr>
-          </a:p>
-          <a:p>
-            <a:pPr lvl="1" algn="l"/>
-            <a:r>
-              <a:rPr lang="en-US" altLang="ar-EG" sz="2100" dirty="0">
-                <a:latin typeface="Ubuntu" panose="020B0504030602030204" charset="0"/>
-                <a:cs typeface="Ubuntu" panose="020B0504030602030204" charset="0"/>
-              </a:rPr>
-              <a:t>For </a:t>
-            </a:r>
-            <a:r>
-              <a:rPr lang="en-US" altLang="ar-EG" sz="2100" b="1" dirty="0">
-                <a:latin typeface="Ubuntu" panose="020B0504030602030204" charset="0"/>
-                <a:cs typeface="Ubuntu" panose="020B0504030602030204" charset="0"/>
-              </a:rPr>
-              <a:t>time series data</a:t>
-            </a:r>
-            <a:r>
-              <a:rPr lang="en-US" altLang="ar-EG" sz="2100" dirty="0">
-                <a:latin typeface="Ubuntu" panose="020B0504030602030204" charset="0"/>
-                <a:cs typeface="Ubuntu" panose="020B0504030602030204" charset="0"/>
-              </a:rPr>
-              <a:t>, </a:t>
-            </a:r>
-            <a:r>
-              <a:rPr lang="en-US" altLang="ar-EG" sz="2100" b="1" dirty="0">
-                <a:latin typeface="Ubuntu" panose="020B0504030602030204" charset="0"/>
-                <a:cs typeface="Ubuntu" panose="020B0504030602030204" charset="0"/>
-              </a:rPr>
-              <a:t>forward and backward fill </a:t>
-            </a:r>
-            <a:r>
-              <a:rPr lang="en-US" altLang="ar-EG" sz="2100" dirty="0">
-                <a:latin typeface="Ubuntu" panose="020B0504030602030204" charset="0"/>
-                <a:cs typeface="Ubuntu" panose="020B0504030602030204" charset="0"/>
-              </a:rPr>
-              <a:t>imputation or time series modeling may be appropriate.</a:t>
-            </a:r>
-            <a:endParaRPr lang="en-US" altLang="ar-EG" sz="2100" dirty="0">
-              <a:latin typeface="Ubuntu" panose="020B0504030602030204" charset="0"/>
-              <a:cs typeface="Ubuntu" panose="020B0504030602030204" charset="0"/>
-            </a:endParaRPr>
-          </a:p>
-          <a:p>
-            <a:pPr algn="l">
-              <a:buAutoNum type="arabicPeriod"/>
-            </a:pPr>
+              <a:t>It can provide accurate imputations when relationships are well-defined.</a:t>
+            </a:r>
             <a:endParaRPr lang="en-US" altLang="ar-EG" sz="2400" dirty="0">
               <a:latin typeface="Ubuntu" panose="020B0504030602030204" charset="0"/>
               <a:cs typeface="Ubuntu" panose="020B0504030602030204" charset="0"/>
@@ -6217,7 +6277,7 @@
                 <a:cs typeface="Ubuntu" panose="020B0504030602030204" charset="0"/>
                 <a:sym typeface="+mn-ea"/>
               </a:rPr>
-              <a:t>Choosing the Right Imputation Method</a:t>
+              <a:t>K-Nearest Neighbors (K-NN) Imputation</a:t>
             </a:r>
             <a:endParaRPr lang="en-US" altLang="ar-EG" dirty="0">
               <a:latin typeface="Ubuntu" panose="020B0504030602030204" charset="0"/>
@@ -6246,60 +6306,11 @@
               <a:buNone/>
             </a:pPr>
             <a:r>
-              <a:rPr lang="en-US" altLang="ar-EG" sz="2400" b="1" dirty="0">
-                <a:latin typeface="Ubuntu" panose="020B0504030602030204" charset="0"/>
-                <a:cs typeface="Ubuntu" panose="020B0504030602030204" charset="0"/>
-              </a:rPr>
-              <a:t>4.   Evaluate Data Distribution:</a:t>
-            </a:r>
-            <a:r>
               <a:rPr lang="en-US" altLang="ar-EG" sz="2400" dirty="0">
                 <a:latin typeface="Ubuntu" panose="020B0504030602030204" charset="0"/>
                 <a:cs typeface="Ubuntu" panose="020B0504030602030204" charset="0"/>
               </a:rPr>
-              <a:t> If your data is </a:t>
-            </a:r>
-            <a:r>
-              <a:rPr lang="en-US" altLang="ar-EG" sz="2400" b="1" dirty="0">
-                <a:latin typeface="Ubuntu" panose="020B0504030602030204" charset="0"/>
-                <a:cs typeface="Ubuntu" panose="020B0504030602030204" charset="0"/>
-              </a:rPr>
-              <a:t>highly skewed</a:t>
-            </a:r>
-            <a:r>
-              <a:rPr lang="en-US" altLang="ar-EG" sz="2400" dirty="0">
-                <a:latin typeface="Ubuntu" panose="020B0504030602030204" charset="0"/>
-                <a:cs typeface="Ubuntu" panose="020B0504030602030204" charset="0"/>
-              </a:rPr>
-              <a:t> or has </a:t>
-            </a:r>
-            <a:r>
-              <a:rPr lang="en-US" altLang="ar-EG" sz="2400" b="1" dirty="0">
-                <a:latin typeface="Ubuntu" panose="020B0504030602030204" charset="0"/>
-                <a:cs typeface="Ubuntu" panose="020B0504030602030204" charset="0"/>
-              </a:rPr>
-              <a:t>outliers</a:t>
-            </a:r>
-            <a:r>
-              <a:rPr lang="en-US" altLang="ar-EG" sz="2400" dirty="0">
-                <a:latin typeface="Ubuntu" panose="020B0504030602030204" charset="0"/>
-                <a:cs typeface="Ubuntu" panose="020B0504030602030204" charset="0"/>
-              </a:rPr>
-              <a:t>, be cautious about using </a:t>
-            </a:r>
-            <a:r>
-              <a:rPr lang="en-US" altLang="ar-EG" sz="2400" b="1" dirty="0">
-                <a:latin typeface="Ubuntu" panose="020B0504030602030204" charset="0"/>
-                <a:cs typeface="Ubuntu" panose="020B0504030602030204" charset="0"/>
-              </a:rPr>
-              <a:t>mean</a:t>
-            </a:r>
-            <a:r>
-              <a:rPr lang="en-US" altLang="ar-EG" sz="2400" dirty="0">
-                <a:latin typeface="Ubuntu" panose="020B0504030602030204" charset="0"/>
-                <a:cs typeface="Ubuntu" panose="020B0504030602030204" charset="0"/>
-              </a:rPr>
-              <a:t> imputation, which can be sensitive to extreme values</a:t>
+              <a:t>K-NN imputation replaces missing values with values from the nearest neighbors in a multidimensional space.</a:t>
             </a:r>
             <a:endParaRPr lang="en-US" altLang="ar-EG" sz="2400" dirty="0">
               <a:latin typeface="Ubuntu" panose="020B0504030602030204" charset="0"/>
@@ -6315,42 +6326,49 @@
                 <a:latin typeface="Ubuntu" panose="020B0504030602030204" charset="0"/>
                 <a:cs typeface="Ubuntu" panose="020B0504030602030204" charset="0"/>
               </a:rPr>
-              <a:t>5.   Examine Data Relationships:</a:t>
-            </a:r>
+              <a:t>Appropriate when:</a:t>
+            </a:r>
+            <a:endParaRPr lang="en-US" altLang="ar-EG" sz="2400" b="1" dirty="0">
+              <a:latin typeface="Ubuntu" panose="020B0504030602030204" charset="0"/>
+              <a:cs typeface="Ubuntu" panose="020B0504030602030204" charset="0"/>
+            </a:endParaRPr>
+          </a:p>
+          <a:p>
+            <a:pPr algn="l"/>
             <a:r>
               <a:rPr lang="en-US" altLang="ar-EG" sz="2400" dirty="0">
                 <a:latin typeface="Ubuntu" panose="020B0504030602030204" charset="0"/>
                 <a:cs typeface="Ubuntu" panose="020B0504030602030204" charset="0"/>
               </a:rPr>
-              <a:t> If your dataset has strong correlations or dependencies between variables, methods like </a:t>
-            </a:r>
-            <a:r>
-              <a:rPr lang="en-US" altLang="ar-EG" sz="2400" b="1" dirty="0">
-                <a:latin typeface="Ubuntu" panose="020B0504030602030204" charset="0"/>
-                <a:cs typeface="Ubuntu" panose="020B0504030602030204" charset="0"/>
-              </a:rPr>
-              <a:t>regression imputation</a:t>
-            </a:r>
+              <a:t>Data has complex relationships.</a:t>
+            </a:r>
+            <a:endParaRPr lang="en-US" altLang="ar-EG" sz="2400" dirty="0">
+              <a:latin typeface="Ubuntu" panose="020B0504030602030204" charset="0"/>
+              <a:cs typeface="Ubuntu" panose="020B0504030602030204" charset="0"/>
+            </a:endParaRPr>
+          </a:p>
+          <a:p>
+            <a:pPr algn="l"/>
             <a:r>
               <a:rPr lang="en-US" altLang="ar-EG" sz="2400" dirty="0">
                 <a:latin typeface="Ubuntu" panose="020B0504030602030204" charset="0"/>
                 <a:cs typeface="Ubuntu" panose="020B0504030602030204" charset="0"/>
               </a:rPr>
-              <a:t> or </a:t>
-            </a:r>
-            <a:r>
-              <a:rPr lang="en-US" altLang="ar-EG" sz="2400" b="1" dirty="0">
-                <a:latin typeface="Ubuntu" panose="020B0504030602030204" charset="0"/>
-                <a:cs typeface="Ubuntu" panose="020B0504030602030204" charset="0"/>
-              </a:rPr>
-              <a:t>k-Nearest Neighbors (k-NN)</a:t>
-            </a:r>
+              <a:t>You want to consider multiple attributes when imputing values.</a:t>
+            </a:r>
+            <a:endParaRPr lang="en-US" altLang="ar-EG" sz="2400" dirty="0">
+              <a:latin typeface="Ubuntu" panose="020B0504030602030204" charset="0"/>
+              <a:cs typeface="Ubuntu" panose="020B0504030602030204" charset="0"/>
+            </a:endParaRPr>
+          </a:p>
+          <a:p>
+            <a:pPr algn="l"/>
             <a:r>
               <a:rPr lang="en-US" altLang="ar-EG" sz="2400" dirty="0">
                 <a:latin typeface="Ubuntu" panose="020B0504030602030204" charset="0"/>
                 <a:cs typeface="Ubuntu" panose="020B0504030602030204" charset="0"/>
               </a:rPr>
-              <a:t> may be more appropriate.</a:t>
+              <a:t>The dataset is not too large, as k-NN can be computationally intensive.</a:t>
             </a:r>
             <a:endParaRPr lang="en-US" altLang="ar-EG" sz="2400" dirty="0">
               <a:latin typeface="Ubuntu" panose="020B0504030602030204" charset="0"/>
@@ -6362,74 +6380,11 @@
               <a:buNone/>
             </a:pPr>
             <a:r>
-              <a:rPr lang="en-US" altLang="ar-EG" sz="2400" b="1" dirty="0">
-                <a:latin typeface="Ubuntu" panose="020B0504030602030204" charset="0"/>
-                <a:cs typeface="Ubuntu" panose="020B0504030602030204" charset="0"/>
-              </a:rPr>
-              <a:t>6.   Think About Sample Size:</a:t>
-            </a:r>
-            <a:r>
               <a:rPr lang="en-US" altLang="ar-EG" sz="2400" dirty="0">
                 <a:latin typeface="Ubuntu" panose="020B0504030602030204" charset="0"/>
                 <a:cs typeface="Ubuntu" panose="020B0504030602030204" charset="0"/>
               </a:rPr>
-              <a:t> If your dataset has a </a:t>
-            </a:r>
-            <a:r>
-              <a:rPr lang="en-US" altLang="ar-EG" sz="2400" b="1" dirty="0">
-                <a:latin typeface="Ubuntu" panose="020B0504030602030204" charset="0"/>
-                <a:cs typeface="Ubuntu" panose="020B0504030602030204" charset="0"/>
-              </a:rPr>
-              <a:t>large </a:t>
-            </a:r>
-            <a:r>
-              <a:rPr lang="en-US" altLang="ar-EG" sz="2400" dirty="0">
-                <a:latin typeface="Ubuntu" panose="020B0504030602030204" charset="0"/>
-                <a:cs typeface="Ubuntu" panose="020B0504030602030204" charset="0"/>
-              </a:rPr>
-              <a:t>number of </a:t>
-            </a:r>
-            <a:r>
-              <a:rPr lang="en-US" altLang="ar-EG" sz="2400" b="1" dirty="0">
-                <a:latin typeface="Ubuntu" panose="020B0504030602030204" charset="0"/>
-                <a:cs typeface="Ubuntu" panose="020B0504030602030204" charset="0"/>
-              </a:rPr>
-              <a:t>missing values</a:t>
-            </a:r>
-            <a:r>
-              <a:rPr lang="en-US" altLang="ar-EG" sz="2400" dirty="0">
-                <a:latin typeface="Ubuntu" panose="020B0504030602030204" charset="0"/>
-                <a:cs typeface="Ubuntu" panose="020B0504030602030204" charset="0"/>
-              </a:rPr>
-              <a:t> for a particular variable, simple imputation methods like mean imputation may be less accurate. In such cases, more advanced imputation methods, such as</a:t>
-            </a:r>
-            <a:r>
-              <a:rPr lang="en-US" altLang="ar-EG" sz="2400" b="1" dirty="0">
-                <a:latin typeface="Ubuntu" panose="020B0504030602030204" charset="0"/>
-                <a:cs typeface="Ubuntu" panose="020B0504030602030204" charset="0"/>
-              </a:rPr>
-              <a:t> regression</a:t>
-            </a:r>
-            <a:r>
-              <a:rPr lang="en-US" altLang="ar-EG" sz="2400" dirty="0">
-                <a:latin typeface="Ubuntu" panose="020B0504030602030204" charset="0"/>
-                <a:cs typeface="Ubuntu" panose="020B0504030602030204" charset="0"/>
-              </a:rPr>
-              <a:t> or</a:t>
-            </a:r>
-            <a:r>
-              <a:rPr lang="en-US" altLang="ar-EG" sz="2400" b="1" dirty="0">
-                <a:latin typeface="Ubuntu" panose="020B0504030602030204" charset="0"/>
-                <a:cs typeface="Ubuntu" panose="020B0504030602030204" charset="0"/>
-              </a:rPr>
-              <a:t> k-NN</a:t>
-            </a:r>
-            <a:r>
-              <a:rPr lang="en-US" altLang="ar-EG" sz="2400" dirty="0">
-                <a:latin typeface="Ubuntu" panose="020B0504030602030204" charset="0"/>
-                <a:cs typeface="Ubuntu" panose="020B0504030602030204" charset="0"/>
-              </a:rPr>
-              <a:t>, can yield better results.</a:t>
+              <a:t>It takes into account the context of the data, making it suitable for a variety of situations.</a:t>
             </a:r>
             <a:endParaRPr lang="en-US" altLang="ar-EG" sz="2400" dirty="0">
               <a:latin typeface="Ubuntu" panose="020B0504030602030204" charset="0"/>
@@ -6493,7 +6448,7 @@
                 <a:cs typeface="Ubuntu" panose="020B0504030602030204" charset="0"/>
                 <a:sym typeface="+mn-ea"/>
               </a:rPr>
-              <a:t>Lab</a:t>
+              <a:t>Multivariate Imputation by Chained Equations (MICE)</a:t>
             </a:r>
             <a:endParaRPr lang="en-US" altLang="ar-EG" dirty="0">
               <a:latin typeface="Ubuntu" panose="020B0504030602030204" charset="0"/>
@@ -6525,9 +6480,8 @@
               <a:rPr lang="en-US" altLang="ar-EG" sz="2400" dirty="0">
                 <a:latin typeface="Ubuntu" panose="020B0504030602030204" charset="0"/>
                 <a:cs typeface="Ubuntu" panose="020B0504030602030204" charset="0"/>
-                <a:sym typeface="+mn-ea"/>
-              </a:rPr>
-              <a:t>Open Juypter Notebooks for session 04 to cover this topics in practice:</a:t>
+              </a:rPr>
+              <a:t>It involves imputing missing values for each variable in a dataset one at a time, in a sequence, while considering the relationships with other variables.</a:t>
             </a:r>
             <a:endParaRPr lang="en-US" altLang="ar-EG" sz="2400" dirty="0">
               <a:latin typeface="Ubuntu" panose="020B0504030602030204" charset="0"/>
@@ -6535,19 +6489,33 @@
             </a:endParaRPr>
           </a:p>
           <a:p>
+            <a:pPr marL="0" indent="0" algn="l">
+              <a:buNone/>
+            </a:pPr>
+            <a:r>
+              <a:rPr lang="en-US" altLang="ar-EG" sz="2400" b="1" dirty="0">
+                <a:latin typeface="Ubuntu" panose="020B0504030602030204" charset="0"/>
+                <a:cs typeface="Ubuntu" panose="020B0504030602030204" charset="0"/>
+              </a:rPr>
+              <a:t>Appropriate when:</a:t>
+            </a:r>
+            <a:endParaRPr lang="en-US" altLang="ar-EG" sz="2400" b="1" dirty="0">
+              <a:latin typeface="Ubuntu" panose="020B0504030602030204" charset="0"/>
+              <a:cs typeface="Ubuntu" panose="020B0504030602030204" charset="0"/>
+            </a:endParaRPr>
+          </a:p>
+          <a:p>
             <a:pPr algn="l"/>
             <a:r>
               <a:rPr lang="en-US" altLang="ar-EG" sz="2400" dirty="0">
                 <a:latin typeface="Ubuntu" panose="020B0504030602030204" charset="0"/>
                 <a:cs typeface="Ubuntu" panose="020B0504030602030204" charset="0"/>
-                <a:sym typeface="+mn-ea"/>
-              </a:rPr>
-              <a:t>Recap on SQLite</a:t>
+              </a:rPr>
+              <a:t>Missing data is not missing completely at random and when univariate imputation methods may not capture complex data patterns.</a:t>
             </a:r>
             <a:endParaRPr lang="en-US" altLang="ar-EG" sz="2400" dirty="0">
               <a:latin typeface="Ubuntu" panose="020B0504030602030204" charset="0"/>
               <a:cs typeface="Ubuntu" panose="020B0504030602030204" charset="0"/>
-              <a:sym typeface="+mn-ea"/>
             </a:endParaRPr>
           </a:p>
           <a:p>
@@ -6556,9 +6524,8 @@
               <a:rPr lang="en-US" altLang="ar-EG" sz="2400" dirty="0">
                 <a:latin typeface="Ubuntu" panose="020B0504030602030204" charset="0"/>
                 <a:cs typeface="Ubuntu" panose="020B0504030602030204" charset="0"/>
-                <a:sym typeface="+mn-ea"/>
-              </a:rPr>
-              <a:t>Data exploration using pandas.</a:t>
+              </a:rPr>
+              <a:t>Suitable for datasets with complex dependencies and interactions between variables.</a:t>
             </a:r>
             <a:endParaRPr lang="en-US" altLang="ar-EG" sz="2400" dirty="0">
               <a:latin typeface="Ubuntu" panose="020B0504030602030204" charset="0"/>
@@ -6566,30 +6533,9 @@
             </a:endParaRPr>
           </a:p>
           <a:p>
-            <a:pPr algn="l"/>
-            <a:r>
-              <a:rPr lang="en-US" altLang="ar-EG" sz="2400" dirty="0">
-                <a:latin typeface="Ubuntu" panose="020B0504030602030204" charset="0"/>
-                <a:cs typeface="Ubuntu" panose="020B0504030602030204" charset="0"/>
-                <a:sym typeface="+mn-ea"/>
-              </a:rPr>
-              <a:t>Data visualization using matplotlib.</a:t>
-            </a:r>
-            <a:endParaRPr lang="en-US" altLang="ar-EG" sz="2400" dirty="0">
-              <a:latin typeface="Ubuntu" panose="020B0504030602030204" charset="0"/>
-              <a:cs typeface="Ubuntu" panose="020B0504030602030204" charset="0"/>
-              <a:sym typeface="+mn-ea"/>
-            </a:endParaRPr>
-          </a:p>
-          <a:p>
-            <a:pPr algn="l"/>
-            <a:r>
-              <a:rPr lang="en-US" altLang="ar-EG" sz="2400" dirty="0">
-                <a:latin typeface="Ubuntu" panose="020B0504030602030204" charset="0"/>
-                <a:cs typeface="Ubuntu" panose="020B0504030602030204" charset="0"/>
-              </a:rPr>
-              <a:t>Handle missing values</a:t>
-            </a:r>
+            <a:pPr marL="0" indent="0" algn="l">
+              <a:buNone/>
+            </a:pPr>
             <a:endParaRPr lang="en-US" altLang="ar-EG" sz="2400" dirty="0">
               <a:latin typeface="Ubuntu" panose="020B0504030602030204" charset="0"/>
               <a:cs typeface="Ubuntu" panose="020B0504030602030204" charset="0"/>
@@ -6651,7 +6597,7 @@
                 <a:latin typeface="Ubuntu" panose="020B0504030602030204" charset="0"/>
                 <a:cs typeface="Ubuntu" panose="020B0504030602030204" charset="0"/>
               </a:rPr>
-              <a:t>References</a:t>
+              <a:t>Outline</a:t>
             </a:r>
             <a:endParaRPr lang="en-US">
               <a:latin typeface="Ubuntu" panose="020B0504030602030204" charset="0"/>
@@ -6675,48 +6621,134 @@
           <a:bodyPr/>
           <a:lstStyle/>
           <a:p>
-            <a:pPr algn="l"/>
-            <a:r>
-              <a:rPr lang="en-US" sz="2400" dirty="0">
-                <a:latin typeface="Ubuntu" panose="020B0504030602030204" charset="0"/>
-                <a:cs typeface="Ubuntu" panose="020B0504030602030204" charset="0"/>
-                <a:hlinkClick r:id="rId1" tooltip="" action="ppaction://hlinkfile"/>
-              </a:rPr>
-              <a:t>https://www.linkedin.com/pulse/importance-data-quality-analytics-brittsimperial/</a:t>
-            </a:r>
-            <a:endParaRPr lang="en-US" sz="2400" dirty="0">
-              <a:latin typeface="Ubuntu" panose="020B0504030602030204" charset="0"/>
-              <a:cs typeface="Ubuntu" panose="020B0504030602030204" charset="0"/>
-              <a:hlinkClick r:id="rId1" tooltip="" action="ppaction://hlinkfile"/>
-            </a:endParaRPr>
-          </a:p>
-          <a:p>
-            <a:pPr algn="l"/>
-            <a:r>
-              <a:rPr lang="en-US" sz="2400" dirty="0">
-                <a:latin typeface="Ubuntu" panose="020B0504030602030204" charset="0"/>
-                <a:cs typeface="Ubuntu" panose="020B0504030602030204" charset="0"/>
-                <a:hlinkClick r:id="rId2" tooltip="" action="ppaction://hlinkfile"/>
-              </a:rPr>
-              <a:t>https://www.sagacitysolutions.co.uk/about/news-and-blog/what-is-data-quality/</a:t>
-            </a:r>
-            <a:endParaRPr lang="en-US" sz="2400" dirty="0">
-              <a:latin typeface="Ubuntu" panose="020B0504030602030204" charset="0"/>
-              <a:cs typeface="Ubuntu" panose="020B0504030602030204" charset="0"/>
-              <a:hlinkClick r:id="rId2" tooltip="" action="ppaction://hlinkfile"/>
-            </a:endParaRPr>
-          </a:p>
-          <a:p>
-            <a:pPr algn="l"/>
-            <a:r>
-              <a:rPr lang="en-US" sz="2400" dirty="0">
-                <a:latin typeface="Ubuntu" panose="020B0504030602030204" charset="0"/>
-                <a:cs typeface="Ubuntu" panose="020B0504030602030204" charset="0"/>
-                <a:hlinkClick r:id="rId3" tooltip="" action="ppaction://hlinkfile"/>
-              </a:rPr>
-              <a:t>https://www.kaggle.com/code/parulpandey/a-guide-to-handling-missing-values-in-python?scriptVersionId=38521662 </a:t>
-            </a:r>
-            <a:endParaRPr lang="en-US" sz="2400" dirty="0">
+            <a:pPr marL="457200" indent="-457200" algn="l">
+              <a:buFont typeface="+mj-lt"/>
+              <a:buAutoNum type="arabicPeriod"/>
+            </a:pPr>
+            <a:r>
+              <a:rPr lang="en-US" altLang="ar-EG" sz="2400" dirty="0">
+                <a:solidFill>
+                  <a:schemeClr val="bg2">
+                    <a:lumMod val="60000"/>
+                    <a:lumOff val="40000"/>
+                  </a:schemeClr>
+                </a:solidFill>
+                <a:latin typeface="Ubuntu" panose="020B0504030602030204" charset="0"/>
+                <a:cs typeface="Ubuntu" panose="020B0504030602030204" charset="0"/>
+              </a:rPr>
+              <a:t>Tools</a:t>
+            </a:r>
+            <a:endParaRPr lang="en-US" altLang="ar-EG" sz="2400" dirty="0">
+              <a:solidFill>
+                <a:schemeClr val="bg2">
+                  <a:lumMod val="60000"/>
+                  <a:lumOff val="40000"/>
+                </a:schemeClr>
+              </a:solidFill>
+              <a:latin typeface="Ubuntu" panose="020B0504030602030204" charset="0"/>
+              <a:cs typeface="Ubuntu" panose="020B0504030602030204" charset="0"/>
+            </a:endParaRPr>
+          </a:p>
+          <a:p>
+            <a:pPr marL="457200" indent="-457200" algn="l">
+              <a:buFont typeface="+mj-lt"/>
+              <a:buAutoNum type="arabicPeriod"/>
+            </a:pPr>
+            <a:r>
+              <a:rPr lang="en-US" altLang="ar-EG" sz="2400" dirty="0">
+                <a:solidFill>
+                  <a:schemeClr val="bg2">
+                    <a:lumMod val="60000"/>
+                    <a:lumOff val="40000"/>
+                  </a:schemeClr>
+                </a:solidFill>
+                <a:latin typeface="Ubuntu" panose="020B0504030602030204" charset="0"/>
+                <a:cs typeface="Ubuntu" panose="020B0504030602030204" charset="0"/>
+              </a:rPr>
+              <a:t>Importance of High Quality Data</a:t>
+            </a:r>
+            <a:endParaRPr lang="en-US" altLang="ar-EG" sz="2400" dirty="0">
+              <a:solidFill>
+                <a:schemeClr val="bg2">
+                  <a:lumMod val="60000"/>
+                  <a:lumOff val="40000"/>
+                </a:schemeClr>
+              </a:solidFill>
+              <a:latin typeface="Ubuntu" panose="020B0504030602030204" charset="0"/>
+              <a:cs typeface="Ubuntu" panose="020B0504030602030204" charset="0"/>
+            </a:endParaRPr>
+          </a:p>
+          <a:p>
+            <a:pPr marL="457200" indent="-457200" algn="l">
+              <a:buFont typeface="+mj-lt"/>
+              <a:buAutoNum type="arabicPeriod"/>
+            </a:pPr>
+            <a:r>
+              <a:rPr lang="en-US" altLang="ar-EG" sz="2400" dirty="0">
+                <a:solidFill>
+                  <a:schemeClr val="bg2">
+                    <a:lumMod val="60000"/>
+                    <a:lumOff val="40000"/>
+                  </a:schemeClr>
+                </a:solidFill>
+                <a:latin typeface="Ubuntu" panose="020B0504030602030204" charset="0"/>
+                <a:cs typeface="Ubuntu" panose="020B0504030602030204" charset="0"/>
+              </a:rPr>
+              <a:t>Handle Missing Values</a:t>
+            </a:r>
+            <a:endParaRPr lang="en-US" altLang="ar-EG" sz="2400" dirty="0">
+              <a:solidFill>
+                <a:schemeClr val="bg2">
+                  <a:lumMod val="60000"/>
+                  <a:lumOff val="40000"/>
+                </a:schemeClr>
+              </a:solidFill>
+              <a:latin typeface="Ubuntu" panose="020B0504030602030204" charset="0"/>
+              <a:cs typeface="Ubuntu" panose="020B0504030602030204" charset="0"/>
+            </a:endParaRPr>
+          </a:p>
+          <a:p>
+            <a:pPr marL="457200" indent="-457200" algn="l">
+              <a:buFont typeface="+mj-lt"/>
+              <a:buAutoNum type="arabicPeriod"/>
+            </a:pPr>
+            <a:r>
+              <a:rPr lang="en-US" altLang="ar-EG" sz="2400" dirty="0">
+                <a:latin typeface="Ubuntu" panose="020B0504030602030204" charset="0"/>
+                <a:cs typeface="Ubuntu" panose="020B0504030602030204" charset="0"/>
+              </a:rPr>
+              <a:t>Choosing the Right Imputation Method</a:t>
+            </a:r>
+            <a:endParaRPr lang="en-US" altLang="ar-EG" sz="2400" dirty="0">
+              <a:latin typeface="Ubuntu" panose="020B0504030602030204" charset="0"/>
+              <a:cs typeface="Ubuntu" panose="020B0504030602030204" charset="0"/>
+            </a:endParaRPr>
+          </a:p>
+          <a:p>
+            <a:pPr marL="457200" indent="-457200" algn="l">
+              <a:buFont typeface="+mj-lt"/>
+              <a:buAutoNum type="arabicPeriod"/>
+            </a:pPr>
+            <a:r>
+              <a:rPr lang="en-US" altLang="ar-EG" sz="2400" dirty="0">
+                <a:solidFill>
+                  <a:schemeClr val="bg2">
+                    <a:lumMod val="60000"/>
+                    <a:lumOff val="40000"/>
+                  </a:schemeClr>
+                </a:solidFill>
+                <a:latin typeface="Ubuntu" panose="020B0504030602030204" charset="0"/>
+                <a:cs typeface="Ubuntu" panose="020B0504030602030204" charset="0"/>
+              </a:rPr>
+              <a:t>Lab</a:t>
+            </a:r>
+            <a:endParaRPr lang="en-US" altLang="ar-EG" sz="2400" dirty="0">
+              <a:solidFill>
+                <a:schemeClr val="bg2">
+                  <a:lumMod val="60000"/>
+                  <a:lumOff val="40000"/>
+                </a:schemeClr>
+              </a:solidFill>
               <a:latin typeface="Ubuntu" panose="020B0504030602030204" charset="0"/>
               <a:cs typeface="Ubuntu" panose="020B0504030602030204" charset="0"/>
             </a:endParaRPr>
@@ -6728,6 +6760,14 @@
   <p:clrMapOvr>
     <a:masterClrMapping/>
   </p:clrMapOvr>
+  <mc:AlternateContent xmlns:mc="http://schemas.openxmlformats.org/markup-compatibility/2006">
+    <mc:Choice xmlns:p14="http://schemas.microsoft.com/office/powerpoint/2010/main" Requires="p14">
+      <p:transition spd="slow" p14:dur="1200"/>
+    </mc:Choice>
+    <mc:Fallback>
+      <p:transition spd="slow"/>
+    </mc:Fallback>
+  </mc:AlternateContent>
 </p:sld>
 </file>
 
@@ -6758,87 +6798,293 @@
             <p:ph type="title"/>
           </p:nvPr>
         </p:nvSpPr>
-        <p:spPr>
-          <a:xfrm>
-            <a:off x="609600" y="1556385"/>
-            <a:ext cx="10972800" cy="1511935"/>
-          </a:xfrm>
-        </p:spPr>
-        <p:txBody>
-          <a:bodyPr/>
-          <a:lstStyle/>
-          <a:p>
-            <a:pPr algn="ctr">
-              <a:lnSpc>
-                <a:spcPct val="250000"/>
-              </a:lnSpc>
+        <p:spPr/>
+        <p:txBody>
+          <a:bodyPr/>
+          <a:lstStyle/>
+          <a:p>
+            <a:pPr algn="l"/>
+            <a:r>
+              <a:rPr lang="en-US" altLang="ar-EG" dirty="0">
+                <a:latin typeface="Ubuntu" panose="020B0504030602030204" charset="0"/>
+                <a:cs typeface="Ubuntu" panose="020B0504030602030204" charset="0"/>
+                <a:sym typeface="+mn-ea"/>
+              </a:rPr>
+              <a:t>Choosing the Right Imputation Method</a:t>
+            </a:r>
+            <a:endParaRPr lang="en-US" altLang="ar-EG" dirty="0">
+              <a:latin typeface="Ubuntu" panose="020B0504030602030204" charset="0"/>
+              <a:cs typeface="Ubuntu" panose="020B0504030602030204" charset="0"/>
+              <a:sym typeface="+mn-ea"/>
+            </a:endParaRPr>
+          </a:p>
+        </p:txBody>
+      </p:sp>
+      <p:sp>
+        <p:nvSpPr>
+          <p:cNvPr id="3" name="Content Placeholder 2"/>
+          <p:cNvSpPr>
+            <a:spLocks noGrp="1"/>
+          </p:cNvSpPr>
+          <p:nvPr>
+            <p:ph idx="1"/>
+          </p:nvPr>
+        </p:nvSpPr>
+        <p:spPr/>
+        <p:txBody>
+          <a:bodyPr/>
+          <a:lstStyle/>
+          <a:p>
+            <a:pPr marL="457200" indent="-457200" algn="l">
+              <a:buAutoNum type="arabicPeriod"/>
             </a:pPr>
             <a:r>
-              <a:rPr lang="en-US">
-                <a:latin typeface="Ubuntu" panose="020B0504030602030204" charset="0"/>
-                <a:cs typeface="Ubuntu" panose="020B0504030602030204" charset="0"/>
-              </a:rPr>
-              <a:t>Thanks</a:t>
-            </a:r>
-            <a:endParaRPr lang="en-US">
-              <a:latin typeface="Ubuntu" panose="020B0504030602030204" charset="0"/>
-              <a:cs typeface="Ubuntu" panose="020B0504030602030204" charset="0"/>
-            </a:endParaRPr>
-          </a:p>
-        </p:txBody>
-      </p:sp>
-      <p:sp>
-        <p:nvSpPr>
-          <p:cNvPr id="3" name="Content Placeholder 2"/>
-          <p:cNvSpPr>
-            <a:spLocks noGrp="1"/>
-          </p:cNvSpPr>
-          <p:nvPr>
-            <p:ph idx="1"/>
-          </p:nvPr>
-        </p:nvSpPr>
-        <p:spPr>
-          <a:xfrm>
-            <a:off x="609600" y="3178175"/>
-            <a:ext cx="10972800" cy="2948305"/>
-          </a:xfrm>
-        </p:spPr>
-        <p:txBody>
-          <a:bodyPr/>
-          <a:lstStyle/>
-          <a:p>
-            <a:pPr marL="0" indent="0" algn="ctr">
-              <a:buNone/>
+              <a:rPr lang="en-US" altLang="ar-EG" sz="2400" b="1" dirty="0">
+                <a:latin typeface="Ubuntu" panose="020B0504030602030204" charset="0"/>
+                <a:cs typeface="Ubuntu" panose="020B0504030602030204" charset="0"/>
+              </a:rPr>
+              <a:t>Understand Your Data: </a:t>
+            </a:r>
+            <a:r>
+              <a:rPr lang="en-US" altLang="ar-EG" sz="2400" dirty="0">
+                <a:latin typeface="Ubuntu" panose="020B0504030602030204" charset="0"/>
+                <a:cs typeface="Ubuntu" panose="020B0504030602030204" charset="0"/>
+              </a:rPr>
+              <a:t>Consider the type of variables (numerical, categorical, time series) and their distributions.</a:t>
+            </a:r>
+            <a:endParaRPr lang="en-US" altLang="ar-EG" sz="2400" dirty="0">
+              <a:latin typeface="Ubuntu" panose="020B0504030602030204" charset="0"/>
+              <a:cs typeface="Ubuntu" panose="020B0504030602030204" charset="0"/>
+            </a:endParaRPr>
+          </a:p>
+          <a:p>
+            <a:pPr marL="457200" indent="-457200" algn="l">
+              <a:buAutoNum type="arabicPeriod"/>
             </a:pPr>
             <a:r>
-              <a:rPr lang="en-US" sz="2400">
-                <a:latin typeface="Ubuntu" panose="020B0504030602030204" charset="0"/>
-                <a:cs typeface="Ubuntu" panose="020B0504030602030204" charset="0"/>
-              </a:rPr>
-              <a:t>Please keep updated: </a:t>
-            </a:r>
-            <a:endParaRPr lang="en-US" sz="2400">
-              <a:latin typeface="Ubuntu" panose="020B0504030602030204" charset="0"/>
-              <a:cs typeface="Ubuntu" panose="020B0504030602030204" charset="0"/>
-            </a:endParaRPr>
-          </a:p>
-          <a:p>
-            <a:pPr marL="0" indent="0" algn="ctr">
-              <a:buNone/>
+              <a:rPr lang="en-US" altLang="ar-EG" sz="2400" b="1" dirty="0">
+                <a:latin typeface="Ubuntu" panose="020B0504030602030204" charset="0"/>
+                <a:cs typeface="Ubuntu" panose="020B0504030602030204" charset="0"/>
+              </a:rPr>
+              <a:t>Assess Missing Data Patterns: </a:t>
+            </a:r>
+            <a:r>
+              <a:rPr lang="en-US" altLang="ar-EG" sz="2400" dirty="0">
+                <a:latin typeface="Ubuntu" panose="020B0504030602030204" charset="0"/>
+                <a:cs typeface="Ubuntu" panose="020B0504030602030204" charset="0"/>
+              </a:rPr>
+              <a:t>Examine the patterns of missing data. Are the missing values missing completely at random, or missing not at random? </a:t>
+            </a:r>
+            <a:endParaRPr lang="en-US" altLang="ar-EG" sz="2400" dirty="0">
+              <a:latin typeface="Ubuntu" panose="020B0504030602030204" charset="0"/>
+              <a:cs typeface="Ubuntu" panose="020B0504030602030204" charset="0"/>
+            </a:endParaRPr>
+          </a:p>
+          <a:p>
+            <a:pPr marL="457200" indent="-457200" algn="l">
+              <a:buAutoNum type="arabicPeriod"/>
             </a:pPr>
             <a:r>
-              <a:rPr lang="en-US" sz="2400">
-                <a:latin typeface="Ubuntu" panose="020B0504030602030204" charset="0"/>
-                <a:cs typeface="Ubuntu" panose="020B0504030602030204" charset="0"/>
-                <a:sym typeface="+mn-ea"/>
-                <a:hlinkClick r:id="rId1" action="ppaction://hlinkfile"/>
-              </a:rPr>
-              <a:t>https://github.com/kershrita/IEEE-Data-Science</a:t>
-            </a:r>
-            <a:endParaRPr lang="en-US" sz="2400">
-              <a:latin typeface="Ubuntu" panose="020B0504030602030204" charset="0"/>
-              <a:cs typeface="Ubuntu" panose="020B0504030602030204" charset="0"/>
-              <a:sym typeface="+mn-ea"/>
+              <a:rPr lang="en-US" altLang="ar-EG" sz="2400" b="1" dirty="0">
+                <a:latin typeface="Ubuntu" panose="020B0504030602030204" charset="0"/>
+                <a:cs typeface="Ubuntu" panose="020B0504030602030204" charset="0"/>
+              </a:rPr>
+              <a:t>Consider Data Type:</a:t>
+            </a:r>
+            <a:endParaRPr lang="en-US" altLang="ar-EG" sz="2400" b="1" dirty="0">
+              <a:latin typeface="Ubuntu" panose="020B0504030602030204" charset="0"/>
+              <a:cs typeface="Ubuntu" panose="020B0504030602030204" charset="0"/>
+            </a:endParaRPr>
+          </a:p>
+          <a:p>
+            <a:pPr lvl="1" algn="l"/>
+            <a:r>
+              <a:rPr lang="en-US" altLang="ar-EG" sz="2100" dirty="0">
+                <a:latin typeface="Ubuntu" panose="020B0504030602030204" charset="0"/>
+                <a:cs typeface="Ubuntu" panose="020B0504030602030204" charset="0"/>
+              </a:rPr>
+              <a:t>For </a:t>
+            </a:r>
+            <a:r>
+              <a:rPr lang="en-US" altLang="ar-EG" sz="2100" b="1" dirty="0">
+                <a:latin typeface="Ubuntu" panose="020B0504030602030204" charset="0"/>
+                <a:cs typeface="Ubuntu" panose="020B0504030602030204" charset="0"/>
+              </a:rPr>
+              <a:t>numerical data</a:t>
+            </a:r>
+            <a:r>
+              <a:rPr lang="en-US" altLang="ar-EG" sz="2100" dirty="0">
+                <a:latin typeface="Ubuntu" panose="020B0504030602030204" charset="0"/>
+                <a:cs typeface="Ubuntu" panose="020B0504030602030204" charset="0"/>
+              </a:rPr>
+              <a:t>, methods like </a:t>
+            </a:r>
+            <a:r>
+              <a:rPr lang="en-US" altLang="ar-EG" sz="2100" b="1" dirty="0">
+                <a:latin typeface="Ubuntu" panose="020B0504030602030204" charset="0"/>
+                <a:cs typeface="Ubuntu" panose="020B0504030602030204" charset="0"/>
+              </a:rPr>
+              <a:t>mean</a:t>
+            </a:r>
+            <a:r>
+              <a:rPr lang="en-US" altLang="ar-EG" sz="2100" dirty="0">
+                <a:latin typeface="Ubuntu" panose="020B0504030602030204" charset="0"/>
+                <a:cs typeface="Ubuntu" panose="020B0504030602030204" charset="0"/>
+              </a:rPr>
+              <a:t>, </a:t>
+            </a:r>
+            <a:r>
+              <a:rPr lang="en-US" altLang="ar-EG" sz="2100" b="1" dirty="0">
+                <a:latin typeface="Ubuntu" panose="020B0504030602030204" charset="0"/>
+                <a:cs typeface="Ubuntu" panose="020B0504030602030204" charset="0"/>
+              </a:rPr>
+              <a:t>median</a:t>
+            </a:r>
+            <a:r>
+              <a:rPr lang="en-US" altLang="ar-EG" sz="2100" dirty="0">
+                <a:latin typeface="Ubuntu" panose="020B0504030602030204" charset="0"/>
+                <a:cs typeface="Ubuntu" panose="020B0504030602030204" charset="0"/>
+              </a:rPr>
+              <a:t>, </a:t>
+            </a:r>
+            <a:r>
+              <a:rPr lang="en-US" altLang="ar-EG" sz="2100" b="1" dirty="0">
+                <a:latin typeface="Ubuntu" panose="020B0504030602030204" charset="0"/>
+                <a:cs typeface="Ubuntu" panose="020B0504030602030204" charset="0"/>
+              </a:rPr>
+              <a:t>mode</a:t>
+            </a:r>
+            <a:r>
+              <a:rPr lang="en-US" altLang="ar-EG" sz="2100" dirty="0">
+                <a:latin typeface="Ubuntu" panose="020B0504030602030204" charset="0"/>
+                <a:cs typeface="Ubuntu" panose="020B0504030602030204" charset="0"/>
+              </a:rPr>
+              <a:t> imputation or </a:t>
+            </a:r>
+            <a:r>
+              <a:rPr lang="en-US" altLang="ar-EG" sz="2100" b="1" dirty="0">
+                <a:latin typeface="Ubuntu" panose="020B0504030602030204" charset="0"/>
+                <a:cs typeface="Ubuntu" panose="020B0504030602030204" charset="0"/>
+              </a:rPr>
+              <a:t>regression imputation</a:t>
+            </a:r>
+            <a:r>
+              <a:rPr lang="en-US" altLang="ar-EG" sz="2100" dirty="0">
+                <a:latin typeface="Ubuntu" panose="020B0504030602030204" charset="0"/>
+                <a:cs typeface="Ubuntu" panose="020B0504030602030204" charset="0"/>
+              </a:rPr>
+              <a:t> may be suitable.</a:t>
+            </a:r>
+            <a:endParaRPr lang="en-US" altLang="ar-EG" sz="2100" dirty="0">
+              <a:latin typeface="Ubuntu" panose="020B0504030602030204" charset="0"/>
+              <a:cs typeface="Ubuntu" panose="020B0504030602030204" charset="0"/>
+            </a:endParaRPr>
+          </a:p>
+          <a:p>
+            <a:pPr lvl="1" algn="l"/>
+            <a:r>
+              <a:rPr lang="en-US" altLang="ar-EG" sz="2100" dirty="0">
+                <a:latin typeface="Ubuntu" panose="020B0504030602030204" charset="0"/>
+                <a:cs typeface="Ubuntu" panose="020B0504030602030204" charset="0"/>
+              </a:rPr>
+              <a:t>For </a:t>
+            </a:r>
+            <a:r>
+              <a:rPr lang="en-US" altLang="ar-EG" sz="2100" b="1" dirty="0">
+                <a:latin typeface="Ubuntu" panose="020B0504030602030204" charset="0"/>
+                <a:cs typeface="Ubuntu" panose="020B0504030602030204" charset="0"/>
+              </a:rPr>
+              <a:t>categorical data</a:t>
+            </a:r>
+            <a:r>
+              <a:rPr lang="en-US" altLang="ar-EG" sz="2100" dirty="0">
+                <a:latin typeface="Ubuntu" panose="020B0504030602030204" charset="0"/>
+                <a:cs typeface="Ubuntu" panose="020B0504030602030204" charset="0"/>
+              </a:rPr>
+              <a:t>, consider using </a:t>
+            </a:r>
+            <a:r>
+              <a:rPr lang="en-US" altLang="ar-EG" sz="2100" b="1" dirty="0">
+                <a:latin typeface="Ubuntu" panose="020B0504030602030204" charset="0"/>
+                <a:cs typeface="Ubuntu" panose="020B0504030602030204" charset="0"/>
+              </a:rPr>
+              <a:t>mode</a:t>
+            </a:r>
+            <a:r>
+              <a:rPr lang="en-US" altLang="ar-EG" sz="2100" dirty="0">
+                <a:latin typeface="Ubuntu" panose="020B0504030602030204" charset="0"/>
+                <a:cs typeface="Ubuntu" panose="020B0504030602030204" charset="0"/>
+              </a:rPr>
+              <a:t> imputation, </a:t>
+            </a:r>
+            <a:r>
+              <a:rPr lang="en-US" altLang="ar-EG" sz="2100" b="1" dirty="0">
+                <a:latin typeface="Ubuntu" panose="020B0504030602030204" charset="0"/>
+                <a:cs typeface="Ubuntu" panose="020B0504030602030204" charset="0"/>
+              </a:rPr>
+              <a:t>k-Nearest Neighbors (k-NN)</a:t>
+            </a:r>
+            <a:r>
+              <a:rPr lang="en-US" altLang="ar-EG" sz="2100" dirty="0">
+                <a:latin typeface="Ubuntu" panose="020B0504030602030204" charset="0"/>
+                <a:cs typeface="Ubuntu" panose="020B0504030602030204" charset="0"/>
+              </a:rPr>
+              <a:t> imputation, or other methods tailored to categorical variables.</a:t>
+            </a:r>
+            <a:endParaRPr lang="en-US" altLang="ar-EG" sz="2100" dirty="0">
+              <a:latin typeface="Ubuntu" panose="020B0504030602030204" charset="0"/>
+              <a:cs typeface="Ubuntu" panose="020B0504030602030204" charset="0"/>
+            </a:endParaRPr>
+          </a:p>
+          <a:p>
+            <a:pPr lvl="1" algn="l"/>
+            <a:r>
+              <a:rPr lang="en-US" altLang="ar-EG" sz="2100" dirty="0">
+                <a:latin typeface="Ubuntu" panose="020B0504030602030204" charset="0"/>
+                <a:cs typeface="Ubuntu" panose="020B0504030602030204" charset="0"/>
+              </a:rPr>
+              <a:t>For </a:t>
+            </a:r>
+            <a:r>
+              <a:rPr lang="en-US" altLang="ar-EG" sz="2100" b="1" dirty="0">
+                <a:latin typeface="Ubuntu" panose="020B0504030602030204" charset="0"/>
+                <a:cs typeface="Ubuntu" panose="020B0504030602030204" charset="0"/>
+              </a:rPr>
+              <a:t>time series data</a:t>
+            </a:r>
+            <a:r>
+              <a:rPr lang="en-US" altLang="ar-EG" sz="2100" dirty="0">
+                <a:latin typeface="Ubuntu" panose="020B0504030602030204" charset="0"/>
+                <a:cs typeface="Ubuntu" panose="020B0504030602030204" charset="0"/>
+              </a:rPr>
+              <a:t>, </a:t>
+            </a:r>
+            <a:r>
+              <a:rPr lang="en-US" altLang="ar-EG" sz="2100" b="1" dirty="0">
+                <a:latin typeface="Ubuntu" panose="020B0504030602030204" charset="0"/>
+                <a:cs typeface="Ubuntu" panose="020B0504030602030204" charset="0"/>
+              </a:rPr>
+              <a:t>forward and backward fill </a:t>
+            </a:r>
+            <a:r>
+              <a:rPr lang="en-US" altLang="ar-EG" sz="2100" dirty="0">
+                <a:latin typeface="Ubuntu" panose="020B0504030602030204" charset="0"/>
+                <a:cs typeface="Ubuntu" panose="020B0504030602030204" charset="0"/>
+              </a:rPr>
+              <a:t>imputation or time series modeling may be appropriate.</a:t>
+            </a:r>
+            <a:endParaRPr lang="en-US" altLang="ar-EG" sz="2100" dirty="0">
+              <a:latin typeface="Ubuntu" panose="020B0504030602030204" charset="0"/>
+              <a:cs typeface="Ubuntu" panose="020B0504030602030204" charset="0"/>
+            </a:endParaRPr>
+          </a:p>
+          <a:p>
+            <a:pPr algn="l">
+              <a:buAutoNum type="arabicPeriod"/>
+            </a:pPr>
+            <a:endParaRPr lang="en-US" altLang="ar-EG" sz="2400" dirty="0">
+              <a:latin typeface="Ubuntu" panose="020B0504030602030204" charset="0"/>
+              <a:cs typeface="Ubuntu" panose="020B0504030602030204" charset="0"/>
             </a:endParaRPr>
           </a:p>
         </p:txBody>
@@ -6848,6 +7094,14 @@
   <p:clrMapOvr>
     <a:masterClrMapping/>
   </p:clrMapOvr>
+  <mc:AlternateContent xmlns:mc="http://schemas.openxmlformats.org/markup-compatibility/2006">
+    <mc:Choice xmlns:p14="http://schemas.microsoft.com/office/powerpoint/2010/main" Requires="p14">
+      <p:transition spd="slow" p14:dur="1200"/>
+    </mc:Choice>
+    <mc:Fallback>
+      <p:transition spd="slow"/>
+    </mc:Fallback>
+  </mc:AlternateContent>
 </p:sld>
 </file>
 
@@ -7015,7 +7269,1104 @@
 </p:sld>
 </file>
 
+<file path=ppt/slides/slide20.xml><?xml version="1.0" encoding="utf-8"?>
+<p:sld xmlns:a="http://schemas.openxmlformats.org/drawingml/2006/main" xmlns:r="http://schemas.openxmlformats.org/officeDocument/2006/relationships" xmlns:p="http://schemas.openxmlformats.org/presentationml/2006/main">
+  <p:cSld>
+    <p:spTree>
+      <p:nvGrpSpPr>
+        <p:cNvPr id="1" name=""/>
+        <p:cNvGrpSpPr/>
+        <p:nvPr/>
+      </p:nvGrpSpPr>
+      <p:grpSpPr>
+        <a:xfrm>
+          <a:off x="0" y="0"/>
+          <a:ext cx="0" cy="0"/>
+          <a:chOff x="0" y="0"/>
+          <a:chExt cx="0" cy="0"/>
+        </a:xfrm>
+      </p:grpSpPr>
+      <p:sp>
+        <p:nvSpPr>
+          <p:cNvPr id="2" name="Title 1"/>
+          <p:cNvSpPr>
+            <a:spLocks noGrp="1"/>
+          </p:cNvSpPr>
+          <p:nvPr>
+            <p:ph type="title"/>
+          </p:nvPr>
+        </p:nvSpPr>
+        <p:spPr/>
+        <p:txBody>
+          <a:bodyPr/>
+          <a:lstStyle/>
+          <a:p>
+            <a:pPr algn="l"/>
+            <a:r>
+              <a:rPr lang="en-US" altLang="ar-EG" dirty="0">
+                <a:latin typeface="Ubuntu" panose="020B0504030602030204" charset="0"/>
+                <a:cs typeface="Ubuntu" panose="020B0504030602030204" charset="0"/>
+                <a:sym typeface="+mn-ea"/>
+              </a:rPr>
+              <a:t>Choosing the Right Imputation Method</a:t>
+            </a:r>
+            <a:endParaRPr lang="en-US" altLang="ar-EG" dirty="0">
+              <a:latin typeface="Ubuntu" panose="020B0504030602030204" charset="0"/>
+              <a:cs typeface="Ubuntu" panose="020B0504030602030204" charset="0"/>
+              <a:sym typeface="+mn-ea"/>
+            </a:endParaRPr>
+          </a:p>
+        </p:txBody>
+      </p:sp>
+      <p:sp>
+        <p:nvSpPr>
+          <p:cNvPr id="3" name="Content Placeholder 2"/>
+          <p:cNvSpPr>
+            <a:spLocks noGrp="1"/>
+          </p:cNvSpPr>
+          <p:nvPr>
+            <p:ph idx="1"/>
+          </p:nvPr>
+        </p:nvSpPr>
+        <p:spPr/>
+        <p:txBody>
+          <a:bodyPr/>
+          <a:lstStyle/>
+          <a:p>
+            <a:pPr marL="0" indent="0" algn="l">
+              <a:buNone/>
+            </a:pPr>
+            <a:r>
+              <a:rPr lang="en-US" altLang="ar-EG" sz="2400" b="1" dirty="0">
+                <a:latin typeface="Ubuntu" panose="020B0504030602030204" charset="0"/>
+                <a:cs typeface="Ubuntu" panose="020B0504030602030204" charset="0"/>
+              </a:rPr>
+              <a:t>4.   Evaluate Data Distribution:</a:t>
+            </a:r>
+            <a:r>
+              <a:rPr lang="en-US" altLang="ar-EG" sz="2400" dirty="0">
+                <a:latin typeface="Ubuntu" panose="020B0504030602030204" charset="0"/>
+                <a:cs typeface="Ubuntu" panose="020B0504030602030204" charset="0"/>
+              </a:rPr>
+              <a:t> If your data is </a:t>
+            </a:r>
+            <a:r>
+              <a:rPr lang="en-US" altLang="ar-EG" sz="2400" b="1" dirty="0">
+                <a:latin typeface="Ubuntu" panose="020B0504030602030204" charset="0"/>
+                <a:cs typeface="Ubuntu" panose="020B0504030602030204" charset="0"/>
+              </a:rPr>
+              <a:t>highly skewed</a:t>
+            </a:r>
+            <a:r>
+              <a:rPr lang="en-US" altLang="ar-EG" sz="2400" dirty="0">
+                <a:latin typeface="Ubuntu" panose="020B0504030602030204" charset="0"/>
+                <a:cs typeface="Ubuntu" panose="020B0504030602030204" charset="0"/>
+              </a:rPr>
+              <a:t> or has </a:t>
+            </a:r>
+            <a:r>
+              <a:rPr lang="en-US" altLang="ar-EG" sz="2400" b="1" dirty="0">
+                <a:latin typeface="Ubuntu" panose="020B0504030602030204" charset="0"/>
+                <a:cs typeface="Ubuntu" panose="020B0504030602030204" charset="0"/>
+              </a:rPr>
+              <a:t>outliers</a:t>
+            </a:r>
+            <a:r>
+              <a:rPr lang="en-US" altLang="ar-EG" sz="2400" dirty="0">
+                <a:latin typeface="Ubuntu" panose="020B0504030602030204" charset="0"/>
+                <a:cs typeface="Ubuntu" panose="020B0504030602030204" charset="0"/>
+              </a:rPr>
+              <a:t>, be cautious about using </a:t>
+            </a:r>
+            <a:r>
+              <a:rPr lang="en-US" altLang="ar-EG" sz="2400" b="1" dirty="0">
+                <a:latin typeface="Ubuntu" panose="020B0504030602030204" charset="0"/>
+                <a:cs typeface="Ubuntu" panose="020B0504030602030204" charset="0"/>
+              </a:rPr>
+              <a:t>mean</a:t>
+            </a:r>
+            <a:r>
+              <a:rPr lang="en-US" altLang="ar-EG" sz="2400" dirty="0">
+                <a:latin typeface="Ubuntu" panose="020B0504030602030204" charset="0"/>
+                <a:cs typeface="Ubuntu" panose="020B0504030602030204" charset="0"/>
+              </a:rPr>
+              <a:t> imputation, which can be sensitive to extreme values</a:t>
+            </a:r>
+            <a:endParaRPr lang="en-US" altLang="ar-EG" sz="2400" dirty="0">
+              <a:latin typeface="Ubuntu" panose="020B0504030602030204" charset="0"/>
+              <a:cs typeface="Ubuntu" panose="020B0504030602030204" charset="0"/>
+            </a:endParaRPr>
+          </a:p>
+          <a:p>
+            <a:pPr marL="0" indent="0" algn="l">
+              <a:buNone/>
+            </a:pPr>
+            <a:r>
+              <a:rPr lang="en-US" altLang="ar-EG" sz="2400" b="1" dirty="0">
+                <a:latin typeface="Ubuntu" panose="020B0504030602030204" charset="0"/>
+                <a:cs typeface="Ubuntu" panose="020B0504030602030204" charset="0"/>
+              </a:rPr>
+              <a:t>5.   Examine Data Relationships:</a:t>
+            </a:r>
+            <a:r>
+              <a:rPr lang="en-US" altLang="ar-EG" sz="2400" dirty="0">
+                <a:latin typeface="Ubuntu" panose="020B0504030602030204" charset="0"/>
+                <a:cs typeface="Ubuntu" panose="020B0504030602030204" charset="0"/>
+              </a:rPr>
+              <a:t> If your dataset has strong correlations or dependencies between variables, methods like </a:t>
+            </a:r>
+            <a:r>
+              <a:rPr lang="en-US" altLang="ar-EG" sz="2400" b="1" dirty="0">
+                <a:latin typeface="Ubuntu" panose="020B0504030602030204" charset="0"/>
+                <a:cs typeface="Ubuntu" panose="020B0504030602030204" charset="0"/>
+              </a:rPr>
+              <a:t>regression imputation</a:t>
+            </a:r>
+            <a:r>
+              <a:rPr lang="en-US" altLang="ar-EG" sz="2400" dirty="0">
+                <a:latin typeface="Ubuntu" panose="020B0504030602030204" charset="0"/>
+                <a:cs typeface="Ubuntu" panose="020B0504030602030204" charset="0"/>
+              </a:rPr>
+              <a:t> or </a:t>
+            </a:r>
+            <a:r>
+              <a:rPr lang="en-US" altLang="ar-EG" sz="2400" b="1" dirty="0">
+                <a:latin typeface="Ubuntu" panose="020B0504030602030204" charset="0"/>
+                <a:cs typeface="Ubuntu" panose="020B0504030602030204" charset="0"/>
+              </a:rPr>
+              <a:t>k-Nearest Neighbors (k-NN)</a:t>
+            </a:r>
+            <a:r>
+              <a:rPr lang="en-US" altLang="ar-EG" sz="2400" dirty="0">
+                <a:latin typeface="Ubuntu" panose="020B0504030602030204" charset="0"/>
+                <a:cs typeface="Ubuntu" panose="020B0504030602030204" charset="0"/>
+              </a:rPr>
+              <a:t> may be more appropriate.</a:t>
+            </a:r>
+            <a:endParaRPr lang="en-US" altLang="ar-EG" sz="2400" dirty="0">
+              <a:latin typeface="Ubuntu" panose="020B0504030602030204" charset="0"/>
+              <a:cs typeface="Ubuntu" panose="020B0504030602030204" charset="0"/>
+            </a:endParaRPr>
+          </a:p>
+          <a:p>
+            <a:pPr marL="0" indent="0" algn="l">
+              <a:buNone/>
+            </a:pPr>
+            <a:r>
+              <a:rPr lang="en-US" altLang="ar-EG" sz="2400" b="1" dirty="0">
+                <a:latin typeface="Ubuntu" panose="020B0504030602030204" charset="0"/>
+                <a:cs typeface="Ubuntu" panose="020B0504030602030204" charset="0"/>
+              </a:rPr>
+              <a:t>6.   Think About Sample Size:</a:t>
+            </a:r>
+            <a:r>
+              <a:rPr lang="en-US" altLang="ar-EG" sz="2400" dirty="0">
+                <a:latin typeface="Ubuntu" panose="020B0504030602030204" charset="0"/>
+                <a:cs typeface="Ubuntu" panose="020B0504030602030204" charset="0"/>
+              </a:rPr>
+              <a:t> If your dataset has a </a:t>
+            </a:r>
+            <a:r>
+              <a:rPr lang="en-US" altLang="ar-EG" sz="2400" b="1" dirty="0">
+                <a:latin typeface="Ubuntu" panose="020B0504030602030204" charset="0"/>
+                <a:cs typeface="Ubuntu" panose="020B0504030602030204" charset="0"/>
+              </a:rPr>
+              <a:t>large </a:t>
+            </a:r>
+            <a:r>
+              <a:rPr lang="en-US" altLang="ar-EG" sz="2400" dirty="0">
+                <a:latin typeface="Ubuntu" panose="020B0504030602030204" charset="0"/>
+                <a:cs typeface="Ubuntu" panose="020B0504030602030204" charset="0"/>
+              </a:rPr>
+              <a:t>number of </a:t>
+            </a:r>
+            <a:r>
+              <a:rPr lang="en-US" altLang="ar-EG" sz="2400" b="1" dirty="0">
+                <a:latin typeface="Ubuntu" panose="020B0504030602030204" charset="0"/>
+                <a:cs typeface="Ubuntu" panose="020B0504030602030204" charset="0"/>
+              </a:rPr>
+              <a:t>missing values</a:t>
+            </a:r>
+            <a:r>
+              <a:rPr lang="en-US" altLang="ar-EG" sz="2400" dirty="0">
+                <a:latin typeface="Ubuntu" panose="020B0504030602030204" charset="0"/>
+                <a:cs typeface="Ubuntu" panose="020B0504030602030204" charset="0"/>
+              </a:rPr>
+              <a:t> for a particular variable, simple imputation methods like mean imputation may be less accurate. In such cases, more advanced imputation methods, such as</a:t>
+            </a:r>
+            <a:r>
+              <a:rPr lang="en-US" altLang="ar-EG" sz="2400" b="1" dirty="0">
+                <a:latin typeface="Ubuntu" panose="020B0504030602030204" charset="0"/>
+                <a:cs typeface="Ubuntu" panose="020B0504030602030204" charset="0"/>
+              </a:rPr>
+              <a:t> regression</a:t>
+            </a:r>
+            <a:r>
+              <a:rPr lang="en-US" altLang="ar-EG" sz="2400" dirty="0">
+                <a:latin typeface="Ubuntu" panose="020B0504030602030204" charset="0"/>
+                <a:cs typeface="Ubuntu" panose="020B0504030602030204" charset="0"/>
+              </a:rPr>
+              <a:t> or</a:t>
+            </a:r>
+            <a:r>
+              <a:rPr lang="en-US" altLang="ar-EG" sz="2400" b="1" dirty="0">
+                <a:latin typeface="Ubuntu" panose="020B0504030602030204" charset="0"/>
+                <a:cs typeface="Ubuntu" panose="020B0504030602030204" charset="0"/>
+              </a:rPr>
+              <a:t> k-NN</a:t>
+            </a:r>
+            <a:r>
+              <a:rPr lang="en-US" altLang="ar-EG" sz="2400" dirty="0">
+                <a:latin typeface="Ubuntu" panose="020B0504030602030204" charset="0"/>
+                <a:cs typeface="Ubuntu" panose="020B0504030602030204" charset="0"/>
+              </a:rPr>
+              <a:t>, can yield better results.</a:t>
+            </a:r>
+            <a:endParaRPr lang="en-US" altLang="ar-EG" sz="2400" dirty="0">
+              <a:latin typeface="Ubuntu" panose="020B0504030602030204" charset="0"/>
+              <a:cs typeface="Ubuntu" panose="020B0504030602030204" charset="0"/>
+            </a:endParaRPr>
+          </a:p>
+        </p:txBody>
+      </p:sp>
+    </p:spTree>
+  </p:cSld>
+  <p:clrMapOvr>
+    <a:masterClrMapping/>
+  </p:clrMapOvr>
+  <mc:AlternateContent xmlns:mc="http://schemas.openxmlformats.org/markup-compatibility/2006">
+    <mc:Choice xmlns:p14="http://schemas.microsoft.com/office/powerpoint/2010/main" Requires="p14">
+      <p:transition spd="slow" p14:dur="1200"/>
+    </mc:Choice>
+    <mc:Fallback>
+      <p:transition spd="slow"/>
+    </mc:Fallback>
+  </mc:AlternateContent>
+</p:sld>
+</file>
+
+<file path=ppt/slides/slide21.xml><?xml version="1.0" encoding="utf-8"?>
+<p:sld xmlns:a="http://schemas.openxmlformats.org/drawingml/2006/main" xmlns:r="http://schemas.openxmlformats.org/officeDocument/2006/relationships" xmlns:p="http://schemas.openxmlformats.org/presentationml/2006/main">
+  <p:cSld>
+    <p:spTree>
+      <p:nvGrpSpPr>
+        <p:cNvPr id="1" name=""/>
+        <p:cNvGrpSpPr/>
+        <p:nvPr/>
+      </p:nvGrpSpPr>
+      <p:grpSpPr>
+        <a:xfrm>
+          <a:off x="0" y="0"/>
+          <a:ext cx="0" cy="0"/>
+          <a:chOff x="0" y="0"/>
+          <a:chExt cx="0" cy="0"/>
+        </a:xfrm>
+      </p:grpSpPr>
+      <p:sp>
+        <p:nvSpPr>
+          <p:cNvPr id="2" name="Title 1"/>
+          <p:cNvSpPr>
+            <a:spLocks noGrp="1"/>
+          </p:cNvSpPr>
+          <p:nvPr>
+            <p:ph type="title"/>
+          </p:nvPr>
+        </p:nvSpPr>
+        <p:spPr/>
+        <p:txBody>
+          <a:bodyPr/>
+          <a:lstStyle/>
+          <a:p>
+            <a:pPr algn="l"/>
+            <a:r>
+              <a:rPr lang="en-US">
+                <a:latin typeface="Ubuntu" panose="020B0504030602030204" charset="0"/>
+                <a:cs typeface="Ubuntu" panose="020B0504030602030204" charset="0"/>
+              </a:rPr>
+              <a:t>Outline</a:t>
+            </a:r>
+            <a:endParaRPr lang="en-US">
+              <a:latin typeface="Ubuntu" panose="020B0504030602030204" charset="0"/>
+              <a:cs typeface="Ubuntu" panose="020B0504030602030204" charset="0"/>
+            </a:endParaRPr>
+          </a:p>
+        </p:txBody>
+      </p:sp>
+      <p:sp>
+        <p:nvSpPr>
+          <p:cNvPr id="3" name="Content Placeholder 2"/>
+          <p:cNvSpPr>
+            <a:spLocks noGrp="1"/>
+          </p:cNvSpPr>
+          <p:nvPr>
+            <p:ph idx="1"/>
+          </p:nvPr>
+        </p:nvSpPr>
+        <p:spPr/>
+        <p:txBody>
+          <a:bodyPr/>
+          <a:lstStyle/>
+          <a:p>
+            <a:pPr marL="457200" indent="-457200" algn="l">
+              <a:buFont typeface="+mj-lt"/>
+              <a:buAutoNum type="arabicPeriod"/>
+            </a:pPr>
+            <a:r>
+              <a:rPr lang="en-US" altLang="ar-EG" sz="2400" dirty="0">
+                <a:solidFill>
+                  <a:schemeClr val="bg2">
+                    <a:lumMod val="60000"/>
+                    <a:lumOff val="40000"/>
+                  </a:schemeClr>
+                </a:solidFill>
+                <a:latin typeface="Ubuntu" panose="020B0504030602030204" charset="0"/>
+                <a:cs typeface="Ubuntu" panose="020B0504030602030204" charset="0"/>
+              </a:rPr>
+              <a:t>Tools</a:t>
+            </a:r>
+            <a:endParaRPr lang="en-US" altLang="ar-EG" sz="2400" dirty="0">
+              <a:solidFill>
+                <a:schemeClr val="bg2">
+                  <a:lumMod val="60000"/>
+                  <a:lumOff val="40000"/>
+                </a:schemeClr>
+              </a:solidFill>
+              <a:latin typeface="Ubuntu" panose="020B0504030602030204" charset="0"/>
+              <a:cs typeface="Ubuntu" panose="020B0504030602030204" charset="0"/>
+            </a:endParaRPr>
+          </a:p>
+          <a:p>
+            <a:pPr marL="457200" indent="-457200" algn="l">
+              <a:buFont typeface="+mj-lt"/>
+              <a:buAutoNum type="arabicPeriod"/>
+            </a:pPr>
+            <a:r>
+              <a:rPr lang="en-US" altLang="ar-EG" sz="2400" dirty="0">
+                <a:solidFill>
+                  <a:schemeClr val="bg2">
+                    <a:lumMod val="60000"/>
+                    <a:lumOff val="40000"/>
+                  </a:schemeClr>
+                </a:solidFill>
+                <a:latin typeface="Ubuntu" panose="020B0504030602030204" charset="0"/>
+                <a:cs typeface="Ubuntu" panose="020B0504030602030204" charset="0"/>
+              </a:rPr>
+              <a:t>Importance of High Quality Data</a:t>
+            </a:r>
+            <a:endParaRPr lang="en-US" altLang="ar-EG" sz="2400" dirty="0">
+              <a:solidFill>
+                <a:schemeClr val="bg2">
+                  <a:lumMod val="60000"/>
+                  <a:lumOff val="40000"/>
+                </a:schemeClr>
+              </a:solidFill>
+              <a:latin typeface="Ubuntu" panose="020B0504030602030204" charset="0"/>
+              <a:cs typeface="Ubuntu" panose="020B0504030602030204" charset="0"/>
+            </a:endParaRPr>
+          </a:p>
+          <a:p>
+            <a:pPr marL="457200" indent="-457200" algn="l">
+              <a:buFont typeface="+mj-lt"/>
+              <a:buAutoNum type="arabicPeriod"/>
+            </a:pPr>
+            <a:r>
+              <a:rPr lang="en-US" altLang="ar-EG" sz="2400" dirty="0">
+                <a:solidFill>
+                  <a:schemeClr val="bg2">
+                    <a:lumMod val="60000"/>
+                    <a:lumOff val="40000"/>
+                  </a:schemeClr>
+                </a:solidFill>
+                <a:latin typeface="Ubuntu" panose="020B0504030602030204" charset="0"/>
+                <a:cs typeface="Ubuntu" panose="020B0504030602030204" charset="0"/>
+              </a:rPr>
+              <a:t>Handle Missing Values</a:t>
+            </a:r>
+            <a:endParaRPr lang="en-US" altLang="ar-EG" sz="2400" dirty="0">
+              <a:solidFill>
+                <a:schemeClr val="bg2">
+                  <a:lumMod val="60000"/>
+                  <a:lumOff val="40000"/>
+                </a:schemeClr>
+              </a:solidFill>
+              <a:latin typeface="Ubuntu" panose="020B0504030602030204" charset="0"/>
+              <a:cs typeface="Ubuntu" panose="020B0504030602030204" charset="0"/>
+            </a:endParaRPr>
+          </a:p>
+          <a:p>
+            <a:pPr marL="457200" indent="-457200" algn="l">
+              <a:buFont typeface="+mj-lt"/>
+              <a:buAutoNum type="arabicPeriod"/>
+            </a:pPr>
+            <a:r>
+              <a:rPr lang="en-US" altLang="ar-EG" sz="2400" dirty="0">
+                <a:solidFill>
+                  <a:schemeClr val="bg2">
+                    <a:lumMod val="60000"/>
+                    <a:lumOff val="40000"/>
+                  </a:schemeClr>
+                </a:solidFill>
+                <a:latin typeface="Ubuntu" panose="020B0504030602030204" charset="0"/>
+                <a:cs typeface="Ubuntu" panose="020B0504030602030204" charset="0"/>
+              </a:rPr>
+              <a:t>Choosing the Right Imputation Method</a:t>
+            </a:r>
+            <a:endParaRPr lang="en-US" altLang="ar-EG" sz="2400" dirty="0">
+              <a:solidFill>
+                <a:schemeClr val="bg2">
+                  <a:lumMod val="60000"/>
+                  <a:lumOff val="40000"/>
+                </a:schemeClr>
+              </a:solidFill>
+              <a:latin typeface="Ubuntu" panose="020B0504030602030204" charset="0"/>
+              <a:cs typeface="Ubuntu" panose="020B0504030602030204" charset="0"/>
+            </a:endParaRPr>
+          </a:p>
+          <a:p>
+            <a:pPr marL="457200" indent="-457200" algn="l">
+              <a:buFont typeface="+mj-lt"/>
+              <a:buAutoNum type="arabicPeriod"/>
+            </a:pPr>
+            <a:r>
+              <a:rPr lang="en-US" altLang="ar-EG" sz="2400" dirty="0">
+                <a:latin typeface="Ubuntu" panose="020B0504030602030204" charset="0"/>
+                <a:cs typeface="Ubuntu" panose="020B0504030602030204" charset="0"/>
+              </a:rPr>
+              <a:t>Lab</a:t>
+            </a:r>
+            <a:endParaRPr lang="en-US" altLang="ar-EG" sz="2400" dirty="0">
+              <a:latin typeface="Ubuntu" panose="020B0504030602030204" charset="0"/>
+              <a:cs typeface="Ubuntu" panose="020B0504030602030204" charset="0"/>
+            </a:endParaRPr>
+          </a:p>
+        </p:txBody>
+      </p:sp>
+    </p:spTree>
+  </p:cSld>
+  <p:clrMapOvr>
+    <a:masterClrMapping/>
+  </p:clrMapOvr>
+  <mc:AlternateContent xmlns:mc="http://schemas.openxmlformats.org/markup-compatibility/2006">
+    <mc:Choice xmlns:p14="http://schemas.microsoft.com/office/powerpoint/2010/main" Requires="p14">
+      <p:transition spd="slow" p14:dur="1200"/>
+    </mc:Choice>
+    <mc:Fallback>
+      <p:transition spd="slow"/>
+    </mc:Fallback>
+  </mc:AlternateContent>
+</p:sld>
+</file>
+
+<file path=ppt/slides/slide22.xml><?xml version="1.0" encoding="utf-8"?>
+<p:sld xmlns:a="http://schemas.openxmlformats.org/drawingml/2006/main" xmlns:r="http://schemas.openxmlformats.org/officeDocument/2006/relationships" xmlns:p="http://schemas.openxmlformats.org/presentationml/2006/main">
+  <p:cSld>
+    <p:spTree>
+      <p:nvGrpSpPr>
+        <p:cNvPr id="1" name=""/>
+        <p:cNvGrpSpPr/>
+        <p:nvPr/>
+      </p:nvGrpSpPr>
+      <p:grpSpPr>
+        <a:xfrm>
+          <a:off x="0" y="0"/>
+          <a:ext cx="0" cy="0"/>
+          <a:chOff x="0" y="0"/>
+          <a:chExt cx="0" cy="0"/>
+        </a:xfrm>
+      </p:grpSpPr>
+      <p:sp>
+        <p:nvSpPr>
+          <p:cNvPr id="2" name="Title 1"/>
+          <p:cNvSpPr>
+            <a:spLocks noGrp="1"/>
+          </p:cNvSpPr>
+          <p:nvPr>
+            <p:ph type="title"/>
+          </p:nvPr>
+        </p:nvSpPr>
+        <p:spPr/>
+        <p:txBody>
+          <a:bodyPr/>
+          <a:lstStyle/>
+          <a:p>
+            <a:pPr algn="l"/>
+            <a:r>
+              <a:rPr lang="en-US" altLang="ar-EG" dirty="0">
+                <a:latin typeface="Ubuntu" panose="020B0504030602030204" charset="0"/>
+                <a:cs typeface="Ubuntu" panose="020B0504030602030204" charset="0"/>
+                <a:sym typeface="+mn-ea"/>
+              </a:rPr>
+              <a:t>Lab</a:t>
+            </a:r>
+            <a:endParaRPr lang="en-US" altLang="ar-EG" dirty="0">
+              <a:latin typeface="Ubuntu" panose="020B0504030602030204" charset="0"/>
+              <a:cs typeface="Ubuntu" panose="020B0504030602030204" charset="0"/>
+              <a:sym typeface="+mn-ea"/>
+            </a:endParaRPr>
+          </a:p>
+        </p:txBody>
+      </p:sp>
+      <p:sp>
+        <p:nvSpPr>
+          <p:cNvPr id="3" name="Content Placeholder 2"/>
+          <p:cNvSpPr>
+            <a:spLocks noGrp="1"/>
+          </p:cNvSpPr>
+          <p:nvPr>
+            <p:ph idx="1"/>
+          </p:nvPr>
+        </p:nvSpPr>
+        <p:spPr/>
+        <p:txBody>
+          <a:bodyPr/>
+          <a:lstStyle/>
+          <a:p>
+            <a:pPr marL="0" indent="0" algn="l">
+              <a:buNone/>
+            </a:pPr>
+            <a:r>
+              <a:rPr lang="en-US" altLang="ar-EG" sz="2400" dirty="0">
+                <a:latin typeface="Ubuntu" panose="020B0504030602030204" charset="0"/>
+                <a:cs typeface="Ubuntu" panose="020B0504030602030204" charset="0"/>
+                <a:sym typeface="+mn-ea"/>
+              </a:rPr>
+              <a:t>Open Juypter Notebooks for session 04 to cover this topics in practice:</a:t>
+            </a:r>
+            <a:endParaRPr lang="en-US" altLang="ar-EG" sz="2400" dirty="0">
+              <a:latin typeface="Ubuntu" panose="020B0504030602030204" charset="0"/>
+              <a:cs typeface="Ubuntu" panose="020B0504030602030204" charset="0"/>
+            </a:endParaRPr>
+          </a:p>
+          <a:p>
+            <a:pPr algn="l"/>
+            <a:r>
+              <a:rPr lang="en-US" altLang="ar-EG" sz="2400" dirty="0">
+                <a:latin typeface="Ubuntu" panose="020B0504030602030204" charset="0"/>
+                <a:cs typeface="Ubuntu" panose="020B0504030602030204" charset="0"/>
+                <a:sym typeface="+mn-ea"/>
+              </a:rPr>
+              <a:t>Recap on SQLite</a:t>
+            </a:r>
+            <a:endParaRPr lang="en-US" altLang="ar-EG" sz="2400" dirty="0">
+              <a:latin typeface="Ubuntu" panose="020B0504030602030204" charset="0"/>
+              <a:cs typeface="Ubuntu" panose="020B0504030602030204" charset="0"/>
+              <a:sym typeface="+mn-ea"/>
+            </a:endParaRPr>
+          </a:p>
+          <a:p>
+            <a:pPr algn="l"/>
+            <a:r>
+              <a:rPr lang="en-US" altLang="ar-EG" sz="2400" dirty="0">
+                <a:latin typeface="Ubuntu" panose="020B0504030602030204" charset="0"/>
+                <a:cs typeface="Ubuntu" panose="020B0504030602030204" charset="0"/>
+                <a:sym typeface="+mn-ea"/>
+              </a:rPr>
+              <a:t>Data exploration using pandas.</a:t>
+            </a:r>
+            <a:endParaRPr lang="en-US" altLang="ar-EG" sz="2400" dirty="0">
+              <a:latin typeface="Ubuntu" panose="020B0504030602030204" charset="0"/>
+              <a:cs typeface="Ubuntu" panose="020B0504030602030204" charset="0"/>
+            </a:endParaRPr>
+          </a:p>
+          <a:p>
+            <a:pPr algn="l"/>
+            <a:r>
+              <a:rPr lang="en-US" altLang="ar-EG" sz="2400" dirty="0">
+                <a:latin typeface="Ubuntu" panose="020B0504030602030204" charset="0"/>
+                <a:cs typeface="Ubuntu" panose="020B0504030602030204" charset="0"/>
+                <a:sym typeface="+mn-ea"/>
+              </a:rPr>
+              <a:t>Data visualization using matplotlib.</a:t>
+            </a:r>
+            <a:endParaRPr lang="en-US" altLang="ar-EG" sz="2400" dirty="0">
+              <a:latin typeface="Ubuntu" panose="020B0504030602030204" charset="0"/>
+              <a:cs typeface="Ubuntu" panose="020B0504030602030204" charset="0"/>
+              <a:sym typeface="+mn-ea"/>
+            </a:endParaRPr>
+          </a:p>
+          <a:p>
+            <a:pPr algn="l"/>
+            <a:r>
+              <a:rPr lang="en-US" altLang="ar-EG" sz="2400" dirty="0">
+                <a:latin typeface="Ubuntu" panose="020B0504030602030204" charset="0"/>
+                <a:cs typeface="Ubuntu" panose="020B0504030602030204" charset="0"/>
+              </a:rPr>
+              <a:t>Handle missing values</a:t>
+            </a:r>
+            <a:endParaRPr lang="en-US" altLang="ar-EG" sz="2400" dirty="0">
+              <a:latin typeface="Ubuntu" panose="020B0504030602030204" charset="0"/>
+              <a:cs typeface="Ubuntu" panose="020B0504030602030204" charset="0"/>
+            </a:endParaRPr>
+          </a:p>
+        </p:txBody>
+      </p:sp>
+    </p:spTree>
+  </p:cSld>
+  <p:clrMapOvr>
+    <a:masterClrMapping/>
+  </p:clrMapOvr>
+  <mc:AlternateContent xmlns:mc="http://schemas.openxmlformats.org/markup-compatibility/2006">
+    <mc:Choice xmlns:p14="http://schemas.microsoft.com/office/powerpoint/2010/main" Requires="p14">
+      <p:transition spd="slow" p14:dur="1200"/>
+    </mc:Choice>
+    <mc:Fallback>
+      <p:transition spd="slow"/>
+    </mc:Fallback>
+  </mc:AlternateContent>
+</p:sld>
+</file>
+
+<file path=ppt/slides/slide23.xml><?xml version="1.0" encoding="utf-8"?>
+<p:sld xmlns:a="http://schemas.openxmlformats.org/drawingml/2006/main" xmlns:r="http://schemas.openxmlformats.org/officeDocument/2006/relationships" xmlns:p="http://schemas.openxmlformats.org/presentationml/2006/main">
+  <p:cSld>
+    <p:spTree>
+      <p:nvGrpSpPr>
+        <p:cNvPr id="1" name=""/>
+        <p:cNvGrpSpPr/>
+        <p:nvPr/>
+      </p:nvGrpSpPr>
+      <p:grpSpPr>
+        <a:xfrm>
+          <a:off x="0" y="0"/>
+          <a:ext cx="0" cy="0"/>
+          <a:chOff x="0" y="0"/>
+          <a:chExt cx="0" cy="0"/>
+        </a:xfrm>
+      </p:grpSpPr>
+      <p:sp>
+        <p:nvSpPr>
+          <p:cNvPr id="2" name="Title 1"/>
+          <p:cNvSpPr>
+            <a:spLocks noGrp="1"/>
+          </p:cNvSpPr>
+          <p:nvPr>
+            <p:ph type="title"/>
+          </p:nvPr>
+        </p:nvSpPr>
+        <p:spPr/>
+        <p:txBody>
+          <a:bodyPr/>
+          <a:lstStyle/>
+          <a:p>
+            <a:pPr algn="l"/>
+            <a:r>
+              <a:rPr lang="en-US">
+                <a:latin typeface="Ubuntu" panose="020B0504030602030204" charset="0"/>
+                <a:cs typeface="Ubuntu" panose="020B0504030602030204" charset="0"/>
+              </a:rPr>
+              <a:t>References</a:t>
+            </a:r>
+            <a:endParaRPr lang="en-US">
+              <a:latin typeface="Ubuntu" panose="020B0504030602030204" charset="0"/>
+              <a:cs typeface="Ubuntu" panose="020B0504030602030204" charset="0"/>
+            </a:endParaRPr>
+          </a:p>
+        </p:txBody>
+      </p:sp>
+      <p:sp>
+        <p:nvSpPr>
+          <p:cNvPr id="3" name="Content Placeholder 2"/>
+          <p:cNvSpPr>
+            <a:spLocks noGrp="1"/>
+          </p:cNvSpPr>
+          <p:nvPr>
+            <p:ph idx="1"/>
+          </p:nvPr>
+        </p:nvSpPr>
+        <p:spPr/>
+        <p:txBody>
+          <a:bodyPr/>
+          <a:lstStyle/>
+          <a:p>
+            <a:pPr algn="l"/>
+            <a:r>
+              <a:rPr lang="en-US" sz="2400" dirty="0">
+                <a:latin typeface="Ubuntu" panose="020B0504030602030204" charset="0"/>
+                <a:cs typeface="Ubuntu" panose="020B0504030602030204" charset="0"/>
+                <a:hlinkClick r:id="rId1" action="ppaction://hlinkfile"/>
+              </a:rPr>
+              <a:t>https://www.linkedin.com/pulse/importance-data-quality-analytics-brittsimperial/</a:t>
+            </a:r>
+            <a:endParaRPr lang="en-US" sz="2400" dirty="0">
+              <a:latin typeface="Ubuntu" panose="020B0504030602030204" charset="0"/>
+              <a:cs typeface="Ubuntu" panose="020B0504030602030204" charset="0"/>
+              <a:hlinkClick r:id="rId1" action="ppaction://hlinkfile"/>
+            </a:endParaRPr>
+          </a:p>
+          <a:p>
+            <a:pPr algn="l"/>
+            <a:r>
+              <a:rPr lang="en-US" sz="2400" dirty="0">
+                <a:latin typeface="Ubuntu" panose="020B0504030602030204" charset="0"/>
+                <a:cs typeface="Ubuntu" panose="020B0504030602030204" charset="0"/>
+                <a:hlinkClick r:id="rId2" action="ppaction://hlinkfile"/>
+              </a:rPr>
+              <a:t>https://www.sagacitysolutions.co.uk/about/news-and-blog/what-is-data-quality/</a:t>
+            </a:r>
+            <a:endParaRPr lang="en-US" sz="2400" dirty="0">
+              <a:latin typeface="Ubuntu" panose="020B0504030602030204" charset="0"/>
+              <a:cs typeface="Ubuntu" panose="020B0504030602030204" charset="0"/>
+              <a:hlinkClick r:id="rId2" action="ppaction://hlinkfile"/>
+            </a:endParaRPr>
+          </a:p>
+          <a:p>
+            <a:pPr algn="l"/>
+            <a:r>
+              <a:rPr lang="en-US" sz="2400" dirty="0">
+                <a:latin typeface="Ubuntu" panose="020B0504030602030204" charset="0"/>
+                <a:cs typeface="Ubuntu" panose="020B0504030602030204" charset="0"/>
+                <a:hlinkClick r:id="rId3" action="ppaction://hlinkfile"/>
+              </a:rPr>
+              <a:t>https://www.kaggle.com/code/parulpandey/a-guide-to-handling-missing-values-in-python?scriptVersionId=38521662 </a:t>
+            </a:r>
+            <a:endParaRPr lang="en-US" sz="2400" dirty="0">
+              <a:latin typeface="Ubuntu" panose="020B0504030602030204" charset="0"/>
+              <a:cs typeface="Ubuntu" panose="020B0504030602030204" charset="0"/>
+            </a:endParaRPr>
+          </a:p>
+        </p:txBody>
+      </p:sp>
+    </p:spTree>
+  </p:cSld>
+  <p:clrMapOvr>
+    <a:masterClrMapping/>
+  </p:clrMapOvr>
+</p:sld>
+</file>
+
+<file path=ppt/slides/slide24.xml><?xml version="1.0" encoding="utf-8"?>
+<p:sld xmlns:a="http://schemas.openxmlformats.org/drawingml/2006/main" xmlns:r="http://schemas.openxmlformats.org/officeDocument/2006/relationships" xmlns:p="http://schemas.openxmlformats.org/presentationml/2006/main">
+  <p:cSld>
+    <p:spTree>
+      <p:nvGrpSpPr>
+        <p:cNvPr id="1" name=""/>
+        <p:cNvGrpSpPr/>
+        <p:nvPr/>
+      </p:nvGrpSpPr>
+      <p:grpSpPr>
+        <a:xfrm>
+          <a:off x="0" y="0"/>
+          <a:ext cx="0" cy="0"/>
+          <a:chOff x="0" y="0"/>
+          <a:chExt cx="0" cy="0"/>
+        </a:xfrm>
+      </p:grpSpPr>
+      <p:sp>
+        <p:nvSpPr>
+          <p:cNvPr id="2" name="Title 1"/>
+          <p:cNvSpPr>
+            <a:spLocks noGrp="1"/>
+          </p:cNvSpPr>
+          <p:nvPr>
+            <p:ph type="title"/>
+          </p:nvPr>
+        </p:nvSpPr>
+        <p:spPr>
+          <a:xfrm>
+            <a:off x="609600" y="1556385"/>
+            <a:ext cx="10972800" cy="1511935"/>
+          </a:xfrm>
+        </p:spPr>
+        <p:txBody>
+          <a:bodyPr/>
+          <a:lstStyle/>
+          <a:p>
+            <a:pPr algn="ctr">
+              <a:lnSpc>
+                <a:spcPct val="250000"/>
+              </a:lnSpc>
+            </a:pPr>
+            <a:r>
+              <a:rPr lang="en-US">
+                <a:latin typeface="Ubuntu" panose="020B0504030602030204" charset="0"/>
+                <a:cs typeface="Ubuntu" panose="020B0504030602030204" charset="0"/>
+              </a:rPr>
+              <a:t>Thanks</a:t>
+            </a:r>
+            <a:endParaRPr lang="en-US">
+              <a:latin typeface="Ubuntu" panose="020B0504030602030204" charset="0"/>
+              <a:cs typeface="Ubuntu" panose="020B0504030602030204" charset="0"/>
+            </a:endParaRPr>
+          </a:p>
+        </p:txBody>
+      </p:sp>
+      <p:sp>
+        <p:nvSpPr>
+          <p:cNvPr id="3" name="Content Placeholder 2"/>
+          <p:cNvSpPr>
+            <a:spLocks noGrp="1"/>
+          </p:cNvSpPr>
+          <p:nvPr>
+            <p:ph idx="1"/>
+          </p:nvPr>
+        </p:nvSpPr>
+        <p:spPr>
+          <a:xfrm>
+            <a:off x="609600" y="3178175"/>
+            <a:ext cx="10972800" cy="2948305"/>
+          </a:xfrm>
+        </p:spPr>
+        <p:txBody>
+          <a:bodyPr/>
+          <a:lstStyle/>
+          <a:p>
+            <a:pPr marL="0" indent="0" algn="ctr">
+              <a:buNone/>
+            </a:pPr>
+            <a:r>
+              <a:rPr lang="en-US" sz="2400">
+                <a:latin typeface="Ubuntu" panose="020B0504030602030204" charset="0"/>
+                <a:cs typeface="Ubuntu" panose="020B0504030602030204" charset="0"/>
+              </a:rPr>
+              <a:t>Please keep updated: </a:t>
+            </a:r>
+            <a:endParaRPr lang="en-US" sz="2400">
+              <a:latin typeface="Ubuntu" panose="020B0504030602030204" charset="0"/>
+              <a:cs typeface="Ubuntu" panose="020B0504030602030204" charset="0"/>
+            </a:endParaRPr>
+          </a:p>
+          <a:p>
+            <a:pPr marL="0" indent="0" algn="ctr">
+              <a:buNone/>
+            </a:pPr>
+            <a:r>
+              <a:rPr lang="en-US" sz="2400">
+                <a:latin typeface="Ubuntu" panose="020B0504030602030204" charset="0"/>
+                <a:cs typeface="Ubuntu" panose="020B0504030602030204" charset="0"/>
+                <a:sym typeface="+mn-ea"/>
+                <a:hlinkClick r:id="rId1" action="ppaction://hlinkfile"/>
+              </a:rPr>
+              <a:t>https://github.com/kershrita/IEEE-Data-Science</a:t>
+            </a:r>
+            <a:endParaRPr lang="en-US" sz="2400">
+              <a:latin typeface="Ubuntu" panose="020B0504030602030204" charset="0"/>
+              <a:cs typeface="Ubuntu" panose="020B0504030602030204" charset="0"/>
+              <a:sym typeface="+mn-ea"/>
+            </a:endParaRPr>
+          </a:p>
+        </p:txBody>
+      </p:sp>
+    </p:spTree>
+  </p:cSld>
+  <p:clrMapOvr>
+    <a:masterClrMapping/>
+  </p:clrMapOvr>
+</p:sld>
+</file>
+
 <file path=ppt/slides/slide3.xml><?xml version="1.0" encoding="utf-8"?>
+<p:sld xmlns:a="http://schemas.openxmlformats.org/drawingml/2006/main" xmlns:r="http://schemas.openxmlformats.org/officeDocument/2006/relationships" xmlns:p="http://schemas.openxmlformats.org/presentationml/2006/main">
+  <p:cSld>
+    <p:spTree>
+      <p:nvGrpSpPr>
+        <p:cNvPr id="1" name=""/>
+        <p:cNvGrpSpPr/>
+        <p:nvPr/>
+      </p:nvGrpSpPr>
+      <p:grpSpPr>
+        <a:xfrm>
+          <a:off x="0" y="0"/>
+          <a:ext cx="0" cy="0"/>
+          <a:chOff x="0" y="0"/>
+          <a:chExt cx="0" cy="0"/>
+        </a:xfrm>
+      </p:grpSpPr>
+      <p:sp>
+        <p:nvSpPr>
+          <p:cNvPr id="2" name="Title 1"/>
+          <p:cNvSpPr>
+            <a:spLocks noGrp="1"/>
+          </p:cNvSpPr>
+          <p:nvPr>
+            <p:ph type="title"/>
+          </p:nvPr>
+        </p:nvSpPr>
+        <p:spPr/>
+        <p:txBody>
+          <a:bodyPr/>
+          <a:lstStyle/>
+          <a:p>
+            <a:pPr algn="l"/>
+            <a:r>
+              <a:rPr lang="en-US">
+                <a:latin typeface="Ubuntu" panose="020B0504030602030204" charset="0"/>
+                <a:cs typeface="Ubuntu" panose="020B0504030602030204" charset="0"/>
+              </a:rPr>
+              <a:t>Outline</a:t>
+            </a:r>
+            <a:endParaRPr lang="en-US">
+              <a:latin typeface="Ubuntu" panose="020B0504030602030204" charset="0"/>
+              <a:cs typeface="Ubuntu" panose="020B0504030602030204" charset="0"/>
+            </a:endParaRPr>
+          </a:p>
+        </p:txBody>
+      </p:sp>
+      <p:sp>
+        <p:nvSpPr>
+          <p:cNvPr id="3" name="Content Placeholder 2"/>
+          <p:cNvSpPr>
+            <a:spLocks noGrp="1"/>
+          </p:cNvSpPr>
+          <p:nvPr>
+            <p:ph idx="1"/>
+          </p:nvPr>
+        </p:nvSpPr>
+        <p:spPr/>
+        <p:txBody>
+          <a:bodyPr/>
+          <a:lstStyle/>
+          <a:p>
+            <a:pPr marL="457200" indent="-457200" algn="l">
+              <a:buFont typeface="+mj-lt"/>
+              <a:buAutoNum type="arabicPeriod"/>
+            </a:pPr>
+            <a:r>
+              <a:rPr lang="en-US" altLang="ar-EG" sz="2400" dirty="0">
+                <a:latin typeface="Ubuntu" panose="020B0504030602030204" charset="0"/>
+                <a:cs typeface="Ubuntu" panose="020B0504030602030204" charset="0"/>
+              </a:rPr>
+              <a:t>Tools</a:t>
+            </a:r>
+            <a:endParaRPr lang="en-US" altLang="ar-EG" sz="2400" dirty="0">
+              <a:latin typeface="Ubuntu" panose="020B0504030602030204" charset="0"/>
+              <a:cs typeface="Ubuntu" panose="020B0504030602030204" charset="0"/>
+            </a:endParaRPr>
+          </a:p>
+          <a:p>
+            <a:pPr marL="457200" indent="-457200" algn="l">
+              <a:buFont typeface="+mj-lt"/>
+              <a:buAutoNum type="arabicPeriod"/>
+            </a:pPr>
+            <a:r>
+              <a:rPr lang="en-US" altLang="ar-EG" sz="2400" dirty="0">
+                <a:solidFill>
+                  <a:schemeClr val="bg2">
+                    <a:lumMod val="60000"/>
+                    <a:lumOff val="40000"/>
+                  </a:schemeClr>
+                </a:solidFill>
+                <a:latin typeface="Ubuntu" panose="020B0504030602030204" charset="0"/>
+                <a:cs typeface="Ubuntu" panose="020B0504030602030204" charset="0"/>
+              </a:rPr>
+              <a:t>Importance of High Quality Data</a:t>
+            </a:r>
+            <a:endParaRPr lang="en-US" altLang="ar-EG" sz="2400" dirty="0">
+              <a:solidFill>
+                <a:schemeClr val="bg2">
+                  <a:lumMod val="60000"/>
+                  <a:lumOff val="40000"/>
+                </a:schemeClr>
+              </a:solidFill>
+              <a:latin typeface="Ubuntu" panose="020B0504030602030204" charset="0"/>
+              <a:cs typeface="Ubuntu" panose="020B0504030602030204" charset="0"/>
+            </a:endParaRPr>
+          </a:p>
+          <a:p>
+            <a:pPr marL="457200" indent="-457200" algn="l">
+              <a:buFont typeface="+mj-lt"/>
+              <a:buAutoNum type="arabicPeriod"/>
+            </a:pPr>
+            <a:r>
+              <a:rPr lang="en-US" altLang="ar-EG" sz="2400" dirty="0">
+                <a:solidFill>
+                  <a:schemeClr val="bg2">
+                    <a:lumMod val="60000"/>
+                    <a:lumOff val="40000"/>
+                  </a:schemeClr>
+                </a:solidFill>
+                <a:latin typeface="Ubuntu" panose="020B0504030602030204" charset="0"/>
+                <a:cs typeface="Ubuntu" panose="020B0504030602030204" charset="0"/>
+              </a:rPr>
+              <a:t>Handle Missing Values</a:t>
+            </a:r>
+            <a:endParaRPr lang="en-US" altLang="ar-EG" sz="2400" dirty="0">
+              <a:solidFill>
+                <a:schemeClr val="bg2">
+                  <a:lumMod val="60000"/>
+                  <a:lumOff val="40000"/>
+                </a:schemeClr>
+              </a:solidFill>
+              <a:latin typeface="Ubuntu" panose="020B0504030602030204" charset="0"/>
+              <a:cs typeface="Ubuntu" panose="020B0504030602030204" charset="0"/>
+            </a:endParaRPr>
+          </a:p>
+          <a:p>
+            <a:pPr marL="457200" indent="-457200" algn="l">
+              <a:buFont typeface="+mj-lt"/>
+              <a:buAutoNum type="arabicPeriod"/>
+            </a:pPr>
+            <a:r>
+              <a:rPr lang="en-US" altLang="ar-EG" sz="2400" dirty="0">
+                <a:solidFill>
+                  <a:schemeClr val="bg2">
+                    <a:lumMod val="60000"/>
+                    <a:lumOff val="40000"/>
+                  </a:schemeClr>
+                </a:solidFill>
+                <a:latin typeface="Ubuntu" panose="020B0504030602030204" charset="0"/>
+                <a:cs typeface="Ubuntu" panose="020B0504030602030204" charset="0"/>
+              </a:rPr>
+              <a:t>Choosing the Right Imputation Method</a:t>
+            </a:r>
+            <a:endParaRPr lang="en-US" altLang="ar-EG" sz="2400" dirty="0">
+              <a:solidFill>
+                <a:schemeClr val="bg2">
+                  <a:lumMod val="60000"/>
+                  <a:lumOff val="40000"/>
+                </a:schemeClr>
+              </a:solidFill>
+              <a:latin typeface="Ubuntu" panose="020B0504030602030204" charset="0"/>
+              <a:cs typeface="Ubuntu" panose="020B0504030602030204" charset="0"/>
+            </a:endParaRPr>
+          </a:p>
+          <a:p>
+            <a:pPr marL="457200" indent="-457200" algn="l">
+              <a:buFont typeface="+mj-lt"/>
+              <a:buAutoNum type="arabicPeriod"/>
+            </a:pPr>
+            <a:r>
+              <a:rPr lang="en-US" altLang="ar-EG" sz="2400" dirty="0">
+                <a:solidFill>
+                  <a:schemeClr val="bg2">
+                    <a:lumMod val="60000"/>
+                    <a:lumOff val="40000"/>
+                  </a:schemeClr>
+                </a:solidFill>
+                <a:latin typeface="Ubuntu" panose="020B0504030602030204" charset="0"/>
+                <a:cs typeface="Ubuntu" panose="020B0504030602030204" charset="0"/>
+              </a:rPr>
+              <a:t>Lab</a:t>
+            </a:r>
+            <a:endParaRPr lang="en-US" altLang="ar-EG" sz="2400" dirty="0">
+              <a:solidFill>
+                <a:schemeClr val="bg2">
+                  <a:lumMod val="60000"/>
+                  <a:lumOff val="40000"/>
+                </a:schemeClr>
+              </a:solidFill>
+              <a:latin typeface="Ubuntu" panose="020B0504030602030204" charset="0"/>
+              <a:cs typeface="Ubuntu" panose="020B0504030602030204" charset="0"/>
+            </a:endParaRPr>
+          </a:p>
+        </p:txBody>
+      </p:sp>
+    </p:spTree>
+  </p:cSld>
+  <p:clrMapOvr>
+    <a:masterClrMapping/>
+  </p:clrMapOvr>
+  <mc:AlternateContent xmlns:mc="http://schemas.openxmlformats.org/markup-compatibility/2006">
+    <mc:Choice xmlns:p14="http://schemas.microsoft.com/office/powerpoint/2010/main" Requires="p14">
+      <p:transition spd="slow" p14:dur="1200"/>
+    </mc:Choice>
+    <mc:Fallback>
+      <p:transition spd="slow"/>
+    </mc:Fallback>
+  </mc:AlternateContent>
+</p:sld>
+</file>
+
+<file path=ppt/slides/slide4.xml><?xml version="1.0" encoding="utf-8"?>
 <p:sld xmlns:a="http://schemas.openxmlformats.org/drawingml/2006/main" xmlns:r="http://schemas.openxmlformats.org/officeDocument/2006/relationships" xmlns:p="http://schemas.openxmlformats.org/presentationml/2006/main">
   <p:cSld>
     <p:spTree>
@@ -7239,190 +8590,6 @@
 </p:sld>
 </file>
 
-<file path=ppt/slides/slide4.xml><?xml version="1.0" encoding="utf-8"?>
-<p:sld xmlns:a="http://schemas.openxmlformats.org/drawingml/2006/main" xmlns:r="http://schemas.openxmlformats.org/officeDocument/2006/relationships" xmlns:p="http://schemas.openxmlformats.org/presentationml/2006/main">
-  <p:cSld>
-    <p:spTree>
-      <p:nvGrpSpPr>
-        <p:cNvPr id="1" name=""/>
-        <p:cNvGrpSpPr/>
-        <p:nvPr/>
-      </p:nvGrpSpPr>
-      <p:grpSpPr>
-        <a:xfrm>
-          <a:off x="0" y="0"/>
-          <a:ext cx="0" cy="0"/>
-          <a:chOff x="0" y="0"/>
-          <a:chExt cx="0" cy="0"/>
-        </a:xfrm>
-      </p:grpSpPr>
-      <p:sp>
-        <p:nvSpPr>
-          <p:cNvPr id="2" name="Title 1"/>
-          <p:cNvSpPr>
-            <a:spLocks noGrp="1"/>
-          </p:cNvSpPr>
-          <p:nvPr>
-            <p:ph type="title"/>
-          </p:nvPr>
-        </p:nvSpPr>
-        <p:spPr/>
-        <p:txBody>
-          <a:bodyPr/>
-          <a:lstStyle/>
-          <a:p>
-            <a:pPr algn="l"/>
-            <a:r>
-              <a:rPr lang="en-US">
-                <a:latin typeface="Ubuntu" panose="020B0504030602030204" charset="0"/>
-                <a:cs typeface="Ubuntu" panose="020B0504030602030204" charset="0"/>
-              </a:rPr>
-              <a:t>Importance of High Quality Data</a:t>
-            </a:r>
-            <a:endParaRPr lang="en-US">
-              <a:latin typeface="Ubuntu" panose="020B0504030602030204" charset="0"/>
-              <a:cs typeface="Ubuntu" panose="020B0504030602030204" charset="0"/>
-            </a:endParaRPr>
-          </a:p>
-        </p:txBody>
-      </p:sp>
-      <p:sp>
-        <p:nvSpPr>
-          <p:cNvPr id="3" name="Content Placeholder 2"/>
-          <p:cNvSpPr>
-            <a:spLocks noGrp="1"/>
-          </p:cNvSpPr>
-          <p:nvPr>
-            <p:ph idx="1"/>
-          </p:nvPr>
-        </p:nvSpPr>
-        <p:spPr/>
-        <p:txBody>
-          <a:bodyPr/>
-          <a:lstStyle/>
-          <a:p>
-            <a:pPr algn="l"/>
-            <a:r>
-              <a:rPr lang="en-US" altLang="ar-EG" sz="2400" b="1" dirty="0">
-                <a:latin typeface="Ubuntu" panose="020B0504030602030204" charset="0"/>
-                <a:cs typeface="Ubuntu" panose="020B0504030602030204" charset="0"/>
-              </a:rPr>
-              <a:t>Accurate Decision-Making: </a:t>
-            </a:r>
-            <a:r>
-              <a:rPr lang="en-US" altLang="ar-EG" sz="2400" dirty="0">
-                <a:latin typeface="Ubuntu" panose="020B0504030602030204" charset="0"/>
-                <a:cs typeface="Ubuntu" panose="020B0504030602030204" charset="0"/>
-              </a:rPr>
-              <a:t>High-quality data leads to more accurate and informed decision-making.</a:t>
-            </a:r>
-            <a:endParaRPr lang="en-US" altLang="ar-EG" sz="2400" dirty="0">
-              <a:latin typeface="Ubuntu" panose="020B0504030602030204" charset="0"/>
-              <a:cs typeface="Ubuntu" panose="020B0504030602030204" charset="0"/>
-            </a:endParaRPr>
-          </a:p>
-          <a:p>
-            <a:pPr algn="l"/>
-            <a:r>
-              <a:rPr lang="en-US" altLang="ar-EG" sz="2400" b="1" dirty="0">
-                <a:latin typeface="Ubuntu" panose="020B0504030602030204" charset="0"/>
-                <a:cs typeface="Ubuntu" panose="020B0504030602030204" charset="0"/>
-              </a:rPr>
-              <a:t>Accurate Insights: </a:t>
-            </a:r>
-            <a:r>
-              <a:rPr lang="en-US" altLang="ar-EG" sz="2400" dirty="0">
-                <a:latin typeface="Ubuntu" panose="020B0504030602030204" charset="0"/>
-                <a:cs typeface="Ubuntu" panose="020B0504030602030204" charset="0"/>
-              </a:rPr>
-              <a:t>Data quality ensures that the insights derived from data analysis are reliable and precise.</a:t>
-            </a:r>
-            <a:endParaRPr lang="en-US" altLang="ar-EG" sz="2400" b="1" dirty="0">
-              <a:latin typeface="Ubuntu" panose="020B0504030602030204" charset="0"/>
-              <a:cs typeface="Ubuntu" panose="020B0504030602030204" charset="0"/>
-            </a:endParaRPr>
-          </a:p>
-          <a:p>
-            <a:pPr algn="l"/>
-            <a:r>
-              <a:rPr lang="en-US" altLang="ar-EG" sz="2400" b="1" dirty="0">
-                <a:latin typeface="Ubuntu" panose="020B0504030602030204" charset="0"/>
-                <a:cs typeface="Ubuntu" panose="020B0504030602030204" charset="0"/>
-              </a:rPr>
-              <a:t>Reduced Risks: </a:t>
-            </a:r>
-            <a:r>
-              <a:rPr lang="en-US" altLang="ar-EG" sz="2400" dirty="0">
-                <a:latin typeface="Ubuntu" panose="020B0504030602030204" charset="0"/>
-                <a:cs typeface="Ubuntu" panose="020B0504030602030204" charset="0"/>
-              </a:rPr>
-              <a:t>Poor-quality data can result in poor decision-making, exposing businesses to financial and reputational risks. </a:t>
-            </a:r>
-            <a:endParaRPr lang="en-US" altLang="ar-EG" sz="2400" dirty="0">
-              <a:latin typeface="Ubuntu" panose="020B0504030602030204" charset="0"/>
-              <a:cs typeface="Ubuntu" panose="020B0504030602030204" charset="0"/>
-            </a:endParaRPr>
-          </a:p>
-          <a:p>
-            <a:pPr algn="l"/>
-            <a:r>
-              <a:rPr lang="en-US" altLang="ar-EG" sz="2400" b="1" dirty="0">
-                <a:latin typeface="Ubuntu" panose="020B0504030602030204" charset="0"/>
-                <a:cs typeface="Ubuntu" panose="020B0504030602030204" charset="0"/>
-              </a:rPr>
-              <a:t>Cost Savings: </a:t>
-            </a:r>
-            <a:r>
-              <a:rPr lang="en-US" altLang="ar-EG" sz="2400" dirty="0">
-                <a:latin typeface="Ubuntu" panose="020B0504030602030204" charset="0"/>
-                <a:cs typeface="Ubuntu" panose="020B0504030602030204" charset="0"/>
-              </a:rPr>
-              <a:t>Using high-quality data in data analytics reduces the potential for wasted resources and efforts.</a:t>
-            </a:r>
-            <a:endParaRPr lang="en-US" altLang="ar-EG" sz="2400" dirty="0">
-              <a:latin typeface="Ubuntu" panose="020B0504030602030204" charset="0"/>
-              <a:cs typeface="Ubuntu" panose="020B0504030602030204" charset="0"/>
-            </a:endParaRPr>
-          </a:p>
-          <a:p>
-            <a:pPr algn="l"/>
-            <a:r>
-              <a:rPr lang="en-US" altLang="ar-EG" sz="2400" b="1" dirty="0">
-                <a:latin typeface="Ubuntu" panose="020B0504030602030204" charset="0"/>
-                <a:cs typeface="Ubuntu" panose="020B0504030602030204" charset="0"/>
-              </a:rPr>
-              <a:t>Improved Customer Experience: </a:t>
-            </a:r>
-            <a:r>
-              <a:rPr lang="en-US" altLang="ar-EG" sz="2400" dirty="0">
-                <a:latin typeface="Ubuntu" panose="020B0504030602030204" charset="0"/>
-                <a:cs typeface="Ubuntu" panose="020B0504030602030204" charset="0"/>
-              </a:rPr>
-              <a:t>Data quality is crucial for enhancing the customer experience through personalized marketing and engagement strategies. </a:t>
-            </a:r>
-            <a:endParaRPr lang="en-US" altLang="ar-EG" sz="2400" dirty="0">
-              <a:latin typeface="Ubuntu" panose="020B0504030602030204" charset="0"/>
-              <a:cs typeface="Ubuntu" panose="020B0504030602030204" charset="0"/>
-            </a:endParaRPr>
-          </a:p>
-        </p:txBody>
-      </p:sp>
-    </p:spTree>
-  </p:cSld>
-  <p:clrMapOvr>
-    <a:masterClrMapping/>
-  </p:clrMapOvr>
-  <mc:AlternateContent xmlns:mc="http://schemas.openxmlformats.org/markup-compatibility/2006">
-    <mc:Choice xmlns:p14="http://schemas.microsoft.com/office/powerpoint/2010/main" Requires="p14">
-      <p:transition spd="slow" p14:dur="1200"/>
-    </mc:Choice>
-    <mc:Fallback>
-      <p:transition spd="slow"/>
-    </mc:Fallback>
-  </mc:AlternateContent>
-</p:sld>
-</file>
-
 <file path=ppt/slides/slide5.xml><?xml version="1.0" encoding="utf-8"?>
 <p:sld xmlns:a="http://schemas.openxmlformats.org/drawingml/2006/main" xmlns:r="http://schemas.openxmlformats.org/officeDocument/2006/relationships" xmlns:p="http://schemas.openxmlformats.org/presentationml/2006/main">
   <p:cSld>
@@ -7461,7 +8628,7 @@
                 <a:latin typeface="Ubuntu" panose="020B0504030602030204" charset="0"/>
                 <a:cs typeface="Ubuntu" panose="020B0504030602030204" charset="0"/>
               </a:rPr>
-              <a:t>What does good data quality look like?</a:t>
+              <a:t>Outline</a:t>
             </a:r>
             <a:endParaRPr lang="en-US">
               <a:latin typeface="Ubuntu" panose="020B0504030602030204" charset="0"/>
@@ -7485,41 +8652,45 @@
           <a:bodyPr/>
           <a:lstStyle/>
           <a:p>
-            <a:pPr algn="l"/>
-            <a:r>
-              <a:rPr lang="en-US" altLang="ar-EG" sz="2400" b="1" dirty="0">
-                <a:latin typeface="Ubuntu" panose="020B0504030602030204" charset="0"/>
-                <a:cs typeface="Ubuntu" panose="020B0504030602030204" charset="0"/>
-              </a:rPr>
-              <a:t>Accuracy: </a:t>
-            </a:r>
+            <a:pPr marL="457200" indent="-457200" algn="l">
+              <a:buFont typeface="+mj-lt"/>
+              <a:buAutoNum type="arabicPeriod"/>
+            </a:pPr>
             <a:r>
               <a:rPr lang="en-US" altLang="ar-EG" sz="2400" dirty="0">
-                <a:latin typeface="Ubuntu" panose="020B0504030602030204" charset="0"/>
-                <a:cs typeface="Ubuntu" panose="020B0504030602030204" charset="0"/>
-              </a:rPr>
-              <a:t>Accurate data is free from errors and reflects the real-world entities and events it represents.</a:t>
-            </a:r>
-            <a:endParaRPr lang="en-US" altLang="ar-EG" sz="2400" b="1" dirty="0">
-              <a:latin typeface="Ubuntu" panose="020B0504030602030204" charset="0"/>
-              <a:cs typeface="Ubuntu" panose="020B0504030602030204" charset="0"/>
-            </a:endParaRPr>
-          </a:p>
-          <a:p>
-            <a:pPr algn="l"/>
-            <a:r>
-              <a:rPr lang="en-US" altLang="ar-EG" sz="2400" b="1" dirty="0">
-                <a:latin typeface="Ubuntu" panose="020B0504030602030204" charset="0"/>
-                <a:cs typeface="Ubuntu" panose="020B0504030602030204" charset="0"/>
-              </a:rPr>
-              <a:t>Uniqueness:</a:t>
-            </a:r>
+                <a:solidFill>
+                  <a:schemeClr val="bg2">
+                    <a:lumMod val="60000"/>
+                    <a:lumOff val="40000"/>
+                  </a:schemeClr>
+                </a:solidFill>
+                <a:latin typeface="Ubuntu" panose="020B0504030602030204" charset="0"/>
+                <a:cs typeface="Ubuntu" panose="020B0504030602030204" charset="0"/>
+              </a:rPr>
+              <a:t>Tools</a:t>
+            </a:r>
+            <a:endParaRPr lang="en-US" altLang="ar-EG" sz="2400" dirty="0">
+              <a:solidFill>
+                <a:schemeClr val="bg2">
+                  <a:lumMod val="60000"/>
+                  <a:lumOff val="40000"/>
+                </a:schemeClr>
+              </a:solidFill>
+              <a:latin typeface="Ubuntu" panose="020B0504030602030204" charset="0"/>
+              <a:cs typeface="Ubuntu" panose="020B0504030602030204" charset="0"/>
+            </a:endParaRPr>
+          </a:p>
+          <a:p>
+            <a:pPr marL="457200" indent="-457200" algn="l">
+              <a:buFont typeface="+mj-lt"/>
+              <a:buAutoNum type="arabicPeriod"/>
+            </a:pPr>
             <a:r>
               <a:rPr lang="en-US" altLang="ar-EG" sz="2400" dirty="0">
                 <a:latin typeface="Ubuntu" panose="020B0504030602030204" charset="0"/>
                 <a:cs typeface="Ubuntu" panose="020B0504030602030204" charset="0"/>
               </a:rPr>
-              <a:t> Good data quality ensures that there are no duplicate entries in the dataset. This uniqueness helps maintain data cleanliness and precision.</a:t>
+              <a:t>Importance of High Quality Data</a:t>
             </a:r>
             <a:endParaRPr lang="en-US" altLang="ar-EG" sz="2400" dirty="0">
               <a:latin typeface="Ubuntu" panose="020B0504030602030204" charset="0"/>
@@ -7527,78 +8698,88 @@
             </a:endParaRPr>
           </a:p>
           <a:p>
-            <a:pPr algn="l"/>
-            <a:r>
-              <a:rPr lang="en-US" altLang="ar-EG" sz="2400" b="1" dirty="0">
-                <a:latin typeface="Ubuntu" panose="020B0504030602030204" charset="0"/>
-                <a:cs typeface="Ubuntu" panose="020B0504030602030204" charset="0"/>
-              </a:rPr>
-              <a:t>Completeness: </a:t>
-            </a:r>
+            <a:pPr marL="457200" indent="-457200" algn="l">
+              <a:buFont typeface="+mj-lt"/>
+              <a:buAutoNum type="arabicPeriod"/>
+            </a:pPr>
             <a:r>
               <a:rPr lang="en-US" altLang="ar-EG" sz="2400" dirty="0">
-                <a:latin typeface="Ubuntu" panose="020B0504030602030204" charset="0"/>
-                <a:cs typeface="Ubuntu" panose="020B0504030602030204" charset="0"/>
-              </a:rPr>
-              <a:t>C</a:t>
-            </a:r>
+                <a:solidFill>
+                  <a:schemeClr val="bg2">
+                    <a:lumMod val="60000"/>
+                    <a:lumOff val="40000"/>
+                  </a:schemeClr>
+                </a:solidFill>
+                <a:latin typeface="Ubuntu" panose="020B0504030602030204" charset="0"/>
+                <a:cs typeface="Ubuntu" panose="020B0504030602030204" charset="0"/>
+              </a:rPr>
+              <a:t>Handle Missing Values</a:t>
+            </a:r>
+            <a:endParaRPr lang="en-US" altLang="ar-EG" sz="2400" dirty="0">
+              <a:solidFill>
+                <a:schemeClr val="bg2">
+                  <a:lumMod val="60000"/>
+                  <a:lumOff val="40000"/>
+                </a:schemeClr>
+              </a:solidFill>
+              <a:latin typeface="Ubuntu" panose="020B0504030602030204" charset="0"/>
+              <a:cs typeface="Ubuntu" panose="020B0504030602030204" charset="0"/>
+            </a:endParaRPr>
+          </a:p>
+          <a:p>
+            <a:pPr marL="457200" indent="-457200" algn="l">
+              <a:buFont typeface="+mj-lt"/>
+              <a:buAutoNum type="arabicPeriod"/>
+            </a:pPr>
             <a:r>
               <a:rPr lang="en-US" altLang="ar-EG" sz="2400" dirty="0">
-                <a:latin typeface="Ubuntu" panose="020B0504030602030204" charset="0"/>
-                <a:cs typeface="Ubuntu" panose="020B0504030602030204" charset="0"/>
-              </a:rPr>
-              <a:t>ontains all the necessary information required for its intended use. It lacks gaps, missing values, or omissions.</a:t>
+                <a:solidFill>
+                  <a:schemeClr val="bg2">
+                    <a:lumMod val="60000"/>
+                    <a:lumOff val="40000"/>
+                  </a:schemeClr>
+                </a:solidFill>
+                <a:latin typeface="Ubuntu" panose="020B0504030602030204" charset="0"/>
+                <a:cs typeface="Ubuntu" panose="020B0504030602030204" charset="0"/>
+              </a:rPr>
+              <a:t>Choosing the Right Imputation Method</a:t>
             </a:r>
             <a:endParaRPr lang="en-US" altLang="ar-EG" sz="2400" dirty="0">
-              <a:latin typeface="Ubuntu" panose="020B0504030602030204" charset="0"/>
-              <a:cs typeface="Ubuntu" panose="020B0504030602030204" charset="0"/>
-            </a:endParaRPr>
-          </a:p>
-          <a:p>
-            <a:pPr algn="l"/>
-            <a:r>
-              <a:rPr lang="en-US" altLang="ar-EG" sz="2400" b="1" dirty="0">
-                <a:latin typeface="Ubuntu" panose="020B0504030602030204" charset="0"/>
-                <a:cs typeface="Ubuntu" panose="020B0504030602030204" charset="0"/>
-              </a:rPr>
-              <a:t>Consistency:</a:t>
-            </a:r>
+              <a:solidFill>
+                <a:schemeClr val="bg2">
+                  <a:lumMod val="60000"/>
+                  <a:lumOff val="40000"/>
+                </a:schemeClr>
+              </a:solidFill>
+              <a:latin typeface="Ubuntu" panose="020B0504030602030204" charset="0"/>
+              <a:cs typeface="Ubuntu" panose="020B0504030602030204" charset="0"/>
+            </a:endParaRPr>
+          </a:p>
+          <a:p>
+            <a:pPr marL="457200" indent="-457200" algn="l">
+              <a:buFont typeface="+mj-lt"/>
+              <a:buAutoNum type="arabicPeriod"/>
+            </a:pPr>
             <a:r>
               <a:rPr lang="en-US" altLang="ar-EG" sz="2400" dirty="0">
-                <a:latin typeface="Ubuntu" panose="020B0504030602030204" charset="0"/>
-                <a:cs typeface="Ubuntu" panose="020B0504030602030204" charset="0"/>
-              </a:rPr>
-              <a:t> Involves maintaining a uniform format throughout the dataset. Data entries should follow the same standards and formatting conventions.</a:t>
+                <a:solidFill>
+                  <a:schemeClr val="bg2">
+                    <a:lumMod val="60000"/>
+                    <a:lumOff val="40000"/>
+                  </a:schemeClr>
+                </a:solidFill>
+                <a:latin typeface="Ubuntu" panose="020B0504030602030204" charset="0"/>
+                <a:cs typeface="Ubuntu" panose="020B0504030602030204" charset="0"/>
+              </a:rPr>
+              <a:t>Lab</a:t>
             </a:r>
             <a:endParaRPr lang="en-US" altLang="ar-EG" sz="2400" dirty="0">
-              <a:latin typeface="Ubuntu" panose="020B0504030602030204" charset="0"/>
-              <a:cs typeface="Ubuntu" panose="020B0504030602030204" charset="0"/>
-            </a:endParaRPr>
-          </a:p>
-          <a:p>
-            <a:pPr algn="l"/>
-            <a:r>
-              <a:rPr lang="en-US" altLang="ar-EG" sz="2400" b="1" dirty="0">
-                <a:latin typeface="Ubuntu" panose="020B0504030602030204" charset="0"/>
-                <a:cs typeface="Ubuntu" panose="020B0504030602030204" charset="0"/>
-              </a:rPr>
-              <a:t>Validity: </a:t>
-            </a:r>
-            <a:r>
-              <a:rPr lang="en-US" altLang="ar-EG" sz="2400" dirty="0">
-                <a:latin typeface="Ubuntu" panose="020B0504030602030204" charset="0"/>
-                <a:cs typeface="Ubuntu" panose="020B0504030602030204" charset="0"/>
-              </a:rPr>
-              <a:t>Valid data adheres to the constraints and rules established for its use. It satisfies criteria such as range, format, and domain constraints.</a:t>
-            </a:r>
-            <a:endParaRPr lang="en-US" altLang="ar-EG" sz="2400" dirty="0">
-              <a:latin typeface="Ubuntu" panose="020B0504030602030204" charset="0"/>
-              <a:cs typeface="Ubuntu" panose="020B0504030602030204" charset="0"/>
-            </a:endParaRPr>
-          </a:p>
-          <a:p>
-            <a:pPr algn="l"/>
-            <a:endParaRPr lang="en-US" altLang="ar-EG" sz="2400" dirty="0">
+              <a:solidFill>
+                <a:schemeClr val="bg2">
+                  <a:lumMod val="60000"/>
+                  <a:lumOff val="40000"/>
+                </a:schemeClr>
+              </a:solidFill>
               <a:latin typeface="Ubuntu" panose="020B0504030602030204" charset="0"/>
               <a:cs typeface="Ubuntu" panose="020B0504030602030204" charset="0"/>
             </a:endParaRPr>
@@ -7622,6 +8803,388 @@
 </file>
 
 <file path=ppt/slides/slide6.xml><?xml version="1.0" encoding="utf-8"?>
+<p:sld xmlns:a="http://schemas.openxmlformats.org/drawingml/2006/main" xmlns:r="http://schemas.openxmlformats.org/officeDocument/2006/relationships" xmlns:p="http://schemas.openxmlformats.org/presentationml/2006/main">
+  <p:cSld>
+    <p:spTree>
+      <p:nvGrpSpPr>
+        <p:cNvPr id="1" name=""/>
+        <p:cNvGrpSpPr/>
+        <p:nvPr/>
+      </p:nvGrpSpPr>
+      <p:grpSpPr>
+        <a:xfrm>
+          <a:off x="0" y="0"/>
+          <a:ext cx="0" cy="0"/>
+          <a:chOff x="0" y="0"/>
+          <a:chExt cx="0" cy="0"/>
+        </a:xfrm>
+      </p:grpSpPr>
+      <p:sp>
+        <p:nvSpPr>
+          <p:cNvPr id="2" name="Title 1"/>
+          <p:cNvSpPr>
+            <a:spLocks noGrp="1"/>
+          </p:cNvSpPr>
+          <p:nvPr>
+            <p:ph type="title"/>
+          </p:nvPr>
+        </p:nvSpPr>
+        <p:spPr/>
+        <p:txBody>
+          <a:bodyPr/>
+          <a:lstStyle/>
+          <a:p>
+            <a:pPr algn="l"/>
+            <a:r>
+              <a:rPr lang="en-US">
+                <a:latin typeface="Ubuntu" panose="020B0504030602030204" charset="0"/>
+                <a:cs typeface="Ubuntu" panose="020B0504030602030204" charset="0"/>
+              </a:rPr>
+              <a:t>Importance of High Quality Data</a:t>
+            </a:r>
+            <a:endParaRPr lang="en-US">
+              <a:latin typeface="Ubuntu" panose="020B0504030602030204" charset="0"/>
+              <a:cs typeface="Ubuntu" panose="020B0504030602030204" charset="0"/>
+            </a:endParaRPr>
+          </a:p>
+        </p:txBody>
+      </p:sp>
+      <p:sp>
+        <p:nvSpPr>
+          <p:cNvPr id="3" name="Content Placeholder 2"/>
+          <p:cNvSpPr>
+            <a:spLocks noGrp="1"/>
+          </p:cNvSpPr>
+          <p:nvPr>
+            <p:ph idx="1"/>
+          </p:nvPr>
+        </p:nvSpPr>
+        <p:spPr/>
+        <p:txBody>
+          <a:bodyPr/>
+          <a:lstStyle/>
+          <a:p>
+            <a:pPr algn="l"/>
+            <a:r>
+              <a:rPr lang="en-US" altLang="ar-EG" sz="2400" b="1" dirty="0">
+                <a:latin typeface="Ubuntu" panose="020B0504030602030204" charset="0"/>
+                <a:cs typeface="Ubuntu" panose="020B0504030602030204" charset="0"/>
+              </a:rPr>
+              <a:t>Accurate Decision-Making: </a:t>
+            </a:r>
+            <a:r>
+              <a:rPr lang="en-US" altLang="ar-EG" sz="2400" dirty="0">
+                <a:latin typeface="Ubuntu" panose="020B0504030602030204" charset="0"/>
+                <a:cs typeface="Ubuntu" panose="020B0504030602030204" charset="0"/>
+              </a:rPr>
+              <a:t>High-quality data leads to more accurate and informed decision-making.</a:t>
+            </a:r>
+            <a:endParaRPr lang="en-US" altLang="ar-EG" sz="2400" dirty="0">
+              <a:latin typeface="Ubuntu" panose="020B0504030602030204" charset="0"/>
+              <a:cs typeface="Ubuntu" panose="020B0504030602030204" charset="0"/>
+            </a:endParaRPr>
+          </a:p>
+          <a:p>
+            <a:pPr algn="l"/>
+            <a:r>
+              <a:rPr lang="en-US" altLang="ar-EG" sz="2400" b="1" dirty="0">
+                <a:latin typeface="Ubuntu" panose="020B0504030602030204" charset="0"/>
+                <a:cs typeface="Ubuntu" panose="020B0504030602030204" charset="0"/>
+              </a:rPr>
+              <a:t>Accurate Insights: </a:t>
+            </a:r>
+            <a:r>
+              <a:rPr lang="en-US" altLang="ar-EG" sz="2400" dirty="0">
+                <a:latin typeface="Ubuntu" panose="020B0504030602030204" charset="0"/>
+                <a:cs typeface="Ubuntu" panose="020B0504030602030204" charset="0"/>
+              </a:rPr>
+              <a:t>Data quality ensures that the insights derived from data analysis are reliable and precise.</a:t>
+            </a:r>
+            <a:endParaRPr lang="en-US" altLang="ar-EG" sz="2400" b="1" dirty="0">
+              <a:latin typeface="Ubuntu" panose="020B0504030602030204" charset="0"/>
+              <a:cs typeface="Ubuntu" panose="020B0504030602030204" charset="0"/>
+            </a:endParaRPr>
+          </a:p>
+          <a:p>
+            <a:pPr algn="l"/>
+            <a:r>
+              <a:rPr lang="en-US" altLang="ar-EG" sz="2400" b="1" dirty="0">
+                <a:latin typeface="Ubuntu" panose="020B0504030602030204" charset="0"/>
+                <a:cs typeface="Ubuntu" panose="020B0504030602030204" charset="0"/>
+              </a:rPr>
+              <a:t>Reduced Risks: </a:t>
+            </a:r>
+            <a:r>
+              <a:rPr lang="en-US" altLang="ar-EG" sz="2400" dirty="0">
+                <a:latin typeface="Ubuntu" panose="020B0504030602030204" charset="0"/>
+                <a:cs typeface="Ubuntu" panose="020B0504030602030204" charset="0"/>
+              </a:rPr>
+              <a:t>Poor-quality data can result in poor decision-making, exposing businesses to financial and reputational risks. </a:t>
+            </a:r>
+            <a:endParaRPr lang="en-US" altLang="ar-EG" sz="2400" dirty="0">
+              <a:latin typeface="Ubuntu" panose="020B0504030602030204" charset="0"/>
+              <a:cs typeface="Ubuntu" panose="020B0504030602030204" charset="0"/>
+            </a:endParaRPr>
+          </a:p>
+          <a:p>
+            <a:pPr algn="l"/>
+            <a:r>
+              <a:rPr lang="en-US" altLang="ar-EG" sz="2400" b="1" dirty="0">
+                <a:latin typeface="Ubuntu" panose="020B0504030602030204" charset="0"/>
+                <a:cs typeface="Ubuntu" panose="020B0504030602030204" charset="0"/>
+              </a:rPr>
+              <a:t>Cost Savings: </a:t>
+            </a:r>
+            <a:r>
+              <a:rPr lang="en-US" altLang="ar-EG" sz="2400" dirty="0">
+                <a:latin typeface="Ubuntu" panose="020B0504030602030204" charset="0"/>
+                <a:cs typeface="Ubuntu" panose="020B0504030602030204" charset="0"/>
+              </a:rPr>
+              <a:t>Using high-quality data in data analytics reduces the potential for wasted resources and efforts.</a:t>
+            </a:r>
+            <a:endParaRPr lang="en-US" altLang="ar-EG" sz="2400" dirty="0">
+              <a:latin typeface="Ubuntu" panose="020B0504030602030204" charset="0"/>
+              <a:cs typeface="Ubuntu" panose="020B0504030602030204" charset="0"/>
+            </a:endParaRPr>
+          </a:p>
+          <a:p>
+            <a:pPr algn="l"/>
+            <a:r>
+              <a:rPr lang="en-US" altLang="ar-EG" sz="2400" b="1" dirty="0">
+                <a:latin typeface="Ubuntu" panose="020B0504030602030204" charset="0"/>
+                <a:cs typeface="Ubuntu" panose="020B0504030602030204" charset="0"/>
+              </a:rPr>
+              <a:t>Improved Customer Experience: </a:t>
+            </a:r>
+            <a:r>
+              <a:rPr lang="en-US" altLang="ar-EG" sz="2400" dirty="0">
+                <a:latin typeface="Ubuntu" panose="020B0504030602030204" charset="0"/>
+                <a:cs typeface="Ubuntu" panose="020B0504030602030204" charset="0"/>
+              </a:rPr>
+              <a:t>Data quality is crucial for enhancing the customer experience through personalized marketing and engagement strategies. </a:t>
+            </a:r>
+            <a:endParaRPr lang="en-US" altLang="ar-EG" sz="2400" dirty="0">
+              <a:latin typeface="Ubuntu" panose="020B0504030602030204" charset="0"/>
+              <a:cs typeface="Ubuntu" panose="020B0504030602030204" charset="0"/>
+            </a:endParaRPr>
+          </a:p>
+        </p:txBody>
+      </p:sp>
+    </p:spTree>
+  </p:cSld>
+  <p:clrMapOvr>
+    <a:masterClrMapping/>
+  </p:clrMapOvr>
+  <mc:AlternateContent xmlns:mc="http://schemas.openxmlformats.org/markup-compatibility/2006">
+    <mc:Choice xmlns:p14="http://schemas.microsoft.com/office/powerpoint/2010/main" Requires="p14">
+      <p:transition spd="slow" p14:dur="1200"/>
+    </mc:Choice>
+    <mc:Fallback>
+      <p:transition spd="slow"/>
+    </mc:Fallback>
+  </mc:AlternateContent>
+</p:sld>
+</file>
+
+<file path=ppt/slides/slide7.xml><?xml version="1.0" encoding="utf-8"?>
+<p:sld xmlns:a="http://schemas.openxmlformats.org/drawingml/2006/main" xmlns:r="http://schemas.openxmlformats.org/officeDocument/2006/relationships" xmlns:p="http://schemas.openxmlformats.org/presentationml/2006/main">
+  <p:cSld>
+    <p:spTree>
+      <p:nvGrpSpPr>
+        <p:cNvPr id="1" name=""/>
+        <p:cNvGrpSpPr/>
+        <p:nvPr/>
+      </p:nvGrpSpPr>
+      <p:grpSpPr>
+        <a:xfrm>
+          <a:off x="0" y="0"/>
+          <a:ext cx="0" cy="0"/>
+          <a:chOff x="0" y="0"/>
+          <a:chExt cx="0" cy="0"/>
+        </a:xfrm>
+      </p:grpSpPr>
+      <p:sp>
+        <p:nvSpPr>
+          <p:cNvPr id="2" name="Title 1"/>
+          <p:cNvSpPr>
+            <a:spLocks noGrp="1"/>
+          </p:cNvSpPr>
+          <p:nvPr>
+            <p:ph type="title"/>
+          </p:nvPr>
+        </p:nvSpPr>
+        <p:spPr/>
+        <p:txBody>
+          <a:bodyPr/>
+          <a:lstStyle/>
+          <a:p>
+            <a:pPr algn="l"/>
+            <a:r>
+              <a:rPr lang="en-US">
+                <a:latin typeface="Ubuntu" panose="020B0504030602030204" charset="0"/>
+                <a:cs typeface="Ubuntu" panose="020B0504030602030204" charset="0"/>
+              </a:rPr>
+              <a:t>What does good data quality look like?</a:t>
+            </a:r>
+            <a:endParaRPr lang="en-US">
+              <a:latin typeface="Ubuntu" panose="020B0504030602030204" charset="0"/>
+              <a:cs typeface="Ubuntu" panose="020B0504030602030204" charset="0"/>
+            </a:endParaRPr>
+          </a:p>
+        </p:txBody>
+      </p:sp>
+      <p:sp>
+        <p:nvSpPr>
+          <p:cNvPr id="3" name="Content Placeholder 2"/>
+          <p:cNvSpPr>
+            <a:spLocks noGrp="1"/>
+          </p:cNvSpPr>
+          <p:nvPr>
+            <p:ph idx="1"/>
+          </p:nvPr>
+        </p:nvSpPr>
+        <p:spPr/>
+        <p:txBody>
+          <a:bodyPr/>
+          <a:lstStyle/>
+          <a:p>
+            <a:pPr algn="l"/>
+            <a:r>
+              <a:rPr lang="en-US" altLang="ar-EG" sz="2400" b="1" dirty="0">
+                <a:latin typeface="Ubuntu" panose="020B0504030602030204" charset="0"/>
+                <a:cs typeface="Ubuntu" panose="020B0504030602030204" charset="0"/>
+              </a:rPr>
+              <a:t>Accuracy: </a:t>
+            </a:r>
+            <a:r>
+              <a:rPr lang="en-US" altLang="ar-EG" sz="2400" dirty="0">
+                <a:latin typeface="Ubuntu" panose="020B0504030602030204" charset="0"/>
+                <a:cs typeface="Ubuntu" panose="020B0504030602030204" charset="0"/>
+              </a:rPr>
+              <a:t>Accurate data is free from errors and reflects the real-world entities and events it represents.</a:t>
+            </a:r>
+            <a:endParaRPr lang="en-US" altLang="ar-EG" sz="2400" b="1" dirty="0">
+              <a:latin typeface="Ubuntu" panose="020B0504030602030204" charset="0"/>
+              <a:cs typeface="Ubuntu" panose="020B0504030602030204" charset="0"/>
+            </a:endParaRPr>
+          </a:p>
+          <a:p>
+            <a:pPr algn="l"/>
+            <a:r>
+              <a:rPr lang="en-US" altLang="ar-EG" sz="2400" b="1" dirty="0">
+                <a:latin typeface="Ubuntu" panose="020B0504030602030204" charset="0"/>
+                <a:cs typeface="Ubuntu" panose="020B0504030602030204" charset="0"/>
+              </a:rPr>
+              <a:t>Uniqueness:</a:t>
+            </a:r>
+            <a:r>
+              <a:rPr lang="en-US" altLang="ar-EG" sz="2400" dirty="0">
+                <a:latin typeface="Ubuntu" panose="020B0504030602030204" charset="0"/>
+                <a:cs typeface="Ubuntu" panose="020B0504030602030204" charset="0"/>
+              </a:rPr>
+              <a:t> Good data quality ensures that there are no duplicate entries in the dataset. This uniqueness helps maintain data cleanliness and precision.</a:t>
+            </a:r>
+            <a:endParaRPr lang="en-US" altLang="ar-EG" sz="2400" dirty="0">
+              <a:latin typeface="Ubuntu" panose="020B0504030602030204" charset="0"/>
+              <a:cs typeface="Ubuntu" panose="020B0504030602030204" charset="0"/>
+            </a:endParaRPr>
+          </a:p>
+          <a:p>
+            <a:pPr algn="l"/>
+            <a:r>
+              <a:rPr lang="en-US" altLang="ar-EG" sz="2400" b="1" dirty="0">
+                <a:latin typeface="Ubuntu" panose="020B0504030602030204" charset="0"/>
+                <a:cs typeface="Ubuntu" panose="020B0504030602030204" charset="0"/>
+              </a:rPr>
+              <a:t>Completeness: </a:t>
+            </a:r>
+            <a:r>
+              <a:rPr lang="en-US" altLang="ar-EG" sz="2400" dirty="0">
+                <a:latin typeface="Ubuntu" panose="020B0504030602030204" charset="0"/>
+                <a:cs typeface="Ubuntu" panose="020B0504030602030204" charset="0"/>
+              </a:rPr>
+              <a:t>C</a:t>
+            </a:r>
+            <a:r>
+              <a:rPr lang="en-US" altLang="ar-EG" sz="2400" dirty="0">
+                <a:latin typeface="Ubuntu" panose="020B0504030602030204" charset="0"/>
+                <a:cs typeface="Ubuntu" panose="020B0504030602030204" charset="0"/>
+              </a:rPr>
+              <a:t>ontains all the necessary information required for its intended use. It lacks gaps, missing values, or omissions.</a:t>
+            </a:r>
+            <a:endParaRPr lang="en-US" altLang="ar-EG" sz="2400" dirty="0">
+              <a:latin typeface="Ubuntu" panose="020B0504030602030204" charset="0"/>
+              <a:cs typeface="Ubuntu" panose="020B0504030602030204" charset="0"/>
+            </a:endParaRPr>
+          </a:p>
+          <a:p>
+            <a:pPr algn="l"/>
+            <a:r>
+              <a:rPr lang="en-US" altLang="ar-EG" sz="2400" b="1" dirty="0">
+                <a:latin typeface="Ubuntu" panose="020B0504030602030204" charset="0"/>
+                <a:cs typeface="Ubuntu" panose="020B0504030602030204" charset="0"/>
+              </a:rPr>
+              <a:t>Consistency:</a:t>
+            </a:r>
+            <a:r>
+              <a:rPr lang="en-US" altLang="ar-EG" sz="2400" dirty="0">
+                <a:latin typeface="Ubuntu" panose="020B0504030602030204" charset="0"/>
+                <a:cs typeface="Ubuntu" panose="020B0504030602030204" charset="0"/>
+              </a:rPr>
+              <a:t> Involves maintaining a uniform format throughout the dataset. Data entries should follow the same standards and formatting conventions.</a:t>
+            </a:r>
+            <a:endParaRPr lang="en-US" altLang="ar-EG" sz="2400" dirty="0">
+              <a:latin typeface="Ubuntu" panose="020B0504030602030204" charset="0"/>
+              <a:cs typeface="Ubuntu" panose="020B0504030602030204" charset="0"/>
+            </a:endParaRPr>
+          </a:p>
+          <a:p>
+            <a:pPr algn="l"/>
+            <a:r>
+              <a:rPr lang="en-US" altLang="ar-EG" sz="2400" b="1" dirty="0">
+                <a:latin typeface="Ubuntu" panose="020B0504030602030204" charset="0"/>
+                <a:cs typeface="Ubuntu" panose="020B0504030602030204" charset="0"/>
+              </a:rPr>
+              <a:t>Validity: </a:t>
+            </a:r>
+            <a:r>
+              <a:rPr lang="en-US" altLang="ar-EG" sz="2400" dirty="0">
+                <a:latin typeface="Ubuntu" panose="020B0504030602030204" charset="0"/>
+                <a:cs typeface="Ubuntu" panose="020B0504030602030204" charset="0"/>
+              </a:rPr>
+              <a:t>Valid data adheres to the constraints and rules established for its use. It satisfies criteria such as range, format, and domain constraints.</a:t>
+            </a:r>
+            <a:endParaRPr lang="en-US" altLang="ar-EG" sz="2400" dirty="0">
+              <a:latin typeface="Ubuntu" panose="020B0504030602030204" charset="0"/>
+              <a:cs typeface="Ubuntu" panose="020B0504030602030204" charset="0"/>
+            </a:endParaRPr>
+          </a:p>
+          <a:p>
+            <a:pPr algn="l"/>
+            <a:endParaRPr lang="en-US" altLang="ar-EG" sz="2400" dirty="0">
+              <a:latin typeface="Ubuntu" panose="020B0504030602030204" charset="0"/>
+              <a:cs typeface="Ubuntu" panose="020B0504030602030204" charset="0"/>
+            </a:endParaRPr>
+          </a:p>
+        </p:txBody>
+      </p:sp>
+    </p:spTree>
+  </p:cSld>
+  <p:clrMapOvr>
+    <a:masterClrMapping/>
+  </p:clrMapOvr>
+  <mc:AlternateContent xmlns:mc="http://schemas.openxmlformats.org/markup-compatibility/2006">
+    <mc:Choice xmlns:p14="http://schemas.microsoft.com/office/powerpoint/2010/main" Requires="p14">
+      <p:transition spd="slow" p14:dur="1200"/>
+    </mc:Choice>
+    <mc:Fallback>
+      <p:transition spd="slow"/>
+    </mc:Fallback>
+  </mc:AlternateContent>
+</p:sld>
+</file>
+
+<file path=ppt/slides/slide8.xml><?xml version="1.0" encoding="utf-8"?>
 <p:sld xmlns:a="http://schemas.openxmlformats.org/drawingml/2006/main" xmlns:r="http://schemas.openxmlformats.org/officeDocument/2006/relationships" xmlns:p="http://schemas.openxmlformats.org/presentationml/2006/main">
   <p:cSld>
     <p:spTree>
@@ -7929,258 +9492,6 @@
 </p:sld>
 </file>
 
-<file path=ppt/slides/slide7.xml><?xml version="1.0" encoding="utf-8"?>
-<p:sld xmlns:a="http://schemas.openxmlformats.org/drawingml/2006/main" xmlns:r="http://schemas.openxmlformats.org/officeDocument/2006/relationships" xmlns:p="http://schemas.openxmlformats.org/presentationml/2006/main">
-  <p:cSld>
-    <p:spTree>
-      <p:nvGrpSpPr>
-        <p:cNvPr id="1" name=""/>
-        <p:cNvGrpSpPr/>
-        <p:nvPr/>
-      </p:nvGrpSpPr>
-      <p:grpSpPr>
-        <a:xfrm>
-          <a:off x="0" y="0"/>
-          <a:ext cx="0" cy="0"/>
-          <a:chOff x="0" y="0"/>
-          <a:chExt cx="0" cy="0"/>
-        </a:xfrm>
-      </p:grpSpPr>
-      <p:sp>
-        <p:nvSpPr>
-          <p:cNvPr id="2" name="Title 1"/>
-          <p:cNvSpPr>
-            <a:spLocks noGrp="1"/>
-          </p:cNvSpPr>
-          <p:nvPr>
-            <p:ph type="title"/>
-          </p:nvPr>
-        </p:nvSpPr>
-        <p:spPr/>
-        <p:txBody>
-          <a:bodyPr/>
-          <a:lstStyle/>
-          <a:p>
-            <a:pPr algn="l"/>
-            <a:r>
-              <a:rPr lang="en-US">
-                <a:latin typeface="Ubuntu" panose="020B0504030602030204" charset="0"/>
-                <a:cs typeface="Ubuntu" panose="020B0504030602030204" charset="0"/>
-              </a:rPr>
-              <a:t>Handle Missing Values </a:t>
-            </a:r>
-            <a:endParaRPr lang="en-US">
-              <a:latin typeface="Ubuntu" panose="020B0504030602030204" charset="0"/>
-              <a:cs typeface="Ubuntu" panose="020B0504030602030204" charset="0"/>
-            </a:endParaRPr>
-          </a:p>
-        </p:txBody>
-      </p:sp>
-      <p:sp>
-        <p:nvSpPr>
-          <p:cNvPr id="3" name="Content Placeholder 2"/>
-          <p:cNvSpPr>
-            <a:spLocks noGrp="1"/>
-          </p:cNvSpPr>
-          <p:nvPr>
-            <p:ph idx="1"/>
-          </p:nvPr>
-        </p:nvSpPr>
-        <p:spPr/>
-        <p:txBody>
-          <a:bodyPr/>
-          <a:lstStyle/>
-          <a:p>
-            <a:pPr algn="l"/>
-            <a:r>
-              <a:rPr lang="en-US" altLang="ar-EG" sz="2400" dirty="0">
-                <a:latin typeface="Ubuntu" panose="020B0504030602030204" charset="0"/>
-                <a:cs typeface="Ubuntu" panose="020B0504030602030204" charset="0"/>
-              </a:rPr>
-              <a:t>Removal of missing data (list when it's appropriate).</a:t>
-            </a:r>
-            <a:endParaRPr lang="en-US" altLang="ar-EG" sz="2400" dirty="0">
-              <a:latin typeface="Ubuntu" panose="020B0504030602030204" charset="0"/>
-              <a:cs typeface="Ubuntu" panose="020B0504030602030204" charset="0"/>
-            </a:endParaRPr>
-          </a:p>
-          <a:p>
-            <a:pPr algn="l"/>
-            <a:r>
-              <a:rPr lang="en-US" altLang="ar-EG" sz="2400" dirty="0">
-                <a:latin typeface="Ubuntu" panose="020B0504030602030204" charset="0"/>
-                <a:cs typeface="Ubuntu" panose="020B0504030602030204" charset="0"/>
-              </a:rPr>
-              <a:t>Mean, median, and mode imputation.</a:t>
-            </a:r>
-            <a:endParaRPr lang="en-US" altLang="ar-EG" sz="2400" dirty="0">
-              <a:latin typeface="Ubuntu" panose="020B0504030602030204" charset="0"/>
-              <a:cs typeface="Ubuntu" panose="020B0504030602030204" charset="0"/>
-            </a:endParaRPr>
-          </a:p>
-          <a:p>
-            <a:pPr algn="l"/>
-            <a:r>
-              <a:rPr lang="en-US" altLang="ar-EG" sz="2400" dirty="0">
-                <a:latin typeface="Ubuntu" panose="020B0504030602030204" charset="0"/>
-                <a:cs typeface="Ubuntu" panose="020B0504030602030204" charset="0"/>
-              </a:rPr>
-              <a:t>Forward and backward fill imputation.</a:t>
-            </a:r>
-            <a:endParaRPr lang="en-US" altLang="ar-EG" sz="2400" dirty="0">
-              <a:latin typeface="Ubuntu" panose="020B0504030602030204" charset="0"/>
-              <a:cs typeface="Ubuntu" panose="020B0504030602030204" charset="0"/>
-            </a:endParaRPr>
-          </a:p>
-          <a:p>
-            <a:pPr algn="l"/>
-            <a:r>
-              <a:rPr lang="en-US" altLang="ar-EG" sz="2400" dirty="0">
-                <a:latin typeface="Ubuntu" panose="020B0504030602030204" charset="0"/>
-                <a:cs typeface="Ubuntu" panose="020B0504030602030204" charset="0"/>
-              </a:rPr>
-              <a:t>Regression imputation.</a:t>
-            </a:r>
-            <a:endParaRPr lang="en-US" altLang="ar-EG" sz="2400" dirty="0">
-              <a:latin typeface="Ubuntu" panose="020B0504030602030204" charset="0"/>
-              <a:cs typeface="Ubuntu" panose="020B0504030602030204" charset="0"/>
-            </a:endParaRPr>
-          </a:p>
-          <a:p>
-            <a:pPr algn="l"/>
-            <a:r>
-              <a:rPr lang="en-US" altLang="ar-EG" sz="2400" dirty="0">
-                <a:latin typeface="Ubuntu" panose="020B0504030602030204" charset="0"/>
-                <a:cs typeface="Ubuntu" panose="020B0504030602030204" charset="0"/>
-              </a:rPr>
-              <a:t>K-Nearest Neighbors (K-NN) imputation.</a:t>
-            </a:r>
-            <a:endParaRPr lang="en-US" altLang="ar-EG" sz="2400" dirty="0">
-              <a:latin typeface="Ubuntu" panose="020B0504030602030204" charset="0"/>
-              <a:cs typeface="Ubuntu" panose="020B0504030602030204" charset="0"/>
-            </a:endParaRPr>
-          </a:p>
-          <a:p>
-            <a:pPr algn="l"/>
-            <a:r>
-              <a:rPr lang="en-US" altLang="ar-EG" sz="2400" dirty="0">
-                <a:latin typeface="Ubuntu" panose="020B0504030602030204" charset="0"/>
-                <a:cs typeface="Ubuntu" panose="020B0504030602030204" charset="0"/>
-              </a:rPr>
-              <a:t>Multivariate imputation by chained equations (MICE)</a:t>
-            </a:r>
-            <a:endParaRPr lang="en-US" altLang="ar-EG" sz="2400" dirty="0">
-              <a:latin typeface="Ubuntu" panose="020B0504030602030204" charset="0"/>
-              <a:cs typeface="Ubuntu" panose="020B0504030602030204" charset="0"/>
-            </a:endParaRPr>
-          </a:p>
-        </p:txBody>
-      </p:sp>
-    </p:spTree>
-  </p:cSld>
-  <p:clrMapOvr>
-    <a:masterClrMapping/>
-  </p:clrMapOvr>
-  <mc:AlternateContent xmlns:mc="http://schemas.openxmlformats.org/markup-compatibility/2006">
-    <mc:Choice xmlns:p14="http://schemas.microsoft.com/office/powerpoint/2010/main" Requires="p14">
-      <p:transition spd="slow" p14:dur="1200"/>
-    </mc:Choice>
-    <mc:Fallback>
-      <p:transition spd="slow"/>
-    </mc:Fallback>
-  </mc:AlternateContent>
-</p:sld>
-</file>
-
-<file path=ppt/slides/slide8.xml><?xml version="1.0" encoding="utf-8"?>
-<p:sld xmlns:a="http://schemas.openxmlformats.org/drawingml/2006/main" xmlns:r="http://schemas.openxmlformats.org/officeDocument/2006/relationships" xmlns:p="http://schemas.openxmlformats.org/presentationml/2006/main">
-  <p:cSld>
-    <p:spTree>
-      <p:nvGrpSpPr>
-        <p:cNvPr id="1" name=""/>
-        <p:cNvGrpSpPr/>
-        <p:nvPr/>
-      </p:nvGrpSpPr>
-      <p:grpSpPr>
-        <a:xfrm>
-          <a:off x="0" y="0"/>
-          <a:ext cx="0" cy="0"/>
-          <a:chOff x="0" y="0"/>
-          <a:chExt cx="0" cy="0"/>
-        </a:xfrm>
-      </p:grpSpPr>
-      <p:sp>
-        <p:nvSpPr>
-          <p:cNvPr id="2" name="Title 1"/>
-          <p:cNvSpPr>
-            <a:spLocks noGrp="1"/>
-          </p:cNvSpPr>
-          <p:nvPr>
-            <p:ph type="title"/>
-          </p:nvPr>
-        </p:nvSpPr>
-        <p:spPr/>
-        <p:txBody>
-          <a:bodyPr/>
-          <a:lstStyle/>
-          <a:p>
-            <a:pPr algn="l"/>
-            <a:r>
-              <a:rPr lang="en-US">
-                <a:latin typeface="Ubuntu" panose="020B0504030602030204" charset="0"/>
-                <a:cs typeface="Ubuntu" panose="020B0504030602030204" charset="0"/>
-              </a:rPr>
-              <a:t>Handle Missing Values </a:t>
-            </a:r>
-            <a:endParaRPr lang="en-US">
-              <a:latin typeface="Ubuntu" panose="020B0504030602030204" charset="0"/>
-              <a:cs typeface="Ubuntu" panose="020B0504030602030204" charset="0"/>
-            </a:endParaRPr>
-          </a:p>
-        </p:txBody>
-      </p:sp>
-      <p:pic>
-        <p:nvPicPr>
-          <p:cNvPr id="4" name="Content Placeholder 3"/>
-          <p:cNvPicPr>
-            <a:picLocks noChangeAspect="1"/>
-          </p:cNvPicPr>
-          <p:nvPr>
-            <p:ph idx="1"/>
-          </p:nvPr>
-        </p:nvPicPr>
-        <p:blipFill>
-          <a:blip r:embed="rId1"/>
-          <a:stretch>
-            <a:fillRect/>
-          </a:stretch>
-        </p:blipFill>
-        <p:spPr>
-          <a:xfrm>
-            <a:off x="407670" y="1417955"/>
-            <a:ext cx="11376660" cy="5123180"/>
-          </a:xfrm>
-          <a:prstGeom prst="rect">
-            <a:avLst/>
-          </a:prstGeom>
-        </p:spPr>
-      </p:pic>
-    </p:spTree>
-  </p:cSld>
-  <p:clrMapOvr>
-    <a:masterClrMapping/>
-  </p:clrMapOvr>
-  <mc:AlternateContent xmlns:mc="http://schemas.openxmlformats.org/markup-compatibility/2006">
-    <mc:Choice xmlns:p14="http://schemas.microsoft.com/office/powerpoint/2010/main" Requires="p14">
-      <p:transition spd="slow" p14:dur="1200"/>
-    </mc:Choice>
-    <mc:Fallback>
-      <p:transition spd="slow"/>
-    </mc:Fallback>
-  </mc:AlternateContent>
-</p:sld>
-</file>
-
 <file path=ppt/slides/slide9.xml><?xml version="1.0" encoding="utf-8"?>
 <p:sld xmlns:a="http://schemas.openxmlformats.org/drawingml/2006/main" xmlns:r="http://schemas.openxmlformats.org/officeDocument/2006/relationships" xmlns:p="http://schemas.openxmlformats.org/presentationml/2006/main">
   <p:cSld>
@@ -8215,17 +9526,15 @@
           <a:p>
             <a:pPr algn="l"/>
             <a:r>
-              <a:rPr lang="en-US" altLang="ar-EG" dirty="0">
-                <a:latin typeface="Ubuntu" panose="020B0504030602030204" charset="0"/>
-                <a:cs typeface="Ubuntu" panose="020B0504030602030204" charset="0"/>
-                <a:sym typeface="+mn-ea"/>
-              </a:rPr>
-              <a:t>Removing Missing Data</a:t>
-            </a:r>
-            <a:endParaRPr lang="en-US" altLang="ar-EG" dirty="0">
-              <a:latin typeface="Ubuntu" panose="020B0504030602030204" charset="0"/>
-              <a:cs typeface="Ubuntu" panose="020B0504030602030204" charset="0"/>
-              <a:sym typeface="+mn-ea"/>
+              <a:rPr lang="en-US">
+                <a:latin typeface="Ubuntu" panose="020B0504030602030204" charset="0"/>
+                <a:cs typeface="Ubuntu" panose="020B0504030602030204" charset="0"/>
+              </a:rPr>
+              <a:t>Outline</a:t>
+            </a:r>
+            <a:endParaRPr lang="en-US">
+              <a:latin typeface="Ubuntu" panose="020B0504030602030204" charset="0"/>
+              <a:cs typeface="Ubuntu" panose="020B0504030602030204" charset="0"/>
             </a:endParaRPr>
           </a:p>
         </p:txBody>
@@ -8245,59 +9554,74 @@
           <a:bodyPr/>
           <a:lstStyle/>
           <a:p>
-            <a:pPr marL="0" indent="0" algn="l">
-              <a:buNone/>
+            <a:pPr marL="457200" indent="-457200" algn="l">
+              <a:buFont typeface="+mj-lt"/>
+              <a:buAutoNum type="arabicPeriod"/>
             </a:pPr>
             <a:r>
               <a:rPr lang="en-US" altLang="ar-EG" sz="2400" dirty="0">
-                <a:latin typeface="Ubuntu" panose="020B0504030602030204" charset="0"/>
-                <a:cs typeface="Ubuntu" panose="020B0504030602030204" charset="0"/>
-              </a:rPr>
-              <a:t>Removal of missing data involves eliminating rows or columns with missing values from the dataset.</a:t>
+                <a:solidFill>
+                  <a:schemeClr val="bg2">
+                    <a:lumMod val="60000"/>
+                    <a:lumOff val="40000"/>
+                  </a:schemeClr>
+                </a:solidFill>
+                <a:latin typeface="Ubuntu" panose="020B0504030602030204" charset="0"/>
+                <a:cs typeface="Ubuntu" panose="020B0504030602030204" charset="0"/>
+              </a:rPr>
+              <a:t>Tools</a:t>
             </a:r>
             <a:endParaRPr lang="en-US" altLang="ar-EG" sz="2400" dirty="0">
-              <a:latin typeface="Ubuntu" panose="020B0504030602030204" charset="0"/>
-              <a:cs typeface="Ubuntu" panose="020B0504030602030204" charset="0"/>
-            </a:endParaRPr>
-          </a:p>
-          <a:p>
-            <a:pPr marL="0" indent="0" algn="l">
-              <a:buNone/>
+              <a:solidFill>
+                <a:schemeClr val="bg2">
+                  <a:lumMod val="60000"/>
+                  <a:lumOff val="40000"/>
+                </a:schemeClr>
+              </a:solidFill>
+              <a:latin typeface="Ubuntu" panose="020B0504030602030204" charset="0"/>
+              <a:cs typeface="Ubuntu" panose="020B0504030602030204" charset="0"/>
+            </a:endParaRPr>
+          </a:p>
+          <a:p>
+            <a:pPr marL="457200" indent="-457200" algn="l">
+              <a:buFont typeface="+mj-lt"/>
+              <a:buAutoNum type="arabicPeriod"/>
             </a:pPr>
             <a:r>
-              <a:rPr lang="en-US" altLang="ar-EG" sz="2400" b="1" dirty="0">
-                <a:latin typeface="Ubuntu" panose="020B0504030602030204" charset="0"/>
-                <a:cs typeface="Ubuntu" panose="020B0504030602030204" charset="0"/>
-              </a:rPr>
-              <a:t>Appropriate when:</a:t>
-            </a:r>
-            <a:endParaRPr lang="en-US" altLang="ar-EG" sz="2400" b="1" dirty="0">
-              <a:latin typeface="Ubuntu" panose="020B0504030602030204" charset="0"/>
-              <a:cs typeface="Ubuntu" panose="020B0504030602030204" charset="0"/>
-            </a:endParaRPr>
-          </a:p>
-          <a:p>
-            <a:pPr algn="l"/>
-            <a:r>
               <a:rPr lang="en-US" altLang="ar-EG" sz="2400" dirty="0">
-                <a:latin typeface="Ubuntu" panose="020B0504030602030204" charset="0"/>
-                <a:cs typeface="Ubuntu" panose="020B0504030602030204" charset="0"/>
-              </a:rPr>
-              <a:t>Missing data is rare and does not significantly affect the analysis.</a:t>
+                <a:solidFill>
+                  <a:schemeClr val="bg2">
+                    <a:lumMod val="60000"/>
+                    <a:lumOff val="40000"/>
+                  </a:schemeClr>
+                </a:solidFill>
+                <a:latin typeface="Ubuntu" panose="020B0504030602030204" charset="0"/>
+                <a:cs typeface="Ubuntu" panose="020B0504030602030204" charset="0"/>
+              </a:rPr>
+              <a:t>Importance of High Quality Data</a:t>
             </a:r>
             <a:endParaRPr lang="en-US" altLang="ar-EG" sz="2400" dirty="0">
-              <a:latin typeface="Ubuntu" panose="020B0504030602030204" charset="0"/>
-              <a:cs typeface="Ubuntu" panose="020B0504030602030204" charset="0"/>
-            </a:endParaRPr>
-          </a:p>
-          <a:p>
-            <a:pPr algn="l"/>
+              <a:solidFill>
+                <a:schemeClr val="bg2">
+                  <a:lumMod val="60000"/>
+                  <a:lumOff val="40000"/>
+                </a:schemeClr>
+              </a:solidFill>
+              <a:latin typeface="Ubuntu" panose="020B0504030602030204" charset="0"/>
+              <a:cs typeface="Ubuntu" panose="020B0504030602030204" charset="0"/>
+            </a:endParaRPr>
+          </a:p>
+          <a:p>
+            <a:pPr marL="457200" indent="-457200" algn="l">
+              <a:buFont typeface="+mj-lt"/>
+              <a:buAutoNum type="arabicPeriod"/>
+            </a:pPr>
             <a:r>
               <a:rPr lang="en-US" altLang="ar-EG" sz="2400" dirty="0">
                 <a:latin typeface="Ubuntu" panose="020B0504030602030204" charset="0"/>
                 <a:cs typeface="Ubuntu" panose="020B0504030602030204" charset="0"/>
               </a:rPr>
-              <a:t>Removing missing data does not lead to a loss of critical information.</a:t>
+              <a:t>Handle Missing Values</a:t>
             </a:r>
             <a:endParaRPr lang="en-US" altLang="ar-EG" sz="2400" dirty="0">
               <a:latin typeface="Ubuntu" panose="020B0504030602030204" charset="0"/>
@@ -8305,38 +9629,59 @@
             </a:endParaRPr>
           </a:p>
           <a:p>
-            <a:pPr algn="l"/>
+            <a:pPr marL="457200" indent="-457200" algn="l">
+              <a:buFont typeface="+mj-lt"/>
+              <a:buAutoNum type="arabicPeriod"/>
+            </a:pPr>
             <a:r>
               <a:rPr lang="en-US" altLang="ar-EG" sz="2400" dirty="0">
-                <a:latin typeface="Ubuntu" panose="020B0504030602030204" charset="0"/>
-                <a:cs typeface="Ubuntu" panose="020B0504030602030204" charset="0"/>
-              </a:rPr>
-              <a:t>There is no other imputation methods available to fill the gaps.</a:t>
+                <a:solidFill>
+                  <a:schemeClr val="bg2">
+                    <a:lumMod val="60000"/>
+                    <a:lumOff val="40000"/>
+                  </a:schemeClr>
+                </a:solidFill>
+                <a:latin typeface="Ubuntu" panose="020B0504030602030204" charset="0"/>
+                <a:cs typeface="Ubuntu" panose="020B0504030602030204" charset="0"/>
+              </a:rPr>
+              <a:t>Choosing the Right Imputation Method</a:t>
             </a:r>
             <a:endParaRPr lang="en-US" altLang="ar-EG" sz="2400" dirty="0">
-              <a:latin typeface="Ubuntu" panose="020B0504030602030204" charset="0"/>
-              <a:cs typeface="Ubuntu" panose="020B0504030602030204" charset="0"/>
-            </a:endParaRPr>
-          </a:p>
-          <a:p>
-            <a:pPr marL="0" indent="0" algn="l">
-              <a:buNone/>
+              <a:solidFill>
+                <a:schemeClr val="bg2">
+                  <a:lumMod val="60000"/>
+                  <a:lumOff val="40000"/>
+                </a:schemeClr>
+              </a:solidFill>
+              <a:latin typeface="Ubuntu" panose="020B0504030602030204" charset="0"/>
+              <a:cs typeface="Ubuntu" panose="020B0504030602030204" charset="0"/>
+            </a:endParaRPr>
+          </a:p>
+          <a:p>
+            <a:pPr marL="457200" indent="-457200" algn="l">
+              <a:buFont typeface="+mj-lt"/>
+              <a:buAutoNum type="arabicPeriod"/>
             </a:pPr>
             <a:r>
-              <a:rPr lang="en-US" altLang="ar-EG" sz="2400" b="1" dirty="0">
-                <a:latin typeface="Ubuntu" panose="020B0504030602030204" charset="0"/>
-                <a:cs typeface="Ubuntu" panose="020B0504030602030204" charset="0"/>
-              </a:rPr>
-              <a:t>Caution: </a:t>
-            </a:r>
-            <a:r>
               <a:rPr lang="en-US" altLang="ar-EG" sz="2400" dirty="0">
-                <a:latin typeface="Ubuntu" panose="020B0504030602030204" charset="0"/>
-                <a:cs typeface="Ubuntu" panose="020B0504030602030204" charset="0"/>
-              </a:rPr>
-              <a:t>Use this method sparingly, as it can lead to loss of information and potential bias if not done thoughtfully.</a:t>
+                <a:solidFill>
+                  <a:schemeClr val="bg2">
+                    <a:lumMod val="60000"/>
+                    <a:lumOff val="40000"/>
+                  </a:schemeClr>
+                </a:solidFill>
+                <a:latin typeface="Ubuntu" panose="020B0504030602030204" charset="0"/>
+                <a:cs typeface="Ubuntu" panose="020B0504030602030204" charset="0"/>
+              </a:rPr>
+              <a:t>Lab</a:t>
             </a:r>
             <a:endParaRPr lang="en-US" altLang="ar-EG" sz="2400" dirty="0">
+              <a:solidFill>
+                <a:schemeClr val="bg2">
+                  <a:lumMod val="60000"/>
+                  <a:lumOff val="40000"/>
+                </a:schemeClr>
+              </a:solidFill>
               <a:latin typeface="Ubuntu" panose="020B0504030602030204" charset="0"/>
               <a:cs typeface="Ubuntu" panose="020B0504030602030204" charset="0"/>
             </a:endParaRPr>

</xml_diff>